<commit_message>
I've written a speach for the presentation. Need some time to train and maybe for speach reorganization
</commit_message>
<xml_diff>
--- a/Презентация/Боевая/Подсистема_интеграции_4.pptx
+++ b/Презентация/Боевая/Подсистема_интеграции_4.pptx
@@ -308,7 +308,7 @@
             <a:fld id="{30D5D2DE-8DE0-4DB3-883D-38EF1F476F8F}" type="datetimeFigureOut">
               <a:rPr lang="ru-RU" smtClean="0"/>
               <a:pPr/>
-              <a:t>13.06.2015</a:t>
+              <a:t>14.06.2015</a:t>
             </a:fld>
             <a:endParaRPr lang="ru-RU"/>
           </a:p>
@@ -475,7 +475,7 @@
             <a:fld id="{30D5D2DE-8DE0-4DB3-883D-38EF1F476F8F}" type="datetimeFigureOut">
               <a:rPr lang="ru-RU" smtClean="0"/>
               <a:pPr/>
-              <a:t>13.06.2015</a:t>
+              <a:t>14.06.2015</a:t>
             </a:fld>
             <a:endParaRPr lang="ru-RU"/>
           </a:p>
@@ -652,7 +652,7 @@
             <a:fld id="{30D5D2DE-8DE0-4DB3-883D-38EF1F476F8F}" type="datetimeFigureOut">
               <a:rPr lang="ru-RU" smtClean="0"/>
               <a:pPr/>
-              <a:t>13.06.2015</a:t>
+              <a:t>14.06.2015</a:t>
             </a:fld>
             <a:endParaRPr lang="ru-RU"/>
           </a:p>
@@ -819,7 +819,7 @@
             <a:fld id="{30D5D2DE-8DE0-4DB3-883D-38EF1F476F8F}" type="datetimeFigureOut">
               <a:rPr lang="ru-RU" smtClean="0"/>
               <a:pPr/>
-              <a:t>13.06.2015</a:t>
+              <a:t>14.06.2015</a:t>
             </a:fld>
             <a:endParaRPr lang="ru-RU"/>
           </a:p>
@@ -1062,7 +1062,7 @@
             <a:fld id="{30D5D2DE-8DE0-4DB3-883D-38EF1F476F8F}" type="datetimeFigureOut">
               <a:rPr lang="ru-RU" smtClean="0"/>
               <a:pPr/>
-              <a:t>13.06.2015</a:t>
+              <a:t>14.06.2015</a:t>
             </a:fld>
             <a:endParaRPr lang="ru-RU"/>
           </a:p>
@@ -1347,7 +1347,7 @@
             <a:fld id="{30D5D2DE-8DE0-4DB3-883D-38EF1F476F8F}" type="datetimeFigureOut">
               <a:rPr lang="ru-RU" smtClean="0"/>
               <a:pPr/>
-              <a:t>13.06.2015</a:t>
+              <a:t>14.06.2015</a:t>
             </a:fld>
             <a:endParaRPr lang="ru-RU"/>
           </a:p>
@@ -1766,7 +1766,7 @@
             <a:fld id="{30D5D2DE-8DE0-4DB3-883D-38EF1F476F8F}" type="datetimeFigureOut">
               <a:rPr lang="ru-RU" smtClean="0"/>
               <a:pPr/>
-              <a:t>13.06.2015</a:t>
+              <a:t>14.06.2015</a:t>
             </a:fld>
             <a:endParaRPr lang="ru-RU"/>
           </a:p>
@@ -1881,7 +1881,7 @@
             <a:fld id="{30D5D2DE-8DE0-4DB3-883D-38EF1F476F8F}" type="datetimeFigureOut">
               <a:rPr lang="ru-RU" smtClean="0"/>
               <a:pPr/>
-              <a:t>13.06.2015</a:t>
+              <a:t>14.06.2015</a:t>
             </a:fld>
             <a:endParaRPr lang="ru-RU"/>
           </a:p>
@@ -1973,7 +1973,7 @@
             <a:fld id="{30D5D2DE-8DE0-4DB3-883D-38EF1F476F8F}" type="datetimeFigureOut">
               <a:rPr lang="ru-RU" smtClean="0"/>
               <a:pPr/>
-              <a:t>13.06.2015</a:t>
+              <a:t>14.06.2015</a:t>
             </a:fld>
             <a:endParaRPr lang="ru-RU"/>
           </a:p>
@@ -2247,7 +2247,7 @@
             <a:fld id="{30D5D2DE-8DE0-4DB3-883D-38EF1F476F8F}" type="datetimeFigureOut">
               <a:rPr lang="ru-RU" smtClean="0"/>
               <a:pPr/>
-              <a:t>13.06.2015</a:t>
+              <a:t>14.06.2015</a:t>
             </a:fld>
             <a:endParaRPr lang="ru-RU"/>
           </a:p>
@@ -2497,7 +2497,7 @@
             <a:fld id="{30D5D2DE-8DE0-4DB3-883D-38EF1F476F8F}" type="datetimeFigureOut">
               <a:rPr lang="ru-RU" smtClean="0"/>
               <a:pPr/>
-              <a:t>13.06.2015</a:t>
+              <a:t>14.06.2015</a:t>
             </a:fld>
             <a:endParaRPr lang="ru-RU"/>
           </a:p>
@@ -2707,7 +2707,7 @@
             <a:fld id="{30D5D2DE-8DE0-4DB3-883D-38EF1F476F8F}" type="datetimeFigureOut">
               <a:rPr lang="ru-RU" smtClean="0"/>
               <a:pPr/>
-              <a:t>13.06.2015</a:t>
+              <a:t>14.06.2015</a:t>
             </a:fld>
             <a:endParaRPr lang="ru-RU"/>
           </a:p>
@@ -6615,8 +6615,8 @@
         </p:nvSpPr>
         <p:spPr>
           <a:xfrm>
-            <a:off x="4499992" y="5939988"/>
-            <a:ext cx="3816424" cy="369332"/>
+            <a:off x="6012160" y="5734997"/>
+            <a:ext cx="2808312" cy="646331"/>
           </a:xfrm>
           <a:prstGeom prst="rect">
             <a:avLst/>
@@ -6634,7 +6634,17 @@
                 <a:latin typeface="Arial" pitchFamily="34" charset="0"/>
                 <a:cs typeface="Arial" pitchFamily="34" charset="0"/>
               </a:rPr>
-              <a:t>Актуальность информации</a:t>
+              <a:t>Актуальность</a:t>
+            </a:r>
+          </a:p>
+          <a:p>
+            <a:pPr algn="ctr"/>
+            <a:r>
+              <a:rPr lang="ru-RU" dirty="0" smtClean="0">
+                <a:latin typeface="Arial" pitchFamily="34" charset="0"/>
+                <a:cs typeface="Arial" pitchFamily="34" charset="0"/>
+              </a:rPr>
+              <a:t>данных</a:t>
             </a:r>
             <a:endParaRPr lang="ru-RU" dirty="0"/>
           </a:p>
@@ -6648,7 +6658,7 @@
         </p:nvSpPr>
         <p:spPr>
           <a:xfrm>
-            <a:off x="755576" y="2780928"/>
+            <a:off x="369599" y="2708920"/>
             <a:ext cx="2114169" cy="646331"/>
           </a:xfrm>
           <a:prstGeom prst="rect">
@@ -6700,7 +6710,7 @@
         </p:blipFill>
         <p:spPr bwMode="auto">
           <a:xfrm>
-            <a:off x="3635896" y="980728"/>
+            <a:off x="395536" y="3546660"/>
             <a:ext cx="2185110" cy="2186596"/>
           </a:xfrm>
           <a:prstGeom prst="rect">
@@ -6726,7 +6736,7 @@
         </p:blipFill>
         <p:spPr bwMode="auto">
           <a:xfrm>
-            <a:off x="6592461" y="908297"/>
+            <a:off x="3275856" y="3500585"/>
             <a:ext cx="2300019" cy="2376687"/>
           </a:xfrm>
           <a:prstGeom prst="rect">
@@ -6743,7 +6753,7 @@
         </p:nvSpPr>
         <p:spPr>
           <a:xfrm>
-            <a:off x="436743" y="5517232"/>
+            <a:off x="2987824" y="2782669"/>
             <a:ext cx="2695097" cy="646331"/>
           </a:xfrm>
           <a:prstGeom prst="rect">
@@ -6802,7 +6812,7 @@
         </p:blipFill>
         <p:spPr bwMode="auto">
           <a:xfrm>
-            <a:off x="395536" y="3501008"/>
+            <a:off x="2916493" y="801216"/>
             <a:ext cx="2735627" cy="2051720"/>
           </a:xfrm>
           <a:prstGeom prst="rect">
@@ -6819,7 +6829,7 @@
         </p:nvSpPr>
         <p:spPr>
           <a:xfrm>
-            <a:off x="4211960" y="3284984"/>
+            <a:off x="395536" y="5805264"/>
             <a:ext cx="4104456" cy="646331"/>
           </a:xfrm>
           <a:prstGeom prst="rect">
@@ -6861,7 +6871,7 @@
         </p:blipFill>
         <p:spPr bwMode="auto">
           <a:xfrm>
-            <a:off x="5868144" y="1844824"/>
+            <a:off x="2555776" y="4493278"/>
             <a:ext cx="648072" cy="591906"/>
           </a:xfrm>
           <a:prstGeom prst="rect">
@@ -6887,7 +6897,7 @@
         </p:blipFill>
         <p:spPr bwMode="auto">
           <a:xfrm>
-            <a:off x="899592" y="980728"/>
+            <a:off x="539552" y="836712"/>
             <a:ext cx="1800200" cy="1800200"/>
           </a:xfrm>
           <a:prstGeom prst="rect">
@@ -6913,7 +6923,7 @@
         </p:blipFill>
         <p:spPr bwMode="auto">
           <a:xfrm>
-            <a:off x="5652120" y="4437112"/>
+            <a:off x="6660232" y="3933056"/>
             <a:ext cx="1410618" cy="1410618"/>
           </a:xfrm>
           <a:prstGeom prst="rect">
@@ -6922,6 +6932,62 @@
           <a:noFill/>
         </p:spPr>
       </p:pic>
+      <p:pic>
+        <p:nvPicPr>
+          <p:cNvPr id="2050" name="Picture 2" descr="http://www.clker.com/cliparts/y/f/Q/i/Z/l/check-mark-md.png"/>
+          <p:cNvPicPr>
+            <a:picLocks noChangeAspect="1" noChangeArrowheads="1"/>
+          </p:cNvPicPr>
+          <p:nvPr/>
+        </p:nvPicPr>
+        <p:blipFill>
+          <a:blip r:embed="rId8" cstate="print"/>
+          <a:srcRect/>
+          <a:stretch>
+            <a:fillRect/>
+          </a:stretch>
+        </p:blipFill>
+        <p:spPr bwMode="auto">
+          <a:xfrm>
+            <a:off x="6689098" y="950590"/>
+            <a:ext cx="1699326" cy="1758330"/>
+          </a:xfrm>
+          <a:prstGeom prst="rect">
+            <a:avLst/>
+          </a:prstGeom>
+          <a:noFill/>
+        </p:spPr>
+      </p:pic>
+      <p:sp>
+        <p:nvSpPr>
+          <p:cNvPr id="15" name="Прямоугольник 14"/>
+          <p:cNvSpPr/>
+          <p:nvPr/>
+        </p:nvSpPr>
+        <p:spPr>
+          <a:xfrm>
+            <a:off x="6156176" y="2843644"/>
+            <a:ext cx="2592288" cy="369332"/>
+          </a:xfrm>
+          <a:prstGeom prst="rect">
+            <a:avLst/>
+          </a:prstGeom>
+        </p:spPr>
+        <p:txBody>
+          <a:bodyPr wrap="square">
+            <a:spAutoFit/>
+          </a:bodyPr>
+          <a:lstStyle/>
+          <a:p>
+            <a:pPr algn="ctr"/>
+            <a:r>
+              <a:rPr lang="ru-RU" dirty="0" smtClean="0"/>
+              <a:t>Интеграция в один клик</a:t>
+            </a:r>
+            <a:endParaRPr lang="ru-RU" dirty="0"/>
+          </a:p>
+        </p:txBody>
+      </p:sp>
     </p:spTree>
   </p:cSld>
   <p:clrMapOvr>
@@ -7913,7 +7979,15 @@
                 <a:ea typeface="+mj-ea"/>
                 <a:cs typeface="+mj-cs"/>
               </a:rPr>
-              <a:t>Задачи и особенности подсистемы</a:t>
+              <a:t>Назначение и </a:t>
+            </a:r>
+            <a:r>
+              <a:rPr lang="ru-RU" sz="3200" dirty="0" smtClean="0">
+                <a:latin typeface="+mj-lt"/>
+                <a:ea typeface="+mj-ea"/>
+                <a:cs typeface="+mj-cs"/>
+              </a:rPr>
+              <a:t>особенности подсистемы</a:t>
             </a:r>
             <a:endParaRPr kumimoji="0" lang="ru-RU" sz="3200" b="0" i="0" u="none" strike="noStrike" kern="1200" cap="none" spc="0" normalizeH="0" baseline="0" noProof="0" dirty="0" smtClean="0">
               <a:ln>
@@ -7981,7 +8055,7 @@
         </p:nvSpPr>
         <p:spPr>
           <a:xfrm>
-            <a:off x="899592" y="3203684"/>
+            <a:off x="827584" y="3203684"/>
             <a:ext cx="1918539" cy="338554"/>
           </a:xfrm>
           <a:prstGeom prst="rect">
@@ -8016,7 +8090,7 @@
         </p:nvSpPr>
         <p:spPr>
           <a:xfrm>
-            <a:off x="600090" y="5734997"/>
+            <a:off x="539552" y="5661248"/>
             <a:ext cx="2640979" cy="584775"/>
           </a:xfrm>
           <a:prstGeom prst="rect">
@@ -8132,7 +8206,7 @@
         </p:nvSpPr>
         <p:spPr>
           <a:xfrm>
-            <a:off x="3851920" y="1126485"/>
+            <a:off x="3851920" y="2852936"/>
             <a:ext cx="4752528" cy="338554"/>
           </a:xfrm>
           <a:prstGeom prst="rect">
@@ -8168,7 +8242,7 @@
         </p:nvSpPr>
         <p:spPr>
           <a:xfrm>
-            <a:off x="3888432" y="2636912"/>
+            <a:off x="3888432" y="4437112"/>
             <a:ext cx="4788024" cy="338554"/>
           </a:xfrm>
           <a:prstGeom prst="rect">
@@ -8359,7 +8433,7 @@
         </p:blipFill>
         <p:spPr bwMode="auto">
           <a:xfrm>
-            <a:off x="4932040" y="1556792"/>
+            <a:off x="4860032" y="3317849"/>
             <a:ext cx="2736304" cy="975247"/>
           </a:xfrm>
           <a:prstGeom prst="rect">
@@ -8390,7 +8464,7 @@
         </p:blipFill>
         <p:spPr bwMode="auto">
           <a:xfrm>
-            <a:off x="5364088" y="2996952"/>
+            <a:off x="5364088" y="4869160"/>
             <a:ext cx="1690623" cy="1440160"/>
           </a:xfrm>
           <a:prstGeom prst="rect">
@@ -8399,40 +8473,9 @@
           <a:noFill/>
         </p:spPr>
       </p:pic>
-      <p:sp>
-        <p:nvSpPr>
-          <p:cNvPr id="33" name="Прямоугольник 32"/>
-          <p:cNvSpPr/>
-          <p:nvPr/>
-        </p:nvSpPr>
-        <p:spPr>
-          <a:xfrm>
-            <a:off x="3960440" y="4365104"/>
-            <a:ext cx="4788024" cy="338554"/>
-          </a:xfrm>
-          <a:prstGeom prst="rect">
-            <a:avLst/>
-          </a:prstGeom>
-        </p:spPr>
-        <p:txBody>
-          <a:bodyPr wrap="square">
-            <a:spAutoFit/>
-          </a:bodyPr>
-          <a:lstStyle/>
-          <a:p>
-            <a:r>
-              <a:rPr lang="ru-RU" sz="1600" b="1" dirty="0" smtClean="0">
-                <a:latin typeface="Arial" pitchFamily="34" charset="0"/>
-                <a:cs typeface="Arial" pitchFamily="34" charset="0"/>
-              </a:rPr>
-              <a:t>Анализ большого количества данных </a:t>
-            </a:r>
-          </a:p>
-        </p:txBody>
-      </p:sp>
       <p:pic>
         <p:nvPicPr>
-          <p:cNvPr id="7185" name="Picture 17" descr="http://www.gitex.com/g/2012/logos/big_data_logo1.png"/>
+          <p:cNvPr id="36" name="Picture 8" descr="http://okna-nice.ru/images/okna_v_panelnii_dom.png"/>
           <p:cNvPicPr>
             <a:picLocks noChangeAspect="1" noChangeArrowheads="1"/>
           </p:cNvPicPr>
@@ -8447,8 +8490,8 @@
         </p:blipFill>
         <p:spPr bwMode="auto">
           <a:xfrm>
-            <a:off x="5355637" y="4776142"/>
-            <a:ext cx="2024675" cy="1533178"/>
+            <a:off x="611560" y="1376772"/>
+            <a:ext cx="2448272" cy="1836204"/>
           </a:xfrm>
           <a:prstGeom prst="rect">
             <a:avLst/>
@@ -8458,7 +8501,7 @@
       </p:pic>
       <p:pic>
         <p:nvPicPr>
-          <p:cNvPr id="36" name="Picture 8" descr="http://okna-nice.ru/images/okna_v_panelnii_dom.png"/>
+          <p:cNvPr id="37" name="Picture 4" descr="http://files.softicons.com/download/business-icons/desktop-business-icons-by-aha-soft/png/256x256/case.png"/>
           <p:cNvPicPr>
             <a:picLocks noChangeAspect="1" noChangeArrowheads="1"/>
           </p:cNvPicPr>
@@ -8473,8 +8516,8 @@
         </p:blipFill>
         <p:spPr bwMode="auto">
           <a:xfrm>
-            <a:off x="611560" y="1376772"/>
-            <a:ext cx="2448272" cy="1836204"/>
+            <a:off x="971600" y="3861048"/>
+            <a:ext cx="1800200" cy="1800200"/>
           </a:xfrm>
           <a:prstGeom prst="rect">
             <a:avLst/>
@@ -8482,9 +8525,59 @@
           <a:noFill/>
         </p:spPr>
       </p:pic>
+      <p:sp>
+        <p:nvSpPr>
+          <p:cNvPr id="20" name="Прямоугольник 19"/>
+          <p:cNvSpPr/>
+          <p:nvPr/>
+        </p:nvSpPr>
+        <p:spPr>
+          <a:xfrm>
+            <a:off x="3851920" y="1074222"/>
+            <a:ext cx="4752528" cy="338554"/>
+          </a:xfrm>
+          <a:prstGeom prst="rect">
+            <a:avLst/>
+          </a:prstGeom>
+        </p:spPr>
+        <p:txBody>
+          <a:bodyPr wrap="square">
+            <a:spAutoFit/>
+          </a:bodyPr>
+          <a:lstStyle/>
+          <a:p>
+            <a:pPr algn="just"/>
+            <a:r>
+              <a:rPr lang="ru-RU" sz="1600" b="1" dirty="0" smtClean="0">
+                <a:latin typeface="Arial" pitchFamily="34" charset="0"/>
+                <a:cs typeface="Arial" pitchFamily="34" charset="0"/>
+              </a:rPr>
+              <a:t>Взаимодействие через </a:t>
+            </a:r>
+            <a:r>
+              <a:rPr lang="en-US" sz="1600" b="1" dirty="0" smtClean="0">
+                <a:latin typeface="Arial" pitchFamily="34" charset="0"/>
+                <a:cs typeface="Arial" pitchFamily="34" charset="0"/>
+              </a:rPr>
+              <a:t>API-</a:t>
+            </a:r>
+            <a:r>
+              <a:rPr lang="ru-RU" sz="1600" b="1" dirty="0" smtClean="0">
+                <a:latin typeface="Arial" pitchFamily="34" charset="0"/>
+                <a:cs typeface="Arial" pitchFamily="34" charset="0"/>
+              </a:rPr>
+              <a:t>интерфейс</a:t>
+            </a:r>
+            <a:endParaRPr lang="ru-RU" sz="1600" b="1" dirty="0">
+              <a:latin typeface="Arial" pitchFamily="34" charset="0"/>
+              <a:cs typeface="Arial" pitchFamily="34" charset="0"/>
+            </a:endParaRPr>
+          </a:p>
+        </p:txBody>
+      </p:sp>
       <p:pic>
         <p:nvPicPr>
-          <p:cNvPr id="37" name="Picture 4" descr="http://files.softicons.com/download/business-icons/desktop-business-icons-by-aha-soft/png/256x256/case.png"/>
+          <p:cNvPr id="17410" name="Picture 2" descr="http://www.probasegroup.com/wp-content/uploads/2014/09/learnmore-api.png"/>
           <p:cNvPicPr>
             <a:picLocks noChangeAspect="1" noChangeArrowheads="1"/>
           </p:cNvPicPr>
@@ -8499,8 +8592,8 @@
         </p:blipFill>
         <p:spPr bwMode="auto">
           <a:xfrm>
-            <a:off x="1043608" y="3861048"/>
-            <a:ext cx="1800200" cy="1800200"/>
+            <a:off x="4980046" y="1412776"/>
+            <a:ext cx="2256250" cy="1368152"/>
           </a:xfrm>
           <a:prstGeom prst="rect">
             <a:avLst/>
@@ -8824,8 +8917,8 @@
         </p:nvSpPr>
         <p:spPr>
           <a:xfrm>
-            <a:off x="2051720" y="980728"/>
-            <a:ext cx="5256584" cy="5328592"/>
+            <a:off x="1979712" y="980728"/>
+            <a:ext cx="5328592" cy="5328592"/>
           </a:xfrm>
           <a:prstGeom prst="rect">
             <a:avLst/>
@@ -8870,8 +8963,8 @@
         </p:nvSpPr>
         <p:spPr>
           <a:xfrm>
-            <a:off x="251520" y="980728"/>
-            <a:ext cx="1728192" cy="5328592"/>
+            <a:off x="323528" y="980728"/>
+            <a:ext cx="1584176" cy="5328592"/>
           </a:xfrm>
           <a:prstGeom prst="rect">
             <a:avLst/>
@@ -8966,7 +9059,7 @@
         </p:nvSpPr>
         <p:spPr>
           <a:xfrm>
-            <a:off x="1835696" y="836712"/>
+            <a:off x="1763688" y="836712"/>
             <a:ext cx="360040" cy="360040"/>
           </a:xfrm>
           <a:prstGeom prst="ellipse">

</xml_diff>

<commit_message>
I need to train more
</commit_message>
<xml_diff>
--- a/Презентация/Боевая/Подсистема_интеграции_4.pptx
+++ b/Презентация/Боевая/Подсистема_интеграции_4.pptx
@@ -4980,6 +4980,54 @@
           </a:effectLst>
         </p:spPr>
       </p:pic>
+      <p:sp>
+        <p:nvSpPr>
+          <p:cNvPr id="8" name="Прямоугольник 7"/>
+          <p:cNvSpPr/>
+          <p:nvPr/>
+        </p:nvSpPr>
+        <p:spPr>
+          <a:xfrm>
+            <a:off x="179512" y="764704"/>
+            <a:ext cx="8784976" cy="5688632"/>
+          </a:xfrm>
+          <a:prstGeom prst="rect">
+            <a:avLst/>
+          </a:prstGeom>
+          <a:solidFill>
+            <a:srgbClr val="FFFFFF">
+              <a:alpha val="60000"/>
+            </a:srgbClr>
+          </a:solidFill>
+          <a:ln>
+            <a:noFill/>
+          </a:ln>
+        </p:spPr>
+        <p:style>
+          <a:lnRef idx="2">
+            <a:schemeClr val="accent1">
+              <a:shade val="50000"/>
+            </a:schemeClr>
+          </a:lnRef>
+          <a:fillRef idx="1">
+            <a:schemeClr val="accent1"/>
+          </a:fillRef>
+          <a:effectRef idx="0">
+            <a:schemeClr val="accent1"/>
+          </a:effectRef>
+          <a:fontRef idx="minor">
+            <a:schemeClr val="lt1"/>
+          </a:fontRef>
+        </p:style>
+        <p:txBody>
+          <a:bodyPr rtlCol="0" anchor="ctr"/>
+          <a:lstStyle/>
+          <a:p>
+            <a:pPr algn="ctr"/>
+            <a:endParaRPr lang="ru-RU" dirty="0"/>
+          </a:p>
+        </p:txBody>
+      </p:sp>
       <p:pic>
         <p:nvPicPr>
           <p:cNvPr id="4098" name="Picture 2"/>
@@ -5246,6 +5294,54 @@
           </a:effectLst>
         </p:spPr>
       </p:pic>
+      <p:sp>
+        <p:nvSpPr>
+          <p:cNvPr id="8" name="Прямоугольник 7"/>
+          <p:cNvSpPr/>
+          <p:nvPr/>
+        </p:nvSpPr>
+        <p:spPr>
+          <a:xfrm>
+            <a:off x="179512" y="764704"/>
+            <a:ext cx="8784976" cy="5688632"/>
+          </a:xfrm>
+          <a:prstGeom prst="rect">
+            <a:avLst/>
+          </a:prstGeom>
+          <a:solidFill>
+            <a:srgbClr val="FFFFFF">
+              <a:alpha val="60000"/>
+            </a:srgbClr>
+          </a:solidFill>
+          <a:ln>
+            <a:noFill/>
+          </a:ln>
+        </p:spPr>
+        <p:style>
+          <a:lnRef idx="2">
+            <a:schemeClr val="accent1">
+              <a:shade val="50000"/>
+            </a:schemeClr>
+          </a:lnRef>
+          <a:fillRef idx="1">
+            <a:schemeClr val="accent1"/>
+          </a:fillRef>
+          <a:effectRef idx="0">
+            <a:schemeClr val="accent1"/>
+          </a:effectRef>
+          <a:fontRef idx="minor">
+            <a:schemeClr val="lt1"/>
+          </a:fontRef>
+        </p:style>
+        <p:txBody>
+          <a:bodyPr rtlCol="0" anchor="ctr"/>
+          <a:lstStyle/>
+          <a:p>
+            <a:pPr algn="ctr"/>
+            <a:endParaRPr lang="ru-RU" dirty="0"/>
+          </a:p>
+        </p:txBody>
+      </p:sp>
       <p:pic>
         <p:nvPicPr>
           <p:cNvPr id="9" name="Picture 3"/>
@@ -5263,8 +5359,8 @@
         </p:blipFill>
         <p:spPr bwMode="auto">
           <a:xfrm>
-            <a:off x="1763688" y="856447"/>
-            <a:ext cx="7150370" cy="5126820"/>
+            <a:off x="1475656" y="856446"/>
+            <a:ext cx="7438402" cy="5333339"/>
           </a:xfrm>
           <a:prstGeom prst="rect">
             <a:avLst/>
@@ -5512,6 +5608,54 @@
           </a:effectLst>
         </p:spPr>
       </p:pic>
+      <p:sp>
+        <p:nvSpPr>
+          <p:cNvPr id="8" name="Прямоугольник 7"/>
+          <p:cNvSpPr/>
+          <p:nvPr/>
+        </p:nvSpPr>
+        <p:spPr>
+          <a:xfrm>
+            <a:off x="179512" y="764704"/>
+            <a:ext cx="8784976" cy="5688632"/>
+          </a:xfrm>
+          <a:prstGeom prst="rect">
+            <a:avLst/>
+          </a:prstGeom>
+          <a:solidFill>
+            <a:srgbClr val="FFFFFF">
+              <a:alpha val="60000"/>
+            </a:srgbClr>
+          </a:solidFill>
+          <a:ln>
+            <a:noFill/>
+          </a:ln>
+        </p:spPr>
+        <p:style>
+          <a:lnRef idx="2">
+            <a:schemeClr val="accent1">
+              <a:shade val="50000"/>
+            </a:schemeClr>
+          </a:lnRef>
+          <a:fillRef idx="1">
+            <a:schemeClr val="accent1"/>
+          </a:fillRef>
+          <a:effectRef idx="0">
+            <a:schemeClr val="accent1"/>
+          </a:effectRef>
+          <a:fontRef idx="minor">
+            <a:schemeClr val="lt1"/>
+          </a:fontRef>
+        </p:style>
+        <p:txBody>
+          <a:bodyPr rtlCol="0" anchor="ctr"/>
+          <a:lstStyle/>
+          <a:p>
+            <a:pPr algn="ctr"/>
+            <a:endParaRPr lang="ru-RU" dirty="0"/>
+          </a:p>
+        </p:txBody>
+      </p:sp>
       <p:pic>
         <p:nvPicPr>
           <p:cNvPr id="4100" name="Picture 4"/>
@@ -5778,6 +5922,54 @@
           </a:effectLst>
         </p:spPr>
       </p:pic>
+      <p:sp>
+        <p:nvSpPr>
+          <p:cNvPr id="8" name="Прямоугольник 7"/>
+          <p:cNvSpPr/>
+          <p:nvPr/>
+        </p:nvSpPr>
+        <p:spPr>
+          <a:xfrm>
+            <a:off x="179512" y="764704"/>
+            <a:ext cx="8784976" cy="5688632"/>
+          </a:xfrm>
+          <a:prstGeom prst="rect">
+            <a:avLst/>
+          </a:prstGeom>
+          <a:solidFill>
+            <a:srgbClr val="FFFFFF">
+              <a:alpha val="60000"/>
+            </a:srgbClr>
+          </a:solidFill>
+          <a:ln>
+            <a:noFill/>
+          </a:ln>
+        </p:spPr>
+        <p:style>
+          <a:lnRef idx="2">
+            <a:schemeClr val="accent1">
+              <a:shade val="50000"/>
+            </a:schemeClr>
+          </a:lnRef>
+          <a:fillRef idx="1">
+            <a:schemeClr val="accent1"/>
+          </a:fillRef>
+          <a:effectRef idx="0">
+            <a:schemeClr val="accent1"/>
+          </a:effectRef>
+          <a:fontRef idx="minor">
+            <a:schemeClr val="lt1"/>
+          </a:fontRef>
+        </p:style>
+        <p:txBody>
+          <a:bodyPr rtlCol="0" anchor="ctr"/>
+          <a:lstStyle/>
+          <a:p>
+            <a:pPr algn="ctr"/>
+            <a:endParaRPr lang="ru-RU" dirty="0"/>
+          </a:p>
+        </p:txBody>
+      </p:sp>
       <p:pic>
         <p:nvPicPr>
           <p:cNvPr id="12" name="Рисунок 11"/>
@@ -5793,8 +5985,8 @@
         </p:blipFill>
         <p:spPr bwMode="auto">
           <a:xfrm>
-            <a:off x="755575" y="1628800"/>
-            <a:ext cx="8136905" cy="4572082"/>
+            <a:off x="539553" y="1484784"/>
+            <a:ext cx="8352928" cy="4716098"/>
           </a:xfrm>
           <a:prstGeom prst="rect">
             <a:avLst/>
@@ -5867,7 +6059,11 @@
           <a:p>
             <a:r>
               <a:rPr lang="ru-RU" sz="3200" dirty="0" smtClean="0"/>
-              <a:t>Использованные технологии</a:t>
+              <a:t>Использованные </a:t>
+            </a:r>
+            <a:r>
+              <a:rPr lang="ru-RU" sz="3200" dirty="0" smtClean="0"/>
+              <a:t>технологии и аналоги</a:t>
             </a:r>
             <a:endParaRPr lang="ru-RU" sz="3200" dirty="0"/>
           </a:p>
@@ -5931,8 +6127,8 @@
         </p:blipFill>
         <p:spPr bwMode="auto">
           <a:xfrm>
-            <a:off x="2627784" y="1346415"/>
-            <a:ext cx="2016224" cy="1146481"/>
+            <a:off x="611560" y="2420887"/>
+            <a:ext cx="1944216" cy="1105535"/>
           </a:xfrm>
           <a:prstGeom prst="rect">
             <a:avLst/>
@@ -5957,8 +6153,8 @@
         </p:blipFill>
         <p:spPr bwMode="auto">
           <a:xfrm>
-            <a:off x="1187624" y="4386705"/>
-            <a:ext cx="2520280" cy="2066631"/>
+            <a:off x="611560" y="4797151"/>
+            <a:ext cx="2016224" cy="1653305"/>
           </a:xfrm>
           <a:prstGeom prst="rect">
             <a:avLst/>
@@ -5966,9 +6162,69 @@
           <a:noFill/>
         </p:spPr>
       </p:pic>
+      <p:sp>
+        <p:nvSpPr>
+          <p:cNvPr id="28684" name="AutoShape 12" descr="http://ohdoylerules.com/content/images/css3.svg"/>
+          <p:cNvSpPr>
+            <a:spLocks noChangeAspect="1" noChangeArrowheads="1"/>
+          </p:cNvSpPr>
+          <p:nvPr/>
+        </p:nvSpPr>
+        <p:spPr bwMode="auto">
+          <a:xfrm>
+            <a:off x="155575" y="-144463"/>
+            <a:ext cx="304800" cy="304801"/>
+          </a:xfrm>
+          <a:prstGeom prst="rect">
+            <a:avLst/>
+          </a:prstGeom>
+          <a:noFill/>
+        </p:spPr>
+        <p:txBody>
+          <a:bodyPr vert="horz" wrap="square" lIns="91440" tIns="45720" rIns="91440" bIns="45720" numCol="1" anchor="t" anchorCtr="0" compatLnSpc="1">
+            <a:prstTxWarp prst="textNoShape">
+              <a:avLst/>
+            </a:prstTxWarp>
+          </a:bodyPr>
+          <a:lstStyle/>
+          <a:p>
+            <a:endParaRPr lang="ru-RU"/>
+          </a:p>
+        </p:txBody>
+      </p:sp>
+      <p:sp>
+        <p:nvSpPr>
+          <p:cNvPr id="28686" name="AutoShape 14" descr="http://ohdoylerules.com/content/images/css3.svg"/>
+          <p:cNvSpPr>
+            <a:spLocks noChangeAspect="1" noChangeArrowheads="1"/>
+          </p:cNvSpPr>
+          <p:nvPr/>
+        </p:nvSpPr>
+        <p:spPr bwMode="auto">
+          <a:xfrm>
+            <a:off x="155575" y="-144463"/>
+            <a:ext cx="304800" cy="304801"/>
+          </a:xfrm>
+          <a:prstGeom prst="rect">
+            <a:avLst/>
+          </a:prstGeom>
+          <a:noFill/>
+        </p:spPr>
+        <p:txBody>
+          <a:bodyPr vert="horz" wrap="square" lIns="91440" tIns="45720" rIns="91440" bIns="45720" numCol="1" anchor="t" anchorCtr="0" compatLnSpc="1">
+            <a:prstTxWarp prst="textNoShape">
+              <a:avLst/>
+            </a:prstTxWarp>
+          </a:bodyPr>
+          <a:lstStyle/>
+          <a:p>
+            <a:endParaRPr lang="ru-RU"/>
+          </a:p>
+        </p:txBody>
+      </p:sp>
       <p:pic>
         <p:nvPicPr>
-          <p:cNvPr id="28680" name="Picture 8" descr="http://ocpsoft.org/wp-content/uploads/2013/01/javascript_logo_unofficial-300x300.png"/>
+          <p:cNvPr id="28690" name="Picture 18" descr="http://www.codeproject.com/Learn/MVC/images/MVClogo.png"/>
           <p:cNvPicPr>
             <a:picLocks noChangeAspect="1" noChangeArrowheads="1"/>
           </p:cNvPicPr>
@@ -5983,8 +6239,8 @@
         </p:blipFill>
         <p:spPr bwMode="auto">
           <a:xfrm>
-            <a:off x="7092280" y="2924944"/>
-            <a:ext cx="1512168" cy="1512168"/>
+            <a:off x="683568" y="3573016"/>
+            <a:ext cx="1800200" cy="1242392"/>
           </a:xfrm>
           <a:prstGeom prst="rect">
             <a:avLst/>
@@ -5994,7 +6250,7 @@
       </p:pic>
       <p:pic>
         <p:nvPicPr>
-          <p:cNvPr id="28682" name="Picture 10" descr="http://www.w3.org/html/logo/downloads/HTML5_Logo_512.png"/>
+          <p:cNvPr id="28698" name="Picture 26" descr="http://www.softreactor.ru/sites/default/files/image/node_pics/11/razrabotki_c%23.png"/>
           <p:cNvPicPr>
             <a:picLocks noChangeAspect="1" noChangeArrowheads="1"/>
           </p:cNvPicPr>
@@ -6009,8 +6265,8 @@
         </p:blipFill>
         <p:spPr bwMode="auto">
           <a:xfrm>
-            <a:off x="6516216" y="4581128"/>
-            <a:ext cx="1512168" cy="1512168"/>
+            <a:off x="683568" y="980728"/>
+            <a:ext cx="1800200" cy="1427556"/>
           </a:xfrm>
           <a:prstGeom prst="rect">
             <a:avLst/>
@@ -6020,67 +6276,209 @@
       </p:pic>
       <p:sp>
         <p:nvSpPr>
-          <p:cNvPr id="28684" name="AutoShape 12" descr="http://ohdoylerules.com/content/images/css3.svg"/>
-          <p:cNvSpPr>
-            <a:spLocks noChangeAspect="1" noChangeArrowheads="1"/>
-          </p:cNvSpPr>
-          <p:nvPr/>
-        </p:nvSpPr>
-        <p:spPr bwMode="auto">
-          <a:xfrm>
-            <a:off x="155575" y="-144463"/>
-            <a:ext cx="304800" cy="304801"/>
+          <p:cNvPr id="19" name="Прямоугольник 18"/>
+          <p:cNvSpPr/>
+          <p:nvPr/>
+        </p:nvSpPr>
+        <p:spPr>
+          <a:xfrm>
+            <a:off x="323528" y="764704"/>
+            <a:ext cx="2664296" cy="5760640"/>
           </a:xfrm>
           <a:prstGeom prst="rect">
             <a:avLst/>
           </a:prstGeom>
           <a:noFill/>
-        </p:spPr>
-        <p:txBody>
-          <a:bodyPr vert="horz" wrap="square" lIns="91440" tIns="45720" rIns="91440" bIns="45720" numCol="1" anchor="t" anchorCtr="0" compatLnSpc="1">
-            <a:prstTxWarp prst="textNoShape">
-              <a:avLst/>
-            </a:prstTxWarp>
-          </a:bodyPr>
-          <a:lstStyle/>
-          <a:p>
-            <a:endParaRPr lang="ru-RU"/>
-          </a:p>
-        </p:txBody>
-      </p:sp>
-      <p:sp>
-        <p:nvSpPr>
-          <p:cNvPr id="28686" name="AutoShape 14" descr="http://ohdoylerules.com/content/images/css3.svg"/>
-          <p:cNvSpPr>
-            <a:spLocks noChangeAspect="1" noChangeArrowheads="1"/>
-          </p:cNvSpPr>
-          <p:nvPr/>
-        </p:nvSpPr>
-        <p:spPr bwMode="auto">
-          <a:xfrm>
-            <a:off x="155575" y="-144463"/>
-            <a:ext cx="304800" cy="304801"/>
+          <a:ln>
+            <a:solidFill>
+              <a:schemeClr val="tx2"/>
+            </a:solidFill>
+          </a:ln>
+        </p:spPr>
+        <p:style>
+          <a:lnRef idx="2">
+            <a:schemeClr val="accent1">
+              <a:shade val="50000"/>
+            </a:schemeClr>
+          </a:lnRef>
+          <a:fillRef idx="1">
+            <a:schemeClr val="accent1"/>
+          </a:fillRef>
+          <a:effectRef idx="0">
+            <a:schemeClr val="accent1"/>
+          </a:effectRef>
+          <a:fontRef idx="minor">
+            <a:schemeClr val="lt1"/>
+          </a:fontRef>
+        </p:style>
+        <p:txBody>
+          <a:bodyPr rtlCol="0" anchor="ctr"/>
+          <a:lstStyle/>
+          <a:p>
+            <a:pPr algn="ctr"/>
+            <a:endParaRPr lang="ru-RU" dirty="0"/>
+          </a:p>
+        </p:txBody>
+      </p:sp>
+      <p:sp>
+        <p:nvSpPr>
+          <p:cNvPr id="20" name="Овал 19"/>
+          <p:cNvSpPr/>
+          <p:nvPr/>
+        </p:nvSpPr>
+        <p:spPr>
+          <a:xfrm>
+            <a:off x="179512" y="620688"/>
+            <a:ext cx="360040" cy="360040"/>
+          </a:xfrm>
+          <a:prstGeom prst="ellipse">
+            <a:avLst/>
+          </a:prstGeom>
+          <a:solidFill>
+            <a:schemeClr val="bg1"/>
+          </a:solidFill>
+        </p:spPr>
+        <p:style>
+          <a:lnRef idx="2">
+            <a:schemeClr val="accent1">
+              <a:shade val="50000"/>
+            </a:schemeClr>
+          </a:lnRef>
+          <a:fillRef idx="1">
+            <a:schemeClr val="accent1"/>
+          </a:fillRef>
+          <a:effectRef idx="0">
+            <a:schemeClr val="accent1"/>
+          </a:effectRef>
+          <a:fontRef idx="minor">
+            <a:schemeClr val="lt1"/>
+          </a:fontRef>
+        </p:style>
+        <p:txBody>
+          <a:bodyPr rtlCol="0" anchor="ctr"/>
+          <a:lstStyle/>
+          <a:p>
+            <a:pPr algn="ctr"/>
+            <a:r>
+              <a:rPr lang="en-US" b="1" dirty="0" smtClean="0">
+                <a:solidFill>
+                  <a:schemeClr val="tx1"/>
+                </a:solidFill>
+              </a:rPr>
+              <a:t>1</a:t>
+            </a:r>
+            <a:endParaRPr lang="ru-RU" b="1" dirty="0">
+              <a:solidFill>
+                <a:schemeClr val="tx1"/>
+              </a:solidFill>
+            </a:endParaRPr>
+          </a:p>
+        </p:txBody>
+      </p:sp>
+      <p:sp>
+        <p:nvSpPr>
+          <p:cNvPr id="23" name="Прямоугольник 22"/>
+          <p:cNvSpPr/>
+          <p:nvPr/>
+        </p:nvSpPr>
+        <p:spPr>
+          <a:xfrm>
+            <a:off x="3347864" y="764704"/>
+            <a:ext cx="5472608" cy="5760640"/>
           </a:xfrm>
           <a:prstGeom prst="rect">
             <a:avLst/>
           </a:prstGeom>
           <a:noFill/>
-        </p:spPr>
-        <p:txBody>
-          <a:bodyPr vert="horz" wrap="square" lIns="91440" tIns="45720" rIns="91440" bIns="45720" numCol="1" anchor="t" anchorCtr="0" compatLnSpc="1">
-            <a:prstTxWarp prst="textNoShape">
-              <a:avLst/>
-            </a:prstTxWarp>
-          </a:bodyPr>
-          <a:lstStyle/>
-          <a:p>
-            <a:endParaRPr lang="ru-RU"/>
+          <a:ln>
+            <a:solidFill>
+              <a:schemeClr val="tx2"/>
+            </a:solidFill>
+          </a:ln>
+        </p:spPr>
+        <p:style>
+          <a:lnRef idx="2">
+            <a:schemeClr val="accent1">
+              <a:shade val="50000"/>
+            </a:schemeClr>
+          </a:lnRef>
+          <a:fillRef idx="1">
+            <a:schemeClr val="accent1"/>
+          </a:fillRef>
+          <a:effectRef idx="0">
+            <a:schemeClr val="accent1"/>
+          </a:effectRef>
+          <a:fontRef idx="minor">
+            <a:schemeClr val="lt1"/>
+          </a:fontRef>
+        </p:style>
+        <p:txBody>
+          <a:bodyPr rtlCol="0" anchor="ctr"/>
+          <a:lstStyle/>
+          <a:p>
+            <a:pPr algn="ctr"/>
+            <a:endParaRPr lang="ru-RU" dirty="0"/>
+          </a:p>
+        </p:txBody>
+      </p:sp>
+      <p:sp>
+        <p:nvSpPr>
+          <p:cNvPr id="24" name="Овал 23"/>
+          <p:cNvSpPr/>
+          <p:nvPr/>
+        </p:nvSpPr>
+        <p:spPr>
+          <a:xfrm>
+            <a:off x="3131840" y="620688"/>
+            <a:ext cx="360040" cy="360040"/>
+          </a:xfrm>
+          <a:prstGeom prst="ellipse">
+            <a:avLst/>
+          </a:prstGeom>
+          <a:solidFill>
+            <a:schemeClr val="bg1"/>
+          </a:solidFill>
+        </p:spPr>
+        <p:style>
+          <a:lnRef idx="2">
+            <a:schemeClr val="accent1">
+              <a:shade val="50000"/>
+            </a:schemeClr>
+          </a:lnRef>
+          <a:fillRef idx="1">
+            <a:schemeClr val="accent1"/>
+          </a:fillRef>
+          <a:effectRef idx="0">
+            <a:schemeClr val="accent1"/>
+          </a:effectRef>
+          <a:fontRef idx="minor">
+            <a:schemeClr val="lt1"/>
+          </a:fontRef>
+        </p:style>
+        <p:txBody>
+          <a:bodyPr rtlCol="0" anchor="ctr"/>
+          <a:lstStyle/>
+          <a:p>
+            <a:pPr algn="ctr"/>
+            <a:r>
+              <a:rPr lang="ru-RU" b="1" dirty="0" smtClean="0">
+                <a:solidFill>
+                  <a:schemeClr val="tx1"/>
+                </a:solidFill>
+              </a:rPr>
+              <a:t>2</a:t>
+            </a:r>
+            <a:endParaRPr lang="ru-RU" b="1" dirty="0">
+              <a:solidFill>
+                <a:schemeClr val="tx1"/>
+              </a:solidFill>
+            </a:endParaRPr>
           </a:p>
         </p:txBody>
       </p:sp>
       <p:pic>
         <p:nvPicPr>
-          <p:cNvPr id="28688" name="Picture 16" descr="http://logonoid.com/images/css3-logo.png"/>
+          <p:cNvPr id="1027" name="Picture 3"/>
           <p:cNvPicPr>
             <a:picLocks noChangeAspect="1" noChangeArrowheads="1"/>
           </p:cNvPicPr>
@@ -6095,396 +6493,21 @@
         </p:blipFill>
         <p:spPr bwMode="auto">
           <a:xfrm>
-            <a:off x="5148064" y="2914972"/>
-            <a:ext cx="1656184" cy="1656184"/>
+            <a:off x="3419872" y="980728"/>
+            <a:ext cx="5314190" cy="5472608"/>
           </a:xfrm>
           <a:prstGeom prst="rect">
             <a:avLst/>
           </a:prstGeom>
           <a:noFill/>
+          <a:ln w="9525">
+            <a:noFill/>
+            <a:miter lim="800000"/>
+            <a:headEnd/>
+            <a:tailEnd/>
+          </a:ln>
         </p:spPr>
       </p:pic>
-      <p:pic>
-        <p:nvPicPr>
-          <p:cNvPr id="28690" name="Picture 18" descr="http://www.codeproject.com/Learn/MVC/images/MVClogo.png"/>
-          <p:cNvPicPr>
-            <a:picLocks noChangeAspect="1" noChangeArrowheads="1"/>
-          </p:cNvPicPr>
-          <p:nvPr/>
-        </p:nvPicPr>
-        <p:blipFill>
-          <a:blip r:embed="rId7" cstate="print"/>
-          <a:srcRect/>
-          <a:stretch>
-            <a:fillRect/>
-          </a:stretch>
-        </p:blipFill>
-        <p:spPr bwMode="auto">
-          <a:xfrm>
-            <a:off x="6012160" y="1196752"/>
-            <a:ext cx="2120562" cy="1463487"/>
-          </a:xfrm>
-          <a:prstGeom prst="rect">
-            <a:avLst/>
-          </a:prstGeom>
-          <a:noFill/>
-        </p:spPr>
-      </p:pic>
-      <p:pic>
-        <p:nvPicPr>
-          <p:cNvPr id="28692" name="Picture 20" descr="http://www.bizagi.com/assets/images/standards-page/logo_soap.jpg"/>
-          <p:cNvPicPr>
-            <a:picLocks noChangeAspect="1" noChangeArrowheads="1"/>
-          </p:cNvPicPr>
-          <p:nvPr/>
-        </p:nvPicPr>
-        <p:blipFill>
-          <a:blip r:embed="rId8" cstate="print"/>
-          <a:srcRect/>
-          <a:stretch>
-            <a:fillRect/>
-          </a:stretch>
-        </p:blipFill>
-        <p:spPr bwMode="auto">
-          <a:xfrm>
-            <a:off x="1619672" y="2708920"/>
-            <a:ext cx="1644180" cy="1080120"/>
-          </a:xfrm>
-          <a:prstGeom prst="rect">
-            <a:avLst/>
-          </a:prstGeom>
-          <a:noFill/>
-        </p:spPr>
-      </p:pic>
-      <p:pic>
-        <p:nvPicPr>
-          <p:cNvPr id="28698" name="Picture 26" descr="http://www.softreactor.ru/sites/default/files/image/node_pics/11/razrabotki_c%23.png"/>
-          <p:cNvPicPr>
-            <a:picLocks noChangeAspect="1" noChangeArrowheads="1"/>
-          </p:cNvPicPr>
-          <p:nvPr/>
-        </p:nvPicPr>
-        <p:blipFill>
-          <a:blip r:embed="rId9" cstate="print"/>
-          <a:srcRect/>
-          <a:stretch>
-            <a:fillRect/>
-          </a:stretch>
-        </p:blipFill>
-        <p:spPr bwMode="auto">
-          <a:xfrm>
-            <a:off x="482721" y="1035179"/>
-            <a:ext cx="1929039" cy="1529725"/>
-          </a:xfrm>
-          <a:prstGeom prst="rect">
-            <a:avLst/>
-          </a:prstGeom>
-          <a:noFill/>
-        </p:spPr>
-      </p:pic>
-      <p:sp>
-        <p:nvSpPr>
-          <p:cNvPr id="19" name="Прямоугольник 18"/>
-          <p:cNvSpPr/>
-          <p:nvPr/>
-        </p:nvSpPr>
-        <p:spPr>
-          <a:xfrm>
-            <a:off x="323528" y="764704"/>
-            <a:ext cx="4464496" cy="3168352"/>
-          </a:xfrm>
-          <a:prstGeom prst="rect">
-            <a:avLst/>
-          </a:prstGeom>
-          <a:noFill/>
-          <a:ln>
-            <a:solidFill>
-              <a:schemeClr val="tx2"/>
-            </a:solidFill>
-          </a:ln>
-        </p:spPr>
-        <p:style>
-          <a:lnRef idx="2">
-            <a:schemeClr val="accent1">
-              <a:shade val="50000"/>
-            </a:schemeClr>
-          </a:lnRef>
-          <a:fillRef idx="1">
-            <a:schemeClr val="accent1"/>
-          </a:fillRef>
-          <a:effectRef idx="0">
-            <a:schemeClr val="accent1"/>
-          </a:effectRef>
-          <a:fontRef idx="minor">
-            <a:schemeClr val="lt1"/>
-          </a:fontRef>
-        </p:style>
-        <p:txBody>
-          <a:bodyPr rtlCol="0" anchor="ctr"/>
-          <a:lstStyle/>
-          <a:p>
-            <a:pPr algn="ctr"/>
-            <a:endParaRPr lang="ru-RU" dirty="0"/>
-          </a:p>
-        </p:txBody>
-      </p:sp>
-      <p:sp>
-        <p:nvSpPr>
-          <p:cNvPr id="20" name="Овал 19"/>
-          <p:cNvSpPr/>
-          <p:nvPr/>
-        </p:nvSpPr>
-        <p:spPr>
-          <a:xfrm>
-            <a:off x="179512" y="620688"/>
-            <a:ext cx="360040" cy="360040"/>
-          </a:xfrm>
-          <a:prstGeom prst="ellipse">
-            <a:avLst/>
-          </a:prstGeom>
-          <a:solidFill>
-            <a:schemeClr val="bg1"/>
-          </a:solidFill>
-        </p:spPr>
-        <p:style>
-          <a:lnRef idx="2">
-            <a:schemeClr val="accent1">
-              <a:shade val="50000"/>
-            </a:schemeClr>
-          </a:lnRef>
-          <a:fillRef idx="1">
-            <a:schemeClr val="accent1"/>
-          </a:fillRef>
-          <a:effectRef idx="0">
-            <a:schemeClr val="accent1"/>
-          </a:effectRef>
-          <a:fontRef idx="minor">
-            <a:schemeClr val="lt1"/>
-          </a:fontRef>
-        </p:style>
-        <p:txBody>
-          <a:bodyPr rtlCol="0" anchor="ctr"/>
-          <a:lstStyle/>
-          <a:p>
-            <a:pPr algn="ctr"/>
-            <a:r>
-              <a:rPr lang="en-US" b="1" dirty="0" smtClean="0">
-                <a:solidFill>
-                  <a:schemeClr val="tx1"/>
-                </a:solidFill>
-              </a:rPr>
-              <a:t>1</a:t>
-            </a:r>
-            <a:endParaRPr lang="ru-RU" b="1" dirty="0">
-              <a:solidFill>
-                <a:schemeClr val="tx1"/>
-              </a:solidFill>
-            </a:endParaRPr>
-          </a:p>
-        </p:txBody>
-      </p:sp>
-      <p:sp>
-        <p:nvSpPr>
-          <p:cNvPr id="21" name="Прямоугольник 20"/>
-          <p:cNvSpPr/>
-          <p:nvPr/>
-        </p:nvSpPr>
-        <p:spPr>
-          <a:xfrm>
-            <a:off x="323528" y="4221088"/>
-            <a:ext cx="4464496" cy="2304256"/>
-          </a:xfrm>
-          <a:prstGeom prst="rect">
-            <a:avLst/>
-          </a:prstGeom>
-          <a:noFill/>
-          <a:ln>
-            <a:solidFill>
-              <a:schemeClr val="tx2"/>
-            </a:solidFill>
-          </a:ln>
-        </p:spPr>
-        <p:style>
-          <a:lnRef idx="2">
-            <a:schemeClr val="accent1">
-              <a:shade val="50000"/>
-            </a:schemeClr>
-          </a:lnRef>
-          <a:fillRef idx="1">
-            <a:schemeClr val="accent1"/>
-          </a:fillRef>
-          <a:effectRef idx="0">
-            <a:schemeClr val="accent1"/>
-          </a:effectRef>
-          <a:fontRef idx="minor">
-            <a:schemeClr val="lt1"/>
-          </a:fontRef>
-        </p:style>
-        <p:txBody>
-          <a:bodyPr rtlCol="0" anchor="ctr"/>
-          <a:lstStyle/>
-          <a:p>
-            <a:pPr algn="ctr"/>
-            <a:endParaRPr lang="ru-RU" dirty="0"/>
-          </a:p>
-        </p:txBody>
-      </p:sp>
-      <p:sp>
-        <p:nvSpPr>
-          <p:cNvPr id="22" name="Овал 21"/>
-          <p:cNvSpPr/>
-          <p:nvPr/>
-        </p:nvSpPr>
-        <p:spPr>
-          <a:xfrm>
-            <a:off x="179512" y="4077072"/>
-            <a:ext cx="360040" cy="360040"/>
-          </a:xfrm>
-          <a:prstGeom prst="ellipse">
-            <a:avLst/>
-          </a:prstGeom>
-          <a:solidFill>
-            <a:schemeClr val="bg1"/>
-          </a:solidFill>
-        </p:spPr>
-        <p:style>
-          <a:lnRef idx="2">
-            <a:schemeClr val="accent1">
-              <a:shade val="50000"/>
-            </a:schemeClr>
-          </a:lnRef>
-          <a:fillRef idx="1">
-            <a:schemeClr val="accent1"/>
-          </a:fillRef>
-          <a:effectRef idx="0">
-            <a:schemeClr val="accent1"/>
-          </a:effectRef>
-          <a:fontRef idx="minor">
-            <a:schemeClr val="lt1"/>
-          </a:fontRef>
-        </p:style>
-        <p:txBody>
-          <a:bodyPr rtlCol="0" anchor="ctr"/>
-          <a:lstStyle/>
-          <a:p>
-            <a:pPr algn="ctr"/>
-            <a:r>
-              <a:rPr lang="en-US" b="1" dirty="0">
-                <a:solidFill>
-                  <a:schemeClr val="tx1"/>
-                </a:solidFill>
-              </a:rPr>
-              <a:t>2</a:t>
-            </a:r>
-            <a:endParaRPr lang="ru-RU" b="1" dirty="0">
-              <a:solidFill>
-                <a:schemeClr val="tx1"/>
-              </a:solidFill>
-            </a:endParaRPr>
-          </a:p>
-        </p:txBody>
-      </p:sp>
-      <p:sp>
-        <p:nvSpPr>
-          <p:cNvPr id="23" name="Прямоугольник 22"/>
-          <p:cNvSpPr/>
-          <p:nvPr/>
-        </p:nvSpPr>
-        <p:spPr>
-          <a:xfrm>
-            <a:off x="5148064" y="1124744"/>
-            <a:ext cx="3672408" cy="5040560"/>
-          </a:xfrm>
-          <a:prstGeom prst="rect">
-            <a:avLst/>
-          </a:prstGeom>
-          <a:noFill/>
-          <a:ln>
-            <a:solidFill>
-              <a:schemeClr val="tx2"/>
-            </a:solidFill>
-          </a:ln>
-        </p:spPr>
-        <p:style>
-          <a:lnRef idx="2">
-            <a:schemeClr val="accent1">
-              <a:shade val="50000"/>
-            </a:schemeClr>
-          </a:lnRef>
-          <a:fillRef idx="1">
-            <a:schemeClr val="accent1"/>
-          </a:fillRef>
-          <a:effectRef idx="0">
-            <a:schemeClr val="accent1"/>
-          </a:effectRef>
-          <a:fontRef idx="minor">
-            <a:schemeClr val="lt1"/>
-          </a:fontRef>
-        </p:style>
-        <p:txBody>
-          <a:bodyPr rtlCol="0" anchor="ctr"/>
-          <a:lstStyle/>
-          <a:p>
-            <a:pPr algn="ctr"/>
-            <a:endParaRPr lang="ru-RU" dirty="0"/>
-          </a:p>
-        </p:txBody>
-      </p:sp>
-      <p:sp>
-        <p:nvSpPr>
-          <p:cNvPr id="24" name="Овал 23"/>
-          <p:cNvSpPr/>
-          <p:nvPr/>
-        </p:nvSpPr>
-        <p:spPr>
-          <a:xfrm>
-            <a:off x="4932040" y="980728"/>
-            <a:ext cx="360040" cy="360040"/>
-          </a:xfrm>
-          <a:prstGeom prst="ellipse">
-            <a:avLst/>
-          </a:prstGeom>
-          <a:solidFill>
-            <a:schemeClr val="bg1"/>
-          </a:solidFill>
-        </p:spPr>
-        <p:style>
-          <a:lnRef idx="2">
-            <a:schemeClr val="accent1">
-              <a:shade val="50000"/>
-            </a:schemeClr>
-          </a:lnRef>
-          <a:fillRef idx="1">
-            <a:schemeClr val="accent1"/>
-          </a:fillRef>
-          <a:effectRef idx="0">
-            <a:schemeClr val="accent1"/>
-          </a:effectRef>
-          <a:fontRef idx="minor">
-            <a:schemeClr val="lt1"/>
-          </a:fontRef>
-        </p:style>
-        <p:txBody>
-          <a:bodyPr rtlCol="0" anchor="ctr"/>
-          <a:lstStyle/>
-          <a:p>
-            <a:pPr algn="ctr"/>
-            <a:r>
-              <a:rPr lang="en-US" b="1" dirty="0" smtClean="0">
-                <a:solidFill>
-                  <a:schemeClr val="tx1"/>
-                </a:solidFill>
-              </a:rPr>
-              <a:t>3</a:t>
-            </a:r>
-            <a:endParaRPr lang="ru-RU" b="1" dirty="0">
-              <a:solidFill>
-                <a:schemeClr val="tx1"/>
-              </a:solidFill>
-            </a:endParaRPr>
-          </a:p>
-        </p:txBody>
-      </p:sp>
     </p:spTree>
   </p:cSld>
   <p:clrMapOvr>
@@ -6736,7 +6759,7 @@
         </p:blipFill>
         <p:spPr bwMode="auto">
           <a:xfrm>
-            <a:off x="3275856" y="3500585"/>
+            <a:off x="3352101" y="3500585"/>
             <a:ext cx="2300019" cy="2376687"/>
           </a:xfrm>
           <a:prstGeom prst="rect">
@@ -6829,7 +6852,7 @@
         </p:nvSpPr>
         <p:spPr>
           <a:xfrm>
-            <a:off x="395536" y="5805264"/>
+            <a:off x="899592" y="5879013"/>
             <a:ext cx="4104456" cy="646331"/>
           </a:xfrm>
           <a:prstGeom prst="rect">
@@ -6871,7 +6894,7 @@
         </p:blipFill>
         <p:spPr bwMode="auto">
           <a:xfrm>
-            <a:off x="2555776" y="4493278"/>
+            <a:off x="2627784" y="4493278"/>
             <a:ext cx="648072" cy="591906"/>
           </a:xfrm>
           <a:prstGeom prst="rect">
@@ -6923,8 +6946,8 @@
         </p:blipFill>
         <p:spPr bwMode="auto">
           <a:xfrm>
-            <a:off x="6660232" y="3933056"/>
-            <a:ext cx="1410618" cy="1410618"/>
+            <a:off x="6516216" y="3861048"/>
+            <a:ext cx="1800200" cy="1800200"/>
           </a:xfrm>
           <a:prstGeom prst="rect">
             <a:avLst/>
@@ -7979,15 +8002,7 @@
                 <a:ea typeface="+mj-ea"/>
                 <a:cs typeface="+mj-cs"/>
               </a:rPr>
-              <a:t>Назначение и </a:t>
-            </a:r>
-            <a:r>
-              <a:rPr lang="ru-RU" sz="3200" dirty="0" smtClean="0">
-                <a:latin typeface="+mj-lt"/>
-                <a:ea typeface="+mj-ea"/>
-                <a:cs typeface="+mj-cs"/>
-              </a:rPr>
-              <a:t>особенности подсистемы</a:t>
+              <a:t>Назначение и особенности подсистемы</a:t>
             </a:r>
             <a:endParaRPr kumimoji="0" lang="ru-RU" sz="3200" b="0" i="0" u="none" strike="noStrike" kern="1200" cap="none" spc="0" normalizeH="0" baseline="0" noProof="0" dirty="0" smtClean="0">
               <a:ln>
@@ -8592,8 +8607,34 @@
         </p:blipFill>
         <p:spPr bwMode="auto">
           <a:xfrm>
-            <a:off x="4980046" y="1412776"/>
+            <a:off x="3851920" y="1412776"/>
             <a:ext cx="2256250" cy="1368152"/>
+          </a:xfrm>
+          <a:prstGeom prst="rect">
+            <a:avLst/>
+          </a:prstGeom>
+          <a:noFill/>
+        </p:spPr>
+      </p:pic>
+      <p:pic>
+        <p:nvPicPr>
+          <p:cNvPr id="21" name="Picture 20" descr="http://www.bizagi.com/assets/images/standards-page/logo_soap.jpg"/>
+          <p:cNvPicPr>
+            <a:picLocks noChangeAspect="1" noChangeArrowheads="1"/>
+          </p:cNvPicPr>
+          <p:nvPr/>
+        </p:nvPicPr>
+        <p:blipFill>
+          <a:blip r:embed="rId7" cstate="print"/>
+          <a:srcRect/>
+          <a:stretch>
+            <a:fillRect/>
+          </a:stretch>
+        </p:blipFill>
+        <p:spPr bwMode="auto">
+          <a:xfrm>
+            <a:off x="6372200" y="1556792"/>
+            <a:ext cx="1644180" cy="1080120"/>
           </a:xfrm>
           <a:prstGeom prst="rect">
             <a:avLst/>

</xml_diff>

<commit_message>
Made some corrections for presentation
</commit_message>
<xml_diff>
--- a/Презентация/Боевая/Подсистема_интеграции_4.pptx
+++ b/Презентация/Боевая/Подсистема_интеграции_4.pptx
@@ -15,16 +15,15 @@
     <p:sldId id="266" r:id="rId9"/>
     <p:sldId id="260" r:id="rId10"/>
     <p:sldId id="268" r:id="rId11"/>
-    <p:sldId id="269" r:id="rId12"/>
-    <p:sldId id="270" r:id="rId13"/>
-    <p:sldId id="271" r:id="rId14"/>
-    <p:sldId id="261" r:id="rId15"/>
-    <p:sldId id="272" r:id="rId16"/>
-    <p:sldId id="273" r:id="rId17"/>
-    <p:sldId id="274" r:id="rId18"/>
-    <p:sldId id="264" r:id="rId19"/>
-    <p:sldId id="262" r:id="rId20"/>
-    <p:sldId id="275" r:id="rId21"/>
+    <p:sldId id="270" r:id="rId12"/>
+    <p:sldId id="271" r:id="rId13"/>
+    <p:sldId id="261" r:id="rId14"/>
+    <p:sldId id="272" r:id="rId15"/>
+    <p:sldId id="273" r:id="rId16"/>
+    <p:sldId id="274" r:id="rId17"/>
+    <p:sldId id="264" r:id="rId18"/>
+    <p:sldId id="262" r:id="rId19"/>
+    <p:sldId id="275" r:id="rId20"/>
   </p:sldIdLst>
   <p:sldSz cx="9144000" cy="6858000" type="screen4x3"/>
   <p:notesSz cx="6858000" cy="9144000"/>
@@ -308,7 +307,7 @@
             <a:fld id="{30D5D2DE-8DE0-4DB3-883D-38EF1F476F8F}" type="datetimeFigureOut">
               <a:rPr lang="ru-RU" smtClean="0"/>
               <a:pPr/>
-              <a:t>14.06.2015</a:t>
+              <a:t>15.06.2015</a:t>
             </a:fld>
             <a:endParaRPr lang="ru-RU"/>
           </a:p>
@@ -475,7 +474,7 @@
             <a:fld id="{30D5D2DE-8DE0-4DB3-883D-38EF1F476F8F}" type="datetimeFigureOut">
               <a:rPr lang="ru-RU" smtClean="0"/>
               <a:pPr/>
-              <a:t>14.06.2015</a:t>
+              <a:t>15.06.2015</a:t>
             </a:fld>
             <a:endParaRPr lang="ru-RU"/>
           </a:p>
@@ -652,7 +651,7 @@
             <a:fld id="{30D5D2DE-8DE0-4DB3-883D-38EF1F476F8F}" type="datetimeFigureOut">
               <a:rPr lang="ru-RU" smtClean="0"/>
               <a:pPr/>
-              <a:t>14.06.2015</a:t>
+              <a:t>15.06.2015</a:t>
             </a:fld>
             <a:endParaRPr lang="ru-RU"/>
           </a:p>
@@ -819,7 +818,7 @@
             <a:fld id="{30D5D2DE-8DE0-4DB3-883D-38EF1F476F8F}" type="datetimeFigureOut">
               <a:rPr lang="ru-RU" smtClean="0"/>
               <a:pPr/>
-              <a:t>14.06.2015</a:t>
+              <a:t>15.06.2015</a:t>
             </a:fld>
             <a:endParaRPr lang="ru-RU"/>
           </a:p>
@@ -1062,7 +1061,7 @@
             <a:fld id="{30D5D2DE-8DE0-4DB3-883D-38EF1F476F8F}" type="datetimeFigureOut">
               <a:rPr lang="ru-RU" smtClean="0"/>
               <a:pPr/>
-              <a:t>14.06.2015</a:t>
+              <a:t>15.06.2015</a:t>
             </a:fld>
             <a:endParaRPr lang="ru-RU"/>
           </a:p>
@@ -1347,7 +1346,7 @@
             <a:fld id="{30D5D2DE-8DE0-4DB3-883D-38EF1F476F8F}" type="datetimeFigureOut">
               <a:rPr lang="ru-RU" smtClean="0"/>
               <a:pPr/>
-              <a:t>14.06.2015</a:t>
+              <a:t>15.06.2015</a:t>
             </a:fld>
             <a:endParaRPr lang="ru-RU"/>
           </a:p>
@@ -1766,7 +1765,7 @@
             <a:fld id="{30D5D2DE-8DE0-4DB3-883D-38EF1F476F8F}" type="datetimeFigureOut">
               <a:rPr lang="ru-RU" smtClean="0"/>
               <a:pPr/>
-              <a:t>14.06.2015</a:t>
+              <a:t>15.06.2015</a:t>
             </a:fld>
             <a:endParaRPr lang="ru-RU"/>
           </a:p>
@@ -1881,7 +1880,7 @@
             <a:fld id="{30D5D2DE-8DE0-4DB3-883D-38EF1F476F8F}" type="datetimeFigureOut">
               <a:rPr lang="ru-RU" smtClean="0"/>
               <a:pPr/>
-              <a:t>14.06.2015</a:t>
+              <a:t>15.06.2015</a:t>
             </a:fld>
             <a:endParaRPr lang="ru-RU"/>
           </a:p>
@@ -1973,7 +1972,7 @@
             <a:fld id="{30D5D2DE-8DE0-4DB3-883D-38EF1F476F8F}" type="datetimeFigureOut">
               <a:rPr lang="ru-RU" smtClean="0"/>
               <a:pPr/>
-              <a:t>14.06.2015</a:t>
+              <a:t>15.06.2015</a:t>
             </a:fld>
             <a:endParaRPr lang="ru-RU"/>
           </a:p>
@@ -2247,7 +2246,7 @@
             <a:fld id="{30D5D2DE-8DE0-4DB3-883D-38EF1F476F8F}" type="datetimeFigureOut">
               <a:rPr lang="ru-RU" smtClean="0"/>
               <a:pPr/>
-              <a:t>14.06.2015</a:t>
+              <a:t>15.06.2015</a:t>
             </a:fld>
             <a:endParaRPr lang="ru-RU"/>
           </a:p>
@@ -2497,7 +2496,7 @@
             <a:fld id="{30D5D2DE-8DE0-4DB3-883D-38EF1F476F8F}" type="datetimeFigureOut">
               <a:rPr lang="ru-RU" smtClean="0"/>
               <a:pPr/>
-              <a:t>14.06.2015</a:t>
+              <a:t>15.06.2015</a:t>
             </a:fld>
             <a:endParaRPr lang="ru-RU"/>
           </a:p>
@@ -2707,7 +2706,7 @@
             <a:fld id="{30D5D2DE-8DE0-4DB3-883D-38EF1F476F8F}" type="datetimeFigureOut">
               <a:rPr lang="ru-RU" smtClean="0"/>
               <a:pPr/>
-              <a:t>14.06.2015</a:t>
+              <a:t>15.06.2015</a:t>
             </a:fld>
             <a:endParaRPr lang="ru-RU"/>
           </a:p>
@@ -3451,7 +3450,7 @@
         <p:spPr>
           <a:xfrm>
             <a:off x="251520" y="764704"/>
-            <a:ext cx="4176464" cy="3528392"/>
+            <a:ext cx="4176464" cy="5760640"/>
           </a:xfrm>
           <a:prstGeom prst="rect">
             <a:avLst/>
@@ -3498,54 +3497,6 @@
           <a:xfrm>
             <a:off x="4572000" y="764704"/>
             <a:ext cx="4392488" cy="4176464"/>
-          </a:xfrm>
-          <a:prstGeom prst="rect">
-            <a:avLst/>
-          </a:prstGeom>
-          <a:solidFill>
-            <a:srgbClr val="FFFFFF">
-              <a:alpha val="60000"/>
-            </a:srgbClr>
-          </a:solidFill>
-          <a:ln>
-            <a:noFill/>
-          </a:ln>
-        </p:spPr>
-        <p:style>
-          <a:lnRef idx="2">
-            <a:schemeClr val="accent1">
-              <a:shade val="50000"/>
-            </a:schemeClr>
-          </a:lnRef>
-          <a:fillRef idx="1">
-            <a:schemeClr val="accent1"/>
-          </a:fillRef>
-          <a:effectRef idx="0">
-            <a:schemeClr val="accent1"/>
-          </a:effectRef>
-          <a:fontRef idx="minor">
-            <a:schemeClr val="lt1"/>
-          </a:fontRef>
-        </p:style>
-        <p:txBody>
-          <a:bodyPr rtlCol="0" anchor="ctr"/>
-          <a:lstStyle/>
-          <a:p>
-            <a:pPr algn="ctr"/>
-            <a:endParaRPr lang="ru-RU" dirty="0"/>
-          </a:p>
-        </p:txBody>
-      </p:sp>
-      <p:sp>
-        <p:nvSpPr>
-          <p:cNvPr id="11" name="Прямоугольник 10"/>
-          <p:cNvSpPr/>
-          <p:nvPr/>
-        </p:nvSpPr>
-        <p:spPr>
-          <a:xfrm>
-            <a:off x="251520" y="4869160"/>
-            <a:ext cx="4320480" cy="1656184"/>
           </a:xfrm>
           <a:prstGeom prst="rect">
             <a:avLst/>
@@ -3795,14 +3746,60 @@
       </p:pic>
       <p:sp>
         <p:nvSpPr>
+          <p:cNvPr id="9" name="Прямоугольник 8"/>
+          <p:cNvSpPr/>
+          <p:nvPr/>
+        </p:nvSpPr>
+        <p:spPr>
+          <a:xfrm>
+            <a:off x="4716016" y="836712"/>
+            <a:ext cx="4248472" cy="4104456"/>
+          </a:xfrm>
+          <a:prstGeom prst="rect">
+            <a:avLst/>
+          </a:prstGeom>
+          <a:noFill/>
+          <a:ln>
+            <a:solidFill>
+              <a:schemeClr val="tx2"/>
+            </a:solidFill>
+          </a:ln>
+        </p:spPr>
+        <p:style>
+          <a:lnRef idx="2">
+            <a:schemeClr val="accent1">
+              <a:shade val="50000"/>
+            </a:schemeClr>
+          </a:lnRef>
+          <a:fillRef idx="1">
+            <a:schemeClr val="accent1"/>
+          </a:fillRef>
+          <a:effectRef idx="0">
+            <a:schemeClr val="accent1"/>
+          </a:effectRef>
+          <a:fontRef idx="minor">
+            <a:schemeClr val="lt1"/>
+          </a:fontRef>
+        </p:style>
+        <p:txBody>
+          <a:bodyPr rtlCol="0" anchor="ctr"/>
+          <a:lstStyle/>
+          <a:p>
+            <a:pPr algn="ctr"/>
+            <a:endParaRPr lang="ru-RU" dirty="0"/>
+          </a:p>
+        </p:txBody>
+      </p:sp>
+      <p:sp>
+        <p:nvSpPr>
           <p:cNvPr id="8" name="Прямоугольник 7"/>
           <p:cNvSpPr/>
           <p:nvPr/>
         </p:nvSpPr>
         <p:spPr>
           <a:xfrm>
-            <a:off x="0" y="764704"/>
-            <a:ext cx="8784976" cy="4104456"/>
+            <a:off x="179512" y="764704"/>
+            <a:ext cx="4320480" cy="5688632"/>
           </a:xfrm>
           <a:prstGeom prst="rect">
             <a:avLst/>
@@ -3843,59 +3840,13 @@
       </p:sp>
       <p:sp>
         <p:nvSpPr>
-          <p:cNvPr id="12" name="Прямоугольник 11"/>
+          <p:cNvPr id="7" name="Овал 6"/>
           <p:cNvSpPr/>
           <p:nvPr/>
         </p:nvSpPr>
         <p:spPr>
           <a:xfrm>
-            <a:off x="251520" y="4869160"/>
-            <a:ext cx="4248472" cy="1584176"/>
-          </a:xfrm>
-          <a:prstGeom prst="rect">
-            <a:avLst/>
-          </a:prstGeom>
-          <a:noFill/>
-          <a:ln>
-            <a:solidFill>
-              <a:schemeClr val="tx2"/>
-            </a:solidFill>
-          </a:ln>
-        </p:spPr>
-        <p:style>
-          <a:lnRef idx="2">
-            <a:schemeClr val="accent1">
-              <a:shade val="50000"/>
-            </a:schemeClr>
-          </a:lnRef>
-          <a:fillRef idx="1">
-            <a:schemeClr val="accent1"/>
-          </a:fillRef>
-          <a:effectRef idx="0">
-            <a:schemeClr val="accent1"/>
-          </a:effectRef>
-          <a:fontRef idx="minor">
-            <a:schemeClr val="lt1"/>
-          </a:fontRef>
-        </p:style>
-        <p:txBody>
-          <a:bodyPr rtlCol="0" anchor="ctr"/>
-          <a:lstStyle/>
-          <a:p>
-            <a:pPr algn="ctr"/>
-            <a:endParaRPr lang="ru-RU" dirty="0"/>
-          </a:p>
-        </p:txBody>
-      </p:sp>
-      <p:sp>
-        <p:nvSpPr>
-          <p:cNvPr id="13" name="Овал 12"/>
-          <p:cNvSpPr/>
-          <p:nvPr/>
-        </p:nvSpPr>
-        <p:spPr>
-          <a:xfrm>
-            <a:off x="179512" y="4653136"/>
+            <a:off x="4499992" y="692696"/>
             <a:ext cx="360040" cy="360040"/>
           </a:xfrm>
           <a:prstGeom prst="ellipse">
@@ -3932,13 +3883,18 @@
           <a:p>
             <a:pPr algn="ctr"/>
             <a:r>
-              <a:rPr lang="ru-RU" b="1" dirty="0">
+              <a:rPr lang="ru-RU" b="1" dirty="0" smtClean="0">
                 <a:solidFill>
                   <a:schemeClr val="tx1"/>
                 </a:solidFill>
               </a:rPr>
               <a:t>2</a:t>
             </a:r>
+            <a:endParaRPr lang="ru-RU" b="1" dirty="0">
+              <a:solidFill>
+                <a:schemeClr val="tx1"/>
+              </a:solidFill>
+            </a:endParaRPr>
           </a:p>
         </p:txBody>
       </p:sp>
@@ -4103,9 +4059,9 @@
           <p:nvPr/>
         </p:nvSpPr>
         <p:spPr>
-          <a:xfrm>
-            <a:off x="4716016" y="836712"/>
-            <a:ext cx="4248472" cy="4104456"/>
+          <a:xfrm flipV="1">
+            <a:off x="4716016" y="4941168"/>
+            <a:ext cx="4176464" cy="1584176"/>
           </a:xfrm>
           <a:prstGeom prst="rect">
             <a:avLst/>
@@ -4198,7 +4154,7 @@
         </p:nvSpPr>
         <p:spPr>
           <a:xfrm>
-            <a:off x="4499992" y="692696"/>
+            <a:off x="4499992" y="4797152"/>
             <a:ext cx="360040" cy="360040"/>
           </a:xfrm>
           <a:prstGeom prst="ellipse">
@@ -4250,6 +4206,197 @@
           </a:p>
         </p:txBody>
       </p:sp>
+      <p:sp>
+        <p:nvSpPr>
+          <p:cNvPr id="10" name="Прямоугольник 9"/>
+          <p:cNvSpPr/>
+          <p:nvPr/>
+        </p:nvSpPr>
+        <p:spPr>
+          <a:xfrm>
+            <a:off x="4823520" y="836712"/>
+            <a:ext cx="4068960" cy="4032448"/>
+          </a:xfrm>
+          <a:prstGeom prst="rect">
+            <a:avLst/>
+          </a:prstGeom>
+          <a:solidFill>
+            <a:srgbClr val="FFFFFF">
+              <a:alpha val="60000"/>
+            </a:srgbClr>
+          </a:solidFill>
+          <a:ln>
+            <a:noFill/>
+          </a:ln>
+        </p:spPr>
+        <p:style>
+          <a:lnRef idx="2">
+            <a:schemeClr val="accent1">
+              <a:shade val="50000"/>
+            </a:schemeClr>
+          </a:lnRef>
+          <a:fillRef idx="1">
+            <a:schemeClr val="accent1"/>
+          </a:fillRef>
+          <a:effectRef idx="0">
+            <a:schemeClr val="accent1"/>
+          </a:effectRef>
+          <a:fontRef idx="minor">
+            <a:schemeClr val="lt1"/>
+          </a:fontRef>
+        </p:style>
+        <p:txBody>
+          <a:bodyPr rtlCol="0" anchor="ctr"/>
+          <a:lstStyle/>
+          <a:p>
+            <a:pPr algn="ctr"/>
+            <a:endParaRPr lang="ru-RU" dirty="0"/>
+          </a:p>
+        </p:txBody>
+      </p:sp>
+      <p:sp>
+        <p:nvSpPr>
+          <p:cNvPr id="11" name="Прямоугольник 10"/>
+          <p:cNvSpPr/>
+          <p:nvPr/>
+        </p:nvSpPr>
+        <p:spPr>
+          <a:xfrm>
+            <a:off x="4860032" y="5013176"/>
+            <a:ext cx="3401957" cy="338554"/>
+          </a:xfrm>
+          <a:prstGeom prst="rect">
+            <a:avLst/>
+          </a:prstGeom>
+        </p:spPr>
+        <p:txBody>
+          <a:bodyPr wrap="none">
+            <a:spAutoFit/>
+          </a:bodyPr>
+          <a:lstStyle/>
+          <a:p>
+            <a:r>
+              <a:rPr lang="ru-RU" sz="1600" b="1" dirty="0" smtClean="0"/>
+              <a:t>Взаимодействие с базой данных ОУ</a:t>
+            </a:r>
+            <a:endParaRPr lang="ru-RU" sz="1600" b="1" dirty="0"/>
+          </a:p>
+        </p:txBody>
+      </p:sp>
+      <p:sp>
+        <p:nvSpPr>
+          <p:cNvPr id="14" name="Прямоугольник 13"/>
+          <p:cNvSpPr/>
+          <p:nvPr/>
+        </p:nvSpPr>
+        <p:spPr>
+          <a:xfrm>
+            <a:off x="5529725" y="6237312"/>
+            <a:ext cx="842475" cy="276999"/>
+          </a:xfrm>
+          <a:prstGeom prst="rect">
+            <a:avLst/>
+          </a:prstGeom>
+        </p:spPr>
+        <p:txBody>
+          <a:bodyPr wrap="none">
+            <a:spAutoFit/>
+          </a:bodyPr>
+          <a:lstStyle/>
+          <a:p>
+            <a:r>
+              <a:rPr lang="en-US" sz="1200" b="1" dirty="0" smtClean="0"/>
+              <a:t>80 </a:t>
+            </a:r>
+            <a:r>
+              <a:rPr lang="ru-RU" sz="1200" b="1" dirty="0" smtClean="0"/>
+              <a:t>таблиц</a:t>
+            </a:r>
+            <a:endParaRPr lang="ru-RU" sz="1200" dirty="0"/>
+          </a:p>
+        </p:txBody>
+      </p:sp>
+      <p:sp>
+        <p:nvSpPr>
+          <p:cNvPr id="15" name="Прямоугольник 14"/>
+          <p:cNvSpPr/>
+          <p:nvPr/>
+        </p:nvSpPr>
+        <p:spPr>
+          <a:xfrm>
+            <a:off x="7452320" y="6248345"/>
+            <a:ext cx="842475" cy="276999"/>
+          </a:xfrm>
+          <a:prstGeom prst="rect">
+            <a:avLst/>
+          </a:prstGeom>
+        </p:spPr>
+        <p:txBody>
+          <a:bodyPr wrap="none">
+            <a:spAutoFit/>
+          </a:bodyPr>
+          <a:lstStyle/>
+          <a:p>
+            <a:r>
+              <a:rPr lang="ru-RU" sz="1200" b="1" dirty="0" smtClean="0"/>
+              <a:t>15 таблиц</a:t>
+            </a:r>
+            <a:endParaRPr lang="ru-RU" sz="1200" dirty="0"/>
+          </a:p>
+        </p:txBody>
+      </p:sp>
+      <p:pic>
+        <p:nvPicPr>
+          <p:cNvPr id="16" name="Picture 8" descr="http://okna-nice.ru/images/okna_v_panelnii_dom.png"/>
+          <p:cNvPicPr>
+            <a:picLocks noChangeAspect="1" noChangeArrowheads="1"/>
+          </p:cNvPicPr>
+          <p:nvPr/>
+        </p:nvPicPr>
+        <p:blipFill>
+          <a:blip r:embed="rId3" cstate="print"/>
+          <a:srcRect/>
+          <a:stretch>
+            <a:fillRect/>
+          </a:stretch>
+        </p:blipFill>
+        <p:spPr bwMode="auto">
+          <a:xfrm>
+            <a:off x="5292080" y="5373216"/>
+            <a:ext cx="1224136" cy="918102"/>
+          </a:xfrm>
+          <a:prstGeom prst="rect">
+            <a:avLst/>
+          </a:prstGeom>
+          <a:noFill/>
+        </p:spPr>
+      </p:pic>
+      <p:pic>
+        <p:nvPicPr>
+          <p:cNvPr id="21508" name="Picture 4" descr="http://files.softicons.com/download/business-icons/desktop-business-icons-by-aha-soft/png/256x256/case.png"/>
+          <p:cNvPicPr>
+            <a:picLocks noChangeAspect="1" noChangeArrowheads="1"/>
+          </p:cNvPicPr>
+          <p:nvPr/>
+        </p:nvPicPr>
+        <p:blipFill>
+          <a:blip r:embed="rId4" cstate="print"/>
+          <a:srcRect/>
+          <a:stretch>
+            <a:fillRect/>
+          </a:stretch>
+        </p:blipFill>
+        <p:spPr bwMode="auto">
+          <a:xfrm>
+            <a:off x="7380312" y="5311080"/>
+            <a:ext cx="998240" cy="998240"/>
+          </a:xfrm>
+          <a:prstGeom prst="rect">
+            <a:avLst/>
+          </a:prstGeom>
+          <a:noFill/>
+        </p:spPr>
+      </p:pic>
     </p:spTree>
   </p:cSld>
   <p:clrMapOvr>
@@ -4282,6 +4429,78 @@
           <a:chExt cx="0" cy="0"/>
         </a:xfrm>
       </p:grpSpPr>
+      <p:pic>
+        <p:nvPicPr>
+          <p:cNvPr id="12" name="Рисунок 11"/>
+          <p:cNvPicPr/>
+          <p:nvPr/>
+        </p:nvPicPr>
+        <p:blipFill>
+          <a:blip r:embed="rId2" cstate="print">
+            <a:grayscl/>
+          </a:blip>
+          <a:srcRect/>
+          <a:stretch>
+            <a:fillRect/>
+          </a:stretch>
+        </p:blipFill>
+        <p:spPr bwMode="auto">
+          <a:xfrm>
+            <a:off x="2657533" y="2924944"/>
+            <a:ext cx="6162939" cy="3275938"/>
+          </a:xfrm>
+          <a:prstGeom prst="rect">
+            <a:avLst/>
+          </a:prstGeom>
+          <a:ln>
+            <a:noFill/>
+          </a:ln>
+          <a:effectLst>
+            <a:outerShdw blurRad="292100" dist="139700" dir="2700000" algn="tl" rotWithShape="0">
+              <a:srgbClr val="333333">
+                <a:alpha val="65000"/>
+              </a:srgbClr>
+            </a:outerShdw>
+          </a:effectLst>
+        </p:spPr>
+      </p:pic>
+      <p:pic>
+        <p:nvPicPr>
+          <p:cNvPr id="4100" name="Picture 4"/>
+          <p:cNvPicPr>
+            <a:picLocks noChangeAspect="1" noChangeArrowheads="1"/>
+          </p:cNvPicPr>
+          <p:nvPr/>
+        </p:nvPicPr>
+        <p:blipFill>
+          <a:blip r:embed="rId3" cstate="print">
+            <a:grayscl/>
+          </a:blip>
+          <a:srcRect/>
+          <a:stretch>
+            <a:fillRect/>
+          </a:stretch>
+        </p:blipFill>
+        <p:spPr bwMode="auto">
+          <a:xfrm>
+            <a:off x="323528" y="4077072"/>
+            <a:ext cx="5220072" cy="2236453"/>
+          </a:xfrm>
+          <a:prstGeom prst="rect">
+            <a:avLst/>
+          </a:prstGeom>
+          <a:ln>
+            <a:noFill/>
+          </a:ln>
+          <a:effectLst>
+            <a:outerShdw blurRad="292100" dist="139700" dir="2700000" algn="tl" rotWithShape="0">
+              <a:srgbClr val="333333">
+                <a:alpha val="65000"/>
+              </a:srgbClr>
+            </a:outerShdw>
+          </a:effectLst>
+        </p:spPr>
+      </p:pic>
       <p:sp>
         <p:nvSpPr>
           <p:cNvPr id="4" name="Прямоугольник 3"/>
@@ -4325,7 +4544,7 @@
       </p:sp>
       <p:sp>
         <p:nvSpPr>
-          <p:cNvPr id="6" name="Заголовок 1"/>
+          <p:cNvPr id="5" name="Заголовок 1"/>
           <p:cNvSpPr txBox="1">
             <a:spLocks/>
           </p:cNvSpPr>
@@ -4353,7 +4572,7 @@
             </a:pPr>
             <a:r>
               <a:rPr lang="ru-RU" sz="3200" dirty="0" smtClean="0"/>
-              <a:t>Структура базы данных</a:t>
+              <a:t>Пользовательский интерфейс</a:t>
             </a:r>
             <a:endParaRPr kumimoji="0" lang="ru-RU" sz="3200" b="0" i="0" u="none" strike="noStrike" kern="1200" cap="none" spc="0" normalizeH="0" baseline="0" noProof="0" dirty="0" smtClean="0">
               <a:ln>
@@ -4374,14 +4593,16 @@
       </p:sp>
       <p:pic>
         <p:nvPicPr>
-          <p:cNvPr id="5122" name="Picture 2"/>
+          <p:cNvPr id="9" name="Picture 3"/>
           <p:cNvPicPr>
             <a:picLocks noChangeAspect="1" noChangeArrowheads="1"/>
           </p:cNvPicPr>
           <p:nvPr/>
         </p:nvPicPr>
         <p:blipFill>
-          <a:blip r:embed="rId2" cstate="print"/>
+          <a:blip r:embed="rId4" cstate="print">
+            <a:grayscl/>
+          </a:blip>
           <a:srcRect/>
           <a:stretch>
             <a:fillRect/>
@@ -4389,67 +4610,24 @@
         </p:blipFill>
         <p:spPr bwMode="auto">
           <a:xfrm>
-            <a:off x="323528" y="836712"/>
-            <a:ext cx="8568952" cy="5544616"/>
-          </a:xfrm>
-          <a:prstGeom prst="rect">
-            <a:avLst/>
-          </a:prstGeom>
-          <a:noFill/>
-          <a:ln w="9525">
+            <a:off x="3923928" y="1219225"/>
+            <a:ext cx="4990130" cy="3577927"/>
+          </a:xfrm>
+          <a:prstGeom prst="rect">
+            <a:avLst/>
+          </a:prstGeom>
+          <a:ln>
             <a:noFill/>
-            <a:miter lim="800000"/>
-            <a:headEnd/>
-            <a:tailEnd/>
           </a:ln>
+          <a:effectLst>
+            <a:outerShdw blurRad="292100" dist="139700" dir="2700000" algn="tl" rotWithShape="0">
+              <a:srgbClr val="333333">
+                <a:alpha val="65000"/>
+              </a:srgbClr>
+            </a:outerShdw>
+          </a:effectLst>
         </p:spPr>
       </p:pic>
-      <p:sp>
-        <p:nvSpPr>
-          <p:cNvPr id="9" name="Прямоугольник 8"/>
-          <p:cNvSpPr/>
-          <p:nvPr/>
-        </p:nvSpPr>
-        <p:spPr>
-          <a:xfrm flipV="1">
-            <a:off x="4716016" y="4941168"/>
-            <a:ext cx="4176464" cy="1584176"/>
-          </a:xfrm>
-          <a:prstGeom prst="rect">
-            <a:avLst/>
-          </a:prstGeom>
-          <a:noFill/>
-          <a:ln>
-            <a:solidFill>
-              <a:schemeClr val="tx2"/>
-            </a:solidFill>
-          </a:ln>
-        </p:spPr>
-        <p:style>
-          <a:lnRef idx="2">
-            <a:schemeClr val="accent1">
-              <a:shade val="50000"/>
-            </a:schemeClr>
-          </a:lnRef>
-          <a:fillRef idx="1">
-            <a:schemeClr val="accent1"/>
-          </a:fillRef>
-          <a:effectRef idx="0">
-            <a:schemeClr val="accent1"/>
-          </a:effectRef>
-          <a:fontRef idx="minor">
-            <a:schemeClr val="lt1"/>
-          </a:fontRef>
-        </p:style>
-        <p:txBody>
-          <a:bodyPr rtlCol="0" anchor="ctr"/>
-          <a:lstStyle/>
-          <a:p>
-            <a:pPr algn="ctr"/>
-            <a:endParaRPr lang="ru-RU" dirty="0"/>
-          </a:p>
-        </p:txBody>
-      </p:sp>
       <p:sp>
         <p:nvSpPr>
           <p:cNvPr id="8" name="Прямоугольник 7"/>
@@ -4459,7 +4637,7 @@
         <p:spPr>
           <a:xfrm>
             <a:off x="179512" y="764704"/>
-            <a:ext cx="4320480" cy="5688632"/>
+            <a:ext cx="8784976" cy="5688632"/>
           </a:xfrm>
           <a:prstGeom prst="rect">
             <a:avLst/>
@@ -4498,215 +4676,16 @@
           </a:p>
         </p:txBody>
       </p:sp>
-      <p:sp>
-        <p:nvSpPr>
-          <p:cNvPr id="7" name="Овал 6"/>
-          <p:cNvSpPr/>
-          <p:nvPr/>
-        </p:nvSpPr>
-        <p:spPr>
-          <a:xfrm>
-            <a:off x="4499992" y="4797152"/>
-            <a:ext cx="360040" cy="360040"/>
-          </a:xfrm>
-          <a:prstGeom prst="ellipse">
-            <a:avLst/>
-          </a:prstGeom>
-          <a:solidFill>
-            <a:schemeClr val="bg1"/>
-          </a:solidFill>
-          <a:ln>
-            <a:solidFill>
-              <a:schemeClr val="tx2"/>
-            </a:solidFill>
-          </a:ln>
-        </p:spPr>
-        <p:style>
-          <a:lnRef idx="2">
-            <a:schemeClr val="accent1">
-              <a:shade val="50000"/>
-            </a:schemeClr>
-          </a:lnRef>
-          <a:fillRef idx="1">
-            <a:schemeClr val="accent1"/>
-          </a:fillRef>
-          <a:effectRef idx="0">
-            <a:schemeClr val="accent1"/>
-          </a:effectRef>
-          <a:fontRef idx="minor">
-            <a:schemeClr val="lt1"/>
-          </a:fontRef>
-        </p:style>
-        <p:txBody>
-          <a:bodyPr rtlCol="0" anchor="ctr"/>
-          <a:lstStyle/>
-          <a:p>
-            <a:pPr algn="ctr"/>
-            <a:r>
-              <a:rPr lang="ru-RU" b="1" dirty="0" smtClean="0">
-                <a:solidFill>
-                  <a:schemeClr val="tx1"/>
-                </a:solidFill>
-              </a:rPr>
-              <a:t>4</a:t>
-            </a:r>
-            <a:endParaRPr lang="ru-RU" b="1" dirty="0">
-              <a:solidFill>
-                <a:schemeClr val="tx1"/>
-              </a:solidFill>
-            </a:endParaRPr>
-          </a:p>
-        </p:txBody>
-      </p:sp>
-      <p:sp>
-        <p:nvSpPr>
-          <p:cNvPr id="10" name="Прямоугольник 9"/>
-          <p:cNvSpPr/>
-          <p:nvPr/>
-        </p:nvSpPr>
-        <p:spPr>
-          <a:xfrm>
-            <a:off x="4823520" y="836712"/>
-            <a:ext cx="4068960" cy="4032448"/>
-          </a:xfrm>
-          <a:prstGeom prst="rect">
-            <a:avLst/>
-          </a:prstGeom>
-          <a:solidFill>
-            <a:srgbClr val="FFFFFF">
-              <a:alpha val="60000"/>
-            </a:srgbClr>
-          </a:solidFill>
-          <a:ln>
-            <a:noFill/>
-          </a:ln>
-        </p:spPr>
-        <p:style>
-          <a:lnRef idx="2">
-            <a:schemeClr val="accent1">
-              <a:shade val="50000"/>
-            </a:schemeClr>
-          </a:lnRef>
-          <a:fillRef idx="1">
-            <a:schemeClr val="accent1"/>
-          </a:fillRef>
-          <a:effectRef idx="0">
-            <a:schemeClr val="accent1"/>
-          </a:effectRef>
-          <a:fontRef idx="minor">
-            <a:schemeClr val="lt1"/>
-          </a:fontRef>
-        </p:style>
-        <p:txBody>
-          <a:bodyPr rtlCol="0" anchor="ctr"/>
-          <a:lstStyle/>
-          <a:p>
-            <a:pPr algn="ctr"/>
-            <a:endParaRPr lang="ru-RU" dirty="0"/>
-          </a:p>
-        </p:txBody>
-      </p:sp>
-      <p:sp>
-        <p:nvSpPr>
-          <p:cNvPr id="11" name="Прямоугольник 10"/>
-          <p:cNvSpPr/>
-          <p:nvPr/>
-        </p:nvSpPr>
-        <p:spPr>
-          <a:xfrm>
-            <a:off x="4860032" y="5013176"/>
-            <a:ext cx="3401957" cy="338554"/>
-          </a:xfrm>
-          <a:prstGeom prst="rect">
-            <a:avLst/>
-          </a:prstGeom>
-        </p:spPr>
-        <p:txBody>
-          <a:bodyPr wrap="none">
-            <a:spAutoFit/>
-          </a:bodyPr>
-          <a:lstStyle/>
-          <a:p>
-            <a:r>
-              <a:rPr lang="ru-RU" sz="1600" b="1" dirty="0" smtClean="0"/>
-              <a:t>Взаимодействие с базой данных ОУ</a:t>
-            </a:r>
-            <a:endParaRPr lang="ru-RU" sz="1600" b="1" dirty="0"/>
-          </a:p>
-        </p:txBody>
-      </p:sp>
-      <p:sp>
-        <p:nvSpPr>
-          <p:cNvPr id="14" name="Прямоугольник 13"/>
-          <p:cNvSpPr/>
-          <p:nvPr/>
-        </p:nvSpPr>
-        <p:spPr>
-          <a:xfrm>
-            <a:off x="5626937" y="6176337"/>
-            <a:ext cx="842475" cy="276999"/>
-          </a:xfrm>
-          <a:prstGeom prst="rect">
-            <a:avLst/>
-          </a:prstGeom>
-        </p:spPr>
-        <p:txBody>
-          <a:bodyPr wrap="none">
-            <a:spAutoFit/>
-          </a:bodyPr>
-          <a:lstStyle/>
-          <a:p>
-            <a:r>
-              <a:rPr lang="en-US" sz="1200" b="1" dirty="0" smtClean="0"/>
-              <a:t>80 </a:t>
-            </a:r>
-            <a:r>
-              <a:rPr lang="ru-RU" sz="1200" b="1" dirty="0" smtClean="0"/>
-              <a:t>таблиц</a:t>
-            </a:r>
-            <a:endParaRPr lang="ru-RU" sz="1200" dirty="0"/>
-          </a:p>
-        </p:txBody>
-      </p:sp>
-      <p:sp>
-        <p:nvSpPr>
-          <p:cNvPr id="15" name="Прямоугольник 14"/>
-          <p:cNvSpPr/>
-          <p:nvPr/>
-        </p:nvSpPr>
-        <p:spPr>
-          <a:xfrm>
-            <a:off x="7452320" y="6165304"/>
-            <a:ext cx="842475" cy="276999"/>
-          </a:xfrm>
-          <a:prstGeom prst="rect">
-            <a:avLst/>
-          </a:prstGeom>
-        </p:spPr>
-        <p:txBody>
-          <a:bodyPr wrap="none">
-            <a:spAutoFit/>
-          </a:bodyPr>
-          <a:lstStyle/>
-          <a:p>
-            <a:r>
-              <a:rPr lang="ru-RU" sz="1200" b="1" dirty="0" smtClean="0"/>
-              <a:t>15 таблиц</a:t>
-            </a:r>
-            <a:endParaRPr lang="ru-RU" sz="1200" dirty="0"/>
-          </a:p>
-        </p:txBody>
-      </p:sp>
       <p:pic>
         <p:nvPicPr>
-          <p:cNvPr id="16" name="Picture 8" descr="http://okna-nice.ru/images/okna_v_panelnii_dom.png"/>
+          <p:cNvPr id="4098" name="Picture 2"/>
           <p:cNvPicPr>
             <a:picLocks noChangeAspect="1" noChangeArrowheads="1"/>
           </p:cNvPicPr>
           <p:nvPr/>
         </p:nvPicPr>
         <p:blipFill>
-          <a:blip r:embed="rId3" cstate="print"/>
+          <a:blip r:embed="rId5" cstate="print"/>
           <a:srcRect/>
           <a:stretch>
             <a:fillRect/>
@@ -4714,39 +4693,22 @@
         </p:blipFill>
         <p:spPr bwMode="auto">
           <a:xfrm>
-            <a:off x="5436096" y="5373216"/>
-            <a:ext cx="1224136" cy="918102"/>
-          </a:xfrm>
-          <a:prstGeom prst="rect">
-            <a:avLst/>
-          </a:prstGeom>
-          <a:noFill/>
-        </p:spPr>
-      </p:pic>
-      <p:pic>
-        <p:nvPicPr>
-          <p:cNvPr id="21508" name="Picture 4" descr="http://files.softicons.com/download/business-icons/desktop-business-icons-by-aha-soft/png/256x256/case.png"/>
-          <p:cNvPicPr>
-            <a:picLocks noChangeAspect="1" noChangeArrowheads="1"/>
-          </p:cNvPicPr>
-          <p:nvPr/>
-        </p:nvPicPr>
-        <p:blipFill>
-          <a:blip r:embed="rId4" cstate="print"/>
-          <a:srcRect/>
-          <a:stretch>
-            <a:fillRect/>
-          </a:stretch>
-        </p:blipFill>
-        <p:spPr bwMode="auto">
-          <a:xfrm>
-            <a:off x="7380312" y="5301208"/>
-            <a:ext cx="998240" cy="998240"/>
-          </a:xfrm>
-          <a:prstGeom prst="rect">
-            <a:avLst/>
-          </a:prstGeom>
-          <a:noFill/>
+            <a:off x="395536" y="836712"/>
+            <a:ext cx="7409872" cy="4968552"/>
+          </a:xfrm>
+          <a:prstGeom prst="rect">
+            <a:avLst/>
+          </a:prstGeom>
+          <a:ln>
+            <a:noFill/>
+          </a:ln>
+          <a:effectLst>
+            <a:outerShdw blurRad="292100" dist="139700" dir="2700000" algn="tl" rotWithShape="0">
+              <a:srgbClr val="333333">
+                <a:alpha val="65000"/>
+              </a:srgbClr>
+            </a:outerShdw>
+          </a:effectLst>
         </p:spPr>
       </p:pic>
     </p:spTree>
@@ -4945,7 +4907,7 @@
       </p:sp>
       <p:pic>
         <p:nvPicPr>
-          <p:cNvPr id="9" name="Picture 3"/>
+          <p:cNvPr id="4098" name="Picture 2"/>
           <p:cNvPicPr>
             <a:picLocks noChangeAspect="1" noChangeArrowheads="1"/>
           </p:cNvPicPr>
@@ -4962,8 +4924,8 @@
         </p:blipFill>
         <p:spPr bwMode="auto">
           <a:xfrm>
-            <a:off x="3923928" y="1219225"/>
-            <a:ext cx="4990130" cy="3577927"/>
+            <a:off x="395536" y="836712"/>
+            <a:ext cx="5476862" cy="3672408"/>
           </a:xfrm>
           <a:prstGeom prst="rect">
             <a:avLst/>
@@ -5030,7 +4992,7 @@
       </p:sp>
       <p:pic>
         <p:nvPicPr>
-          <p:cNvPr id="4098" name="Picture 2"/>
+          <p:cNvPr id="9" name="Picture 3"/>
           <p:cNvPicPr>
             <a:picLocks noChangeAspect="1" noChangeArrowheads="1"/>
           </p:cNvPicPr>
@@ -5045,8 +5007,8 @@
         </p:blipFill>
         <p:spPr bwMode="auto">
           <a:xfrm>
-            <a:off x="395536" y="836712"/>
-            <a:ext cx="7409872" cy="4968552"/>
+            <a:off x="1475656" y="856446"/>
+            <a:ext cx="7438402" cy="5333339"/>
           </a:xfrm>
           <a:prstGeom prst="rect">
             <a:avLst/>
@@ -5130,43 +5092,6 @@
           </a:effectLst>
         </p:spPr>
       </p:pic>
-      <p:pic>
-        <p:nvPicPr>
-          <p:cNvPr id="4100" name="Picture 4"/>
-          <p:cNvPicPr>
-            <a:picLocks noChangeAspect="1" noChangeArrowheads="1"/>
-          </p:cNvPicPr>
-          <p:nvPr/>
-        </p:nvPicPr>
-        <p:blipFill>
-          <a:blip r:embed="rId3" cstate="print">
-            <a:grayscl/>
-          </a:blip>
-          <a:srcRect/>
-          <a:stretch>
-            <a:fillRect/>
-          </a:stretch>
-        </p:blipFill>
-        <p:spPr bwMode="auto">
-          <a:xfrm>
-            <a:off x="323528" y="4077072"/>
-            <a:ext cx="5220072" cy="2236453"/>
-          </a:xfrm>
-          <a:prstGeom prst="rect">
-            <a:avLst/>
-          </a:prstGeom>
-          <a:ln>
-            <a:noFill/>
-          </a:ln>
-          <a:effectLst>
-            <a:outerShdw blurRad="292100" dist="139700" dir="2700000" algn="tl" rotWithShape="0">
-              <a:srgbClr val="333333">
-                <a:alpha val="65000"/>
-              </a:srgbClr>
-            </a:outerShdw>
-          </a:effectLst>
-        </p:spPr>
-      </p:pic>
       <p:sp>
         <p:nvSpPr>
           <p:cNvPr id="4" name="Прямоугольник 3"/>
@@ -5266,7 +5191,7 @@
           <p:nvPr/>
         </p:nvPicPr>
         <p:blipFill>
-          <a:blip r:embed="rId4" cstate="print">
+          <a:blip r:embed="rId3" cstate="print">
             <a:grayscl/>
           </a:blip>
           <a:srcRect/>
@@ -5276,7 +5201,7 @@
         </p:blipFill>
         <p:spPr bwMode="auto">
           <a:xfrm>
-            <a:off x="395536" y="836712"/>
+            <a:off x="179512" y="908720"/>
             <a:ext cx="5476862" cy="3672408"/>
           </a:xfrm>
           <a:prstGeom prst="rect">
@@ -5294,6 +5219,43 @@
           </a:effectLst>
         </p:spPr>
       </p:pic>
+      <p:pic>
+        <p:nvPicPr>
+          <p:cNvPr id="9" name="Picture 3"/>
+          <p:cNvPicPr>
+            <a:picLocks noChangeAspect="1" noChangeArrowheads="1"/>
+          </p:cNvPicPr>
+          <p:nvPr/>
+        </p:nvPicPr>
+        <p:blipFill>
+          <a:blip r:embed="rId4" cstate="print">
+            <a:grayscl/>
+          </a:blip>
+          <a:srcRect/>
+          <a:stretch>
+            <a:fillRect/>
+          </a:stretch>
+        </p:blipFill>
+        <p:spPr bwMode="auto">
+          <a:xfrm>
+            <a:off x="3491880" y="856447"/>
+            <a:ext cx="5422178" cy="3887705"/>
+          </a:xfrm>
+          <a:prstGeom prst="rect">
+            <a:avLst/>
+          </a:prstGeom>
+          <a:ln>
+            <a:noFill/>
+          </a:ln>
+          <a:effectLst>
+            <a:outerShdw blurRad="292100" dist="139700" dir="2700000" algn="tl" rotWithShape="0">
+              <a:srgbClr val="333333">
+                <a:alpha val="65000"/>
+              </a:srgbClr>
+            </a:outerShdw>
+          </a:effectLst>
+        </p:spPr>
+      </p:pic>
       <p:sp>
         <p:nvSpPr>
           <p:cNvPr id="8" name="Прямоугольник 7"/>
@@ -5344,7 +5306,7 @@
       </p:sp>
       <p:pic>
         <p:nvPicPr>
-          <p:cNvPr id="9" name="Picture 3"/>
+          <p:cNvPr id="4100" name="Picture 4"/>
           <p:cNvPicPr>
             <a:picLocks noChangeAspect="1" noChangeArrowheads="1"/>
           </p:cNvPicPr>
@@ -5359,8 +5321,8 @@
         </p:blipFill>
         <p:spPr bwMode="auto">
           <a:xfrm>
-            <a:off x="1475656" y="856446"/>
-            <a:ext cx="7438402" cy="5333339"/>
+            <a:off x="251520" y="2140233"/>
+            <a:ext cx="8496944" cy="3813252"/>
           </a:xfrm>
           <a:prstGeom prst="rect">
             <a:avLst/>
@@ -5411,8 +5373,10 @@
       </p:grpSpPr>
       <p:pic>
         <p:nvPicPr>
-          <p:cNvPr id="12" name="Рисунок 11"/>
-          <p:cNvPicPr/>
+          <p:cNvPr id="4100" name="Picture 4"/>
+          <p:cNvPicPr>
+            <a:picLocks noChangeAspect="1" noChangeArrowheads="1"/>
+          </p:cNvPicPr>
           <p:nvPr/>
         </p:nvPicPr>
         <p:blipFill>
@@ -5426,8 +5390,8 @@
         </p:blipFill>
         <p:spPr bwMode="auto">
           <a:xfrm>
-            <a:off x="2657533" y="2924944"/>
-            <a:ext cx="6162939" cy="3275938"/>
+            <a:off x="323528" y="4077072"/>
+            <a:ext cx="5220072" cy="2236453"/>
           </a:xfrm>
           <a:prstGeom prst="rect">
             <a:avLst/>
@@ -5553,7 +5517,7 @@
         </p:blipFill>
         <p:spPr bwMode="auto">
           <a:xfrm>
-            <a:off x="179512" y="908720"/>
+            <a:off x="395536" y="836712"/>
             <a:ext cx="5476862" cy="3672408"/>
           </a:xfrm>
           <a:prstGeom prst="rect">
@@ -5580,9 +5544,7 @@
           <p:nvPr/>
         </p:nvPicPr>
         <p:blipFill>
-          <a:blip r:embed="rId4" cstate="print">
-            <a:grayscl/>
-          </a:blip>
+          <a:blip r:embed="rId4" cstate="print"/>
           <a:srcRect/>
           <a:stretch>
             <a:fillRect/>
@@ -5590,8 +5552,8 @@
         </p:blipFill>
         <p:spPr bwMode="auto">
           <a:xfrm>
-            <a:off x="3491880" y="856447"/>
-            <a:ext cx="5422178" cy="3887705"/>
+            <a:off x="3779912" y="856448"/>
+            <a:ext cx="5134146" cy="3681186"/>
           </a:xfrm>
           <a:prstGeom prst="rect">
             <a:avLst/>
@@ -5658,10 +5620,8 @@
       </p:sp>
       <p:pic>
         <p:nvPicPr>
-          <p:cNvPr id="4100" name="Picture 4"/>
-          <p:cNvPicPr>
-            <a:picLocks noChangeAspect="1" noChangeArrowheads="1"/>
-          </p:cNvPicPr>
+          <p:cNvPr id="12" name="Рисунок 11"/>
+          <p:cNvPicPr/>
           <p:nvPr/>
         </p:nvPicPr>
         <p:blipFill>
@@ -5673,8 +5633,8 @@
         </p:blipFill>
         <p:spPr bwMode="auto">
           <a:xfrm>
-            <a:off x="251520" y="2140233"/>
-            <a:ext cx="8496944" cy="3813252"/>
+            <a:off x="539553" y="1484784"/>
+            <a:ext cx="8352928" cy="4716098"/>
           </a:xfrm>
           <a:prstGeom prst="rect">
             <a:avLst/>
@@ -5723,46 +5683,39 @@
           <a:chExt cx="0" cy="0"/>
         </a:xfrm>
       </p:grpSpPr>
-      <p:pic>
-        <p:nvPicPr>
-          <p:cNvPr id="4100" name="Picture 4"/>
-          <p:cNvPicPr>
-            <a:picLocks noChangeAspect="1" noChangeArrowheads="1"/>
-          </p:cNvPicPr>
-          <p:nvPr/>
-        </p:nvPicPr>
-        <p:blipFill>
-          <a:blip r:embed="rId2" cstate="print">
-            <a:grayscl/>
-          </a:blip>
-          <a:srcRect/>
-          <a:stretch>
-            <a:fillRect/>
-          </a:stretch>
-        </p:blipFill>
-        <p:spPr bwMode="auto">
-          <a:xfrm>
-            <a:off x="323528" y="4077072"/>
-            <a:ext cx="5220072" cy="2236453"/>
-          </a:xfrm>
-          <a:prstGeom prst="rect">
-            <a:avLst/>
-          </a:prstGeom>
-          <a:ln>
-            <a:noFill/>
-          </a:ln>
-          <a:effectLst>
-            <a:outerShdw blurRad="292100" dist="139700" dir="2700000" algn="tl" rotWithShape="0">
-              <a:srgbClr val="333333">
-                <a:alpha val="65000"/>
-              </a:srgbClr>
-            </a:outerShdw>
-          </a:effectLst>
-        </p:spPr>
-      </p:pic>
-      <p:sp>
-        <p:nvSpPr>
-          <p:cNvPr id="4" name="Прямоугольник 3"/>
+      <p:sp>
+        <p:nvSpPr>
+          <p:cNvPr id="4" name="Заголовок 1"/>
+          <p:cNvSpPr>
+            <a:spLocks noGrp="1"/>
+          </p:cNvSpPr>
+          <p:nvPr>
+            <p:ph type="title"/>
+          </p:nvPr>
+        </p:nvSpPr>
+        <p:spPr>
+          <a:xfrm>
+            <a:off x="457200" y="116632"/>
+            <a:ext cx="8229600" cy="648072"/>
+          </a:xfrm>
+        </p:spPr>
+        <p:txBody>
+          <a:bodyPr>
+            <a:normAutofit/>
+          </a:bodyPr>
+          <a:lstStyle/>
+          <a:p>
+            <a:r>
+              <a:rPr lang="ru-RU" sz="3200" dirty="0" smtClean="0"/>
+              <a:t>Использованные технологии и аналоги</a:t>
+            </a:r>
+            <a:endParaRPr lang="ru-RU" sz="3200" dirty="0"/>
+          </a:p>
+        </p:txBody>
+      </p:sp>
+      <p:sp>
+        <p:nvSpPr>
+          <p:cNvPr id="5" name="Прямоугольник 4"/>
           <p:cNvSpPr/>
           <p:nvPr/>
         </p:nvSpPr>
@@ -5801,67 +5754,16 @@
           </a:p>
         </p:txBody>
       </p:sp>
-      <p:sp>
-        <p:nvSpPr>
-          <p:cNvPr id="5" name="Заголовок 1"/>
-          <p:cNvSpPr txBox="1">
-            <a:spLocks/>
-          </p:cNvSpPr>
-          <p:nvPr/>
-        </p:nvSpPr>
-        <p:spPr>
-          <a:xfrm>
-            <a:off x="457200" y="116632"/>
-            <a:ext cx="8229600" cy="648072"/>
-          </a:xfrm>
-          <a:prstGeom prst="rect">
-            <a:avLst/>
-          </a:prstGeom>
-        </p:spPr>
-        <p:txBody>
-          <a:bodyPr vert="horz" lIns="91440" tIns="45720" rIns="91440" bIns="45720" rtlCol="0" anchor="ctr">
-            <a:normAutofit/>
-          </a:bodyPr>
-          <a:lstStyle/>
-          <a:p>
-            <a:pPr lvl="0" algn="ctr">
-              <a:spcBef>
-                <a:spcPct val="0"/>
-              </a:spcBef>
-            </a:pPr>
-            <a:r>
-              <a:rPr lang="ru-RU" sz="3200" dirty="0" smtClean="0"/>
-              <a:t>Пользовательский интерфейс</a:t>
-            </a:r>
-            <a:endParaRPr kumimoji="0" lang="ru-RU" sz="3200" b="0" i="0" u="none" strike="noStrike" kern="1200" cap="none" spc="0" normalizeH="0" baseline="0" noProof="0" dirty="0" smtClean="0">
-              <a:ln>
-                <a:noFill/>
-              </a:ln>
-              <a:solidFill>
-                <a:schemeClr val="tx1"/>
-              </a:solidFill>
-              <a:effectLst/>
-              <a:uLnTx/>
-              <a:uFillTx/>
-              <a:latin typeface="+mj-lt"/>
-              <a:ea typeface="+mj-ea"/>
-              <a:cs typeface="+mj-cs"/>
-            </a:endParaRPr>
-          </a:p>
-        </p:txBody>
-      </p:sp>
       <p:pic>
         <p:nvPicPr>
-          <p:cNvPr id="4098" name="Picture 2"/>
+          <p:cNvPr id="28676" name="Picture 4" descr="http://www.nareshit.in/wp-content/uploads/2013/07/Wcf.png"/>
           <p:cNvPicPr>
             <a:picLocks noChangeAspect="1" noChangeArrowheads="1"/>
           </p:cNvPicPr>
           <p:nvPr/>
         </p:nvPicPr>
         <p:blipFill>
-          <a:blip r:embed="rId3" cstate="print">
-            <a:grayscl/>
-          </a:blip>
+          <a:blip r:embed="rId2" cstate="print"/>
           <a:srcRect/>
           <a:stretch>
             <a:fillRect/>
@@ -5869,27 +5771,104 @@
         </p:blipFill>
         <p:spPr bwMode="auto">
           <a:xfrm>
-            <a:off x="395536" y="836712"/>
-            <a:ext cx="5476862" cy="3672408"/>
-          </a:xfrm>
-          <a:prstGeom prst="rect">
-            <a:avLst/>
-          </a:prstGeom>
-          <a:ln>
-            <a:noFill/>
-          </a:ln>
-          <a:effectLst>
-            <a:outerShdw blurRad="292100" dist="139700" dir="2700000" algn="tl" rotWithShape="0">
-              <a:srgbClr val="333333">
-                <a:alpha val="65000"/>
-              </a:srgbClr>
-            </a:outerShdw>
-          </a:effectLst>
+            <a:off x="611560" y="2420887"/>
+            <a:ext cx="1944216" cy="1105535"/>
+          </a:xfrm>
+          <a:prstGeom prst="rect">
+            <a:avLst/>
+          </a:prstGeom>
+          <a:noFill/>
         </p:spPr>
       </p:pic>
       <p:pic>
         <p:nvPicPr>
-          <p:cNvPr id="9" name="Picture 3"/>
+          <p:cNvPr id="28678" name="Picture 6" descr="http://pressdev.ru/wp-content/uploads/2013/10/ms-sql-server-300x246.png"/>
+          <p:cNvPicPr>
+            <a:picLocks noChangeAspect="1" noChangeArrowheads="1"/>
+          </p:cNvPicPr>
+          <p:nvPr/>
+        </p:nvPicPr>
+        <p:blipFill>
+          <a:blip r:embed="rId3" cstate="print"/>
+          <a:srcRect/>
+          <a:stretch>
+            <a:fillRect/>
+          </a:stretch>
+        </p:blipFill>
+        <p:spPr bwMode="auto">
+          <a:xfrm>
+            <a:off x="611560" y="4797151"/>
+            <a:ext cx="2016224" cy="1653305"/>
+          </a:xfrm>
+          <a:prstGeom prst="rect">
+            <a:avLst/>
+          </a:prstGeom>
+          <a:noFill/>
+        </p:spPr>
+      </p:pic>
+      <p:sp>
+        <p:nvSpPr>
+          <p:cNvPr id="28684" name="AutoShape 12" descr="http://ohdoylerules.com/content/images/css3.svg"/>
+          <p:cNvSpPr>
+            <a:spLocks noChangeAspect="1" noChangeArrowheads="1"/>
+          </p:cNvSpPr>
+          <p:nvPr/>
+        </p:nvSpPr>
+        <p:spPr bwMode="auto">
+          <a:xfrm>
+            <a:off x="155575" y="-144463"/>
+            <a:ext cx="304800" cy="304801"/>
+          </a:xfrm>
+          <a:prstGeom prst="rect">
+            <a:avLst/>
+          </a:prstGeom>
+          <a:noFill/>
+        </p:spPr>
+        <p:txBody>
+          <a:bodyPr vert="horz" wrap="square" lIns="91440" tIns="45720" rIns="91440" bIns="45720" numCol="1" anchor="t" anchorCtr="0" compatLnSpc="1">
+            <a:prstTxWarp prst="textNoShape">
+              <a:avLst/>
+            </a:prstTxWarp>
+          </a:bodyPr>
+          <a:lstStyle/>
+          <a:p>
+            <a:endParaRPr lang="ru-RU"/>
+          </a:p>
+        </p:txBody>
+      </p:sp>
+      <p:sp>
+        <p:nvSpPr>
+          <p:cNvPr id="28686" name="AutoShape 14" descr="http://ohdoylerules.com/content/images/css3.svg"/>
+          <p:cNvSpPr>
+            <a:spLocks noChangeAspect="1" noChangeArrowheads="1"/>
+          </p:cNvSpPr>
+          <p:nvPr/>
+        </p:nvSpPr>
+        <p:spPr bwMode="auto">
+          <a:xfrm>
+            <a:off x="155575" y="-144463"/>
+            <a:ext cx="304800" cy="304801"/>
+          </a:xfrm>
+          <a:prstGeom prst="rect">
+            <a:avLst/>
+          </a:prstGeom>
+          <a:noFill/>
+        </p:spPr>
+        <p:txBody>
+          <a:bodyPr vert="horz" wrap="square" lIns="91440" tIns="45720" rIns="91440" bIns="45720" numCol="1" anchor="t" anchorCtr="0" compatLnSpc="1">
+            <a:prstTxWarp prst="textNoShape">
+              <a:avLst/>
+            </a:prstTxWarp>
+          </a:bodyPr>
+          <a:lstStyle/>
+          <a:p>
+            <a:endParaRPr lang="ru-RU"/>
+          </a:p>
+        </p:txBody>
+      </p:sp>
+      <p:pic>
+        <p:nvPicPr>
+          <p:cNvPr id="28690" name="Picture 18" descr="http://www.codeproject.com/Learn/MVC/images/MVClogo.png"/>
           <p:cNvPicPr>
             <a:picLocks noChangeAspect="1" noChangeArrowheads="1"/>
           </p:cNvPicPr>
@@ -5904,76 +5883,21 @@
         </p:blipFill>
         <p:spPr bwMode="auto">
           <a:xfrm>
-            <a:off x="3779912" y="856448"/>
-            <a:ext cx="5134146" cy="3681186"/>
-          </a:xfrm>
-          <a:prstGeom prst="rect">
-            <a:avLst/>
-          </a:prstGeom>
-          <a:ln>
-            <a:noFill/>
-          </a:ln>
-          <a:effectLst>
-            <a:outerShdw blurRad="292100" dist="139700" dir="2700000" algn="tl" rotWithShape="0">
-              <a:srgbClr val="333333">
-                <a:alpha val="65000"/>
-              </a:srgbClr>
-            </a:outerShdw>
-          </a:effectLst>
+            <a:off x="683568" y="3573016"/>
+            <a:ext cx="1800200" cy="1242392"/>
+          </a:xfrm>
+          <a:prstGeom prst="rect">
+            <a:avLst/>
+          </a:prstGeom>
+          <a:noFill/>
         </p:spPr>
       </p:pic>
-      <p:sp>
-        <p:nvSpPr>
-          <p:cNvPr id="8" name="Прямоугольник 7"/>
-          <p:cNvSpPr/>
-          <p:nvPr/>
-        </p:nvSpPr>
-        <p:spPr>
-          <a:xfrm>
-            <a:off x="179512" y="764704"/>
-            <a:ext cx="8784976" cy="5688632"/>
-          </a:xfrm>
-          <a:prstGeom prst="rect">
-            <a:avLst/>
-          </a:prstGeom>
-          <a:solidFill>
-            <a:srgbClr val="FFFFFF">
-              <a:alpha val="60000"/>
-            </a:srgbClr>
-          </a:solidFill>
-          <a:ln>
-            <a:noFill/>
-          </a:ln>
-        </p:spPr>
-        <p:style>
-          <a:lnRef idx="2">
-            <a:schemeClr val="accent1">
-              <a:shade val="50000"/>
-            </a:schemeClr>
-          </a:lnRef>
-          <a:fillRef idx="1">
-            <a:schemeClr val="accent1"/>
-          </a:fillRef>
-          <a:effectRef idx="0">
-            <a:schemeClr val="accent1"/>
-          </a:effectRef>
-          <a:fontRef idx="minor">
-            <a:schemeClr val="lt1"/>
-          </a:fontRef>
-        </p:style>
-        <p:txBody>
-          <a:bodyPr rtlCol="0" anchor="ctr"/>
-          <a:lstStyle/>
-          <a:p>
-            <a:pPr algn="ctr"/>
-            <a:endParaRPr lang="ru-RU" dirty="0"/>
-          </a:p>
-        </p:txBody>
-      </p:sp>
       <p:pic>
         <p:nvPicPr>
-          <p:cNvPr id="12" name="Рисунок 11"/>
-          <p:cNvPicPr/>
+          <p:cNvPr id="28698" name="Picture 26" descr="http://www.softreactor.ru/sites/default/files/image/node_pics/11/razrabotki_c%23.png"/>
+          <p:cNvPicPr>
+            <a:picLocks noChangeAspect="1" noChangeArrowheads="1"/>
+          </p:cNvPicPr>
           <p:nvPr/>
         </p:nvPicPr>
         <p:blipFill>
@@ -5985,22 +5909,247 @@
         </p:blipFill>
         <p:spPr bwMode="auto">
           <a:xfrm>
-            <a:off x="539553" y="1484784"/>
-            <a:ext cx="8352928" cy="4716098"/>
-          </a:xfrm>
-          <a:prstGeom prst="rect">
-            <a:avLst/>
-          </a:prstGeom>
+            <a:off x="683568" y="980728"/>
+            <a:ext cx="1800200" cy="1427556"/>
+          </a:xfrm>
+          <a:prstGeom prst="rect">
+            <a:avLst/>
+          </a:prstGeom>
+          <a:noFill/>
+        </p:spPr>
+      </p:pic>
+      <p:sp>
+        <p:nvSpPr>
+          <p:cNvPr id="19" name="Прямоугольник 18"/>
+          <p:cNvSpPr/>
+          <p:nvPr/>
+        </p:nvSpPr>
+        <p:spPr>
+          <a:xfrm>
+            <a:off x="323528" y="764704"/>
+            <a:ext cx="2664296" cy="5760640"/>
+          </a:xfrm>
+          <a:prstGeom prst="rect">
+            <a:avLst/>
+          </a:prstGeom>
+          <a:noFill/>
           <a:ln>
+            <a:solidFill>
+              <a:schemeClr val="tx2"/>
+            </a:solidFill>
+          </a:ln>
+        </p:spPr>
+        <p:style>
+          <a:lnRef idx="2">
+            <a:schemeClr val="accent1">
+              <a:shade val="50000"/>
+            </a:schemeClr>
+          </a:lnRef>
+          <a:fillRef idx="1">
+            <a:schemeClr val="accent1"/>
+          </a:fillRef>
+          <a:effectRef idx="0">
+            <a:schemeClr val="accent1"/>
+          </a:effectRef>
+          <a:fontRef idx="minor">
+            <a:schemeClr val="lt1"/>
+          </a:fontRef>
+        </p:style>
+        <p:txBody>
+          <a:bodyPr rtlCol="0" anchor="ctr"/>
+          <a:lstStyle/>
+          <a:p>
+            <a:pPr algn="ctr"/>
+            <a:endParaRPr lang="ru-RU" dirty="0"/>
+          </a:p>
+        </p:txBody>
+      </p:sp>
+      <p:sp>
+        <p:nvSpPr>
+          <p:cNvPr id="20" name="Овал 19"/>
+          <p:cNvSpPr/>
+          <p:nvPr/>
+        </p:nvSpPr>
+        <p:spPr>
+          <a:xfrm>
+            <a:off x="179512" y="620688"/>
+            <a:ext cx="360040" cy="360040"/>
+          </a:xfrm>
+          <a:prstGeom prst="ellipse">
+            <a:avLst/>
+          </a:prstGeom>
+          <a:solidFill>
+            <a:schemeClr val="bg1"/>
+          </a:solidFill>
+        </p:spPr>
+        <p:style>
+          <a:lnRef idx="2">
+            <a:schemeClr val="accent1">
+              <a:shade val="50000"/>
+            </a:schemeClr>
+          </a:lnRef>
+          <a:fillRef idx="1">
+            <a:schemeClr val="accent1"/>
+          </a:fillRef>
+          <a:effectRef idx="0">
+            <a:schemeClr val="accent1"/>
+          </a:effectRef>
+          <a:fontRef idx="minor">
+            <a:schemeClr val="lt1"/>
+          </a:fontRef>
+        </p:style>
+        <p:txBody>
+          <a:bodyPr rtlCol="0" anchor="ctr"/>
+          <a:lstStyle/>
+          <a:p>
+            <a:pPr algn="ctr"/>
+            <a:r>
+              <a:rPr lang="en-US" b="1" dirty="0" smtClean="0">
+                <a:solidFill>
+                  <a:schemeClr val="tx1"/>
+                </a:solidFill>
+              </a:rPr>
+              <a:t>1</a:t>
+            </a:r>
+            <a:endParaRPr lang="ru-RU" b="1" dirty="0">
+              <a:solidFill>
+                <a:schemeClr val="tx1"/>
+              </a:solidFill>
+            </a:endParaRPr>
+          </a:p>
+        </p:txBody>
+      </p:sp>
+      <p:sp>
+        <p:nvSpPr>
+          <p:cNvPr id="23" name="Прямоугольник 22"/>
+          <p:cNvSpPr/>
+          <p:nvPr/>
+        </p:nvSpPr>
+        <p:spPr>
+          <a:xfrm>
+            <a:off x="3347864" y="764704"/>
+            <a:ext cx="5472608" cy="5760640"/>
+          </a:xfrm>
+          <a:prstGeom prst="rect">
+            <a:avLst/>
+          </a:prstGeom>
+          <a:noFill/>
+          <a:ln>
+            <a:solidFill>
+              <a:schemeClr val="tx2"/>
+            </a:solidFill>
+          </a:ln>
+        </p:spPr>
+        <p:style>
+          <a:lnRef idx="2">
+            <a:schemeClr val="accent1">
+              <a:shade val="50000"/>
+            </a:schemeClr>
+          </a:lnRef>
+          <a:fillRef idx="1">
+            <a:schemeClr val="accent1"/>
+          </a:fillRef>
+          <a:effectRef idx="0">
+            <a:schemeClr val="accent1"/>
+          </a:effectRef>
+          <a:fontRef idx="minor">
+            <a:schemeClr val="lt1"/>
+          </a:fontRef>
+        </p:style>
+        <p:txBody>
+          <a:bodyPr rtlCol="0" anchor="ctr"/>
+          <a:lstStyle/>
+          <a:p>
+            <a:pPr algn="ctr"/>
+            <a:endParaRPr lang="ru-RU" dirty="0"/>
+          </a:p>
+        </p:txBody>
+      </p:sp>
+      <p:sp>
+        <p:nvSpPr>
+          <p:cNvPr id="24" name="Овал 23"/>
+          <p:cNvSpPr/>
+          <p:nvPr/>
+        </p:nvSpPr>
+        <p:spPr>
+          <a:xfrm>
+            <a:off x="3131840" y="620688"/>
+            <a:ext cx="360040" cy="360040"/>
+          </a:xfrm>
+          <a:prstGeom prst="ellipse">
+            <a:avLst/>
+          </a:prstGeom>
+          <a:solidFill>
+            <a:schemeClr val="bg1"/>
+          </a:solidFill>
+        </p:spPr>
+        <p:style>
+          <a:lnRef idx="2">
+            <a:schemeClr val="accent1">
+              <a:shade val="50000"/>
+            </a:schemeClr>
+          </a:lnRef>
+          <a:fillRef idx="1">
+            <a:schemeClr val="accent1"/>
+          </a:fillRef>
+          <a:effectRef idx="0">
+            <a:schemeClr val="accent1"/>
+          </a:effectRef>
+          <a:fontRef idx="minor">
+            <a:schemeClr val="lt1"/>
+          </a:fontRef>
+        </p:style>
+        <p:txBody>
+          <a:bodyPr rtlCol="0" anchor="ctr"/>
+          <a:lstStyle/>
+          <a:p>
+            <a:pPr algn="ctr"/>
+            <a:r>
+              <a:rPr lang="ru-RU" b="1" dirty="0" smtClean="0">
+                <a:solidFill>
+                  <a:schemeClr val="tx1"/>
+                </a:solidFill>
+              </a:rPr>
+              <a:t>2</a:t>
+            </a:r>
+            <a:endParaRPr lang="ru-RU" b="1" dirty="0">
+              <a:solidFill>
+                <a:schemeClr val="tx1"/>
+              </a:solidFill>
+            </a:endParaRPr>
+          </a:p>
+        </p:txBody>
+      </p:sp>
+      <p:pic>
+        <p:nvPicPr>
+          <p:cNvPr id="1027" name="Picture 3"/>
+          <p:cNvPicPr>
+            <a:picLocks noChangeAspect="1" noChangeArrowheads="1"/>
+          </p:cNvPicPr>
+          <p:nvPr/>
+        </p:nvPicPr>
+        <p:blipFill>
+          <a:blip r:embed="rId6" cstate="print"/>
+          <a:srcRect/>
+          <a:stretch>
+            <a:fillRect/>
+          </a:stretch>
+        </p:blipFill>
+        <p:spPr bwMode="auto">
+          <a:xfrm>
+            <a:off x="3419872" y="980728"/>
+            <a:ext cx="5314190" cy="5472608"/>
+          </a:xfrm>
+          <a:prstGeom prst="rect">
+            <a:avLst/>
+          </a:prstGeom>
+          <a:noFill/>
+          <a:ln w="9525">
             <a:noFill/>
+            <a:miter lim="800000"/>
+            <a:headEnd/>
+            <a:tailEnd/>
           </a:ln>
-          <a:effectLst>
-            <a:outerShdw blurRad="292100" dist="139700" dir="2700000" algn="tl" rotWithShape="0">
-              <a:srgbClr val="333333">
-                <a:alpha val="65000"/>
-              </a:srgbClr>
-            </a:outerShdw>
-          </a:effectLst>
         </p:spPr>
       </p:pic>
     </p:spTree>
@@ -6037,41 +6186,7 @@
       </p:grpSpPr>
       <p:sp>
         <p:nvSpPr>
-          <p:cNvPr id="4" name="Заголовок 1"/>
-          <p:cNvSpPr>
-            <a:spLocks noGrp="1"/>
-          </p:cNvSpPr>
-          <p:nvPr>
-            <p:ph type="title"/>
-          </p:nvPr>
-        </p:nvSpPr>
-        <p:spPr>
-          <a:xfrm>
-            <a:off x="457200" y="116632"/>
-            <a:ext cx="8229600" cy="648072"/>
-          </a:xfrm>
-        </p:spPr>
-        <p:txBody>
-          <a:bodyPr>
-            <a:normAutofit/>
-          </a:bodyPr>
-          <a:lstStyle/>
-          <a:p>
-            <a:r>
-              <a:rPr lang="ru-RU" sz="3200" dirty="0" smtClean="0"/>
-              <a:t>Использованные </a:t>
-            </a:r>
-            <a:r>
-              <a:rPr lang="ru-RU" sz="3200" dirty="0" smtClean="0"/>
-              <a:t>технологии и аналоги</a:t>
-            </a:r>
-            <a:endParaRPr lang="ru-RU" sz="3200" dirty="0"/>
-          </a:p>
-        </p:txBody>
-      </p:sp>
-      <p:sp>
-        <p:nvSpPr>
-          <p:cNvPr id="5" name="Прямоугольник 4"/>
+          <p:cNvPr id="4" name="Прямоугольник 3"/>
           <p:cNvSpPr/>
           <p:nvPr/>
         </p:nvSpPr>
@@ -6110,9 +6225,144 @@
           </a:p>
         </p:txBody>
       </p:sp>
+      <p:sp>
+        <p:nvSpPr>
+          <p:cNvPr id="7" name="Заголовок 1"/>
+          <p:cNvSpPr txBox="1">
+            <a:spLocks/>
+          </p:cNvSpPr>
+          <p:nvPr/>
+        </p:nvSpPr>
+        <p:spPr>
+          <a:xfrm>
+            <a:off x="457200" y="116632"/>
+            <a:ext cx="8229600" cy="648072"/>
+          </a:xfrm>
+          <a:prstGeom prst="rect">
+            <a:avLst/>
+          </a:prstGeom>
+        </p:spPr>
+        <p:txBody>
+          <a:bodyPr vert="horz" lIns="91440" tIns="45720" rIns="91440" bIns="45720" rtlCol="0" anchor="ctr">
+            <a:normAutofit/>
+          </a:bodyPr>
+          <a:lstStyle/>
+          <a:p>
+            <a:pPr lvl="0" algn="ctr">
+              <a:spcBef>
+                <a:spcPct val="0"/>
+              </a:spcBef>
+            </a:pPr>
+            <a:r>
+              <a:rPr lang="ru-RU" sz="3200" dirty="0" smtClean="0"/>
+              <a:t>Результаты и выводы</a:t>
+            </a:r>
+            <a:endParaRPr kumimoji="0" lang="ru-RU" sz="3200" b="0" i="0" u="none" strike="noStrike" kern="1200" cap="none" spc="0" normalizeH="0" baseline="0" noProof="0" dirty="0" smtClean="0">
+              <a:ln>
+                <a:noFill/>
+              </a:ln>
+              <a:solidFill>
+                <a:schemeClr val="tx1"/>
+              </a:solidFill>
+              <a:effectLst/>
+              <a:uLnTx/>
+              <a:uFillTx/>
+              <a:latin typeface="+mj-lt"/>
+              <a:ea typeface="+mj-ea"/>
+              <a:cs typeface="+mj-cs"/>
+            </a:endParaRPr>
+          </a:p>
+        </p:txBody>
+      </p:sp>
+      <p:sp>
+        <p:nvSpPr>
+          <p:cNvPr id="8" name="Прямоугольник 7"/>
+          <p:cNvSpPr/>
+          <p:nvPr/>
+        </p:nvSpPr>
+        <p:spPr>
+          <a:xfrm>
+            <a:off x="6012160" y="5734997"/>
+            <a:ext cx="2808312" cy="646331"/>
+          </a:xfrm>
+          <a:prstGeom prst="rect">
+            <a:avLst/>
+          </a:prstGeom>
+        </p:spPr>
+        <p:txBody>
+          <a:bodyPr wrap="square">
+            <a:spAutoFit/>
+          </a:bodyPr>
+          <a:lstStyle/>
+          <a:p>
+            <a:pPr algn="ctr"/>
+            <a:r>
+              <a:rPr lang="ru-RU" dirty="0" smtClean="0">
+                <a:latin typeface="Arial" pitchFamily="34" charset="0"/>
+                <a:cs typeface="Arial" pitchFamily="34" charset="0"/>
+              </a:rPr>
+              <a:t>Актуальность</a:t>
+            </a:r>
+          </a:p>
+          <a:p>
+            <a:pPr algn="ctr"/>
+            <a:r>
+              <a:rPr lang="ru-RU" dirty="0" smtClean="0">
+                <a:latin typeface="Arial" pitchFamily="34" charset="0"/>
+                <a:cs typeface="Arial" pitchFamily="34" charset="0"/>
+              </a:rPr>
+              <a:t>данных</a:t>
+            </a:r>
+            <a:endParaRPr lang="ru-RU" dirty="0"/>
+          </a:p>
+        </p:txBody>
+      </p:sp>
+      <p:sp>
+        <p:nvSpPr>
+          <p:cNvPr id="10" name="Прямоугольник 9"/>
+          <p:cNvSpPr/>
+          <p:nvPr/>
+        </p:nvSpPr>
+        <p:spPr>
+          <a:xfrm>
+            <a:off x="369599" y="2708920"/>
+            <a:ext cx="2114169" cy="646331"/>
+          </a:xfrm>
+          <a:prstGeom prst="rect">
+            <a:avLst/>
+          </a:prstGeom>
+        </p:spPr>
+        <p:txBody>
+          <a:bodyPr wrap="none">
+            <a:spAutoFit/>
+          </a:bodyPr>
+          <a:lstStyle/>
+          <a:p>
+            <a:pPr algn="ctr"/>
+            <a:r>
+              <a:rPr lang="ru-RU" dirty="0" smtClean="0">
+                <a:latin typeface="Arial" pitchFamily="34" charset="0"/>
+                <a:cs typeface="Arial" pitchFamily="34" charset="0"/>
+              </a:rPr>
+              <a:t>299 управляющих</a:t>
+            </a:r>
+          </a:p>
+          <a:p>
+            <a:pPr algn="ctr"/>
+            <a:r>
+              <a:rPr lang="ru-RU" dirty="0" smtClean="0">
+                <a:latin typeface="Arial" pitchFamily="34" charset="0"/>
+                <a:cs typeface="Arial" pitchFamily="34" charset="0"/>
+              </a:rPr>
+              <a:t>организаций</a:t>
+            </a:r>
+            <a:endParaRPr lang="ru-RU" dirty="0"/>
+          </a:p>
+        </p:txBody>
+      </p:sp>
       <p:pic>
         <p:nvPicPr>
-          <p:cNvPr id="28676" name="Picture 4" descr="http://www.nareshit.in/wp-content/uploads/2013/07/Wcf.png"/>
+          <p:cNvPr id="3074" name="Picture 2" descr="http://www.cliparthut.com/clip-arts/337/tired-person-337914.gif"/>
           <p:cNvPicPr>
             <a:picLocks noChangeAspect="1" noChangeArrowheads="1"/>
           </p:cNvPicPr>
@@ -6127,8 +6377,8 @@
         </p:blipFill>
         <p:spPr bwMode="auto">
           <a:xfrm>
-            <a:off x="611560" y="2420887"/>
-            <a:ext cx="1944216" cy="1105535"/>
+            <a:off x="395536" y="3546660"/>
+            <a:ext cx="2185110" cy="2186596"/>
           </a:xfrm>
           <a:prstGeom prst="rect">
             <a:avLst/>
@@ -6138,7 +6388,7 @@
       </p:pic>
       <p:pic>
         <p:nvPicPr>
-          <p:cNvPr id="28678" name="Picture 6" descr="http://pressdev.ru/wp-content/uploads/2013/10/ms-sql-server-300x246.png"/>
+          <p:cNvPr id="3076" name="Picture 4" descr="http://www.datingacademy.ru/wp-content/uploads/2010/07/happy_man_at_computer2.jpg"/>
           <p:cNvPicPr>
             <a:picLocks noChangeAspect="1" noChangeArrowheads="1"/>
           </p:cNvPicPr>
@@ -6153,8 +6403,8 @@
         </p:blipFill>
         <p:spPr bwMode="auto">
           <a:xfrm>
-            <a:off x="611560" y="4797151"/>
-            <a:ext cx="2016224" cy="1653305"/>
+            <a:off x="3352101" y="3500585"/>
+            <a:ext cx="2300019" cy="2376687"/>
           </a:xfrm>
           <a:prstGeom prst="rect">
             <a:avLst/>
@@ -6164,67 +6414,57 @@
       </p:pic>
       <p:sp>
         <p:nvSpPr>
-          <p:cNvPr id="28684" name="AutoShape 12" descr="http://ohdoylerules.com/content/images/css3.svg"/>
-          <p:cNvSpPr>
-            <a:spLocks noChangeAspect="1" noChangeArrowheads="1"/>
-          </p:cNvSpPr>
-          <p:nvPr/>
-        </p:nvSpPr>
-        <p:spPr bwMode="auto">
-          <a:xfrm>
-            <a:off x="155575" y="-144463"/>
-            <a:ext cx="304800" cy="304801"/>
-          </a:xfrm>
-          <a:prstGeom prst="rect">
-            <a:avLst/>
-          </a:prstGeom>
-          <a:noFill/>
-        </p:spPr>
-        <p:txBody>
-          <a:bodyPr vert="horz" wrap="square" lIns="91440" tIns="45720" rIns="91440" bIns="45720" numCol="1" anchor="t" anchorCtr="0" compatLnSpc="1">
-            <a:prstTxWarp prst="textNoShape">
-              <a:avLst/>
-            </a:prstTxWarp>
+          <p:cNvPr id="13" name="Прямоугольник 12"/>
+          <p:cNvSpPr/>
+          <p:nvPr/>
+        </p:nvSpPr>
+        <p:spPr>
+          <a:xfrm>
+            <a:off x="2987824" y="2782669"/>
+            <a:ext cx="2695097" cy="646331"/>
+          </a:xfrm>
+          <a:prstGeom prst="rect">
+            <a:avLst/>
+          </a:prstGeom>
+        </p:spPr>
+        <p:txBody>
+          <a:bodyPr wrap="none">
+            <a:spAutoFit/>
           </a:bodyPr>
           <a:lstStyle/>
           <a:p>
-            <a:endParaRPr lang="ru-RU"/>
-          </a:p>
-        </p:txBody>
-      </p:sp>
-      <p:sp>
-        <p:nvSpPr>
-          <p:cNvPr id="28686" name="AutoShape 14" descr="http://ohdoylerules.com/content/images/css3.svg"/>
-          <p:cNvSpPr>
-            <a:spLocks noChangeAspect="1" noChangeArrowheads="1"/>
-          </p:cNvSpPr>
-          <p:nvPr/>
-        </p:nvSpPr>
-        <p:spPr bwMode="auto">
-          <a:xfrm>
-            <a:off x="155575" y="-144463"/>
-            <a:ext cx="304800" cy="304801"/>
-          </a:xfrm>
-          <a:prstGeom prst="rect">
-            <a:avLst/>
-          </a:prstGeom>
-          <a:noFill/>
-        </p:spPr>
-        <p:txBody>
-          <a:bodyPr vert="horz" wrap="square" lIns="91440" tIns="45720" rIns="91440" bIns="45720" numCol="1" anchor="t" anchorCtr="0" compatLnSpc="1">
-            <a:prstTxWarp prst="textNoShape">
-              <a:avLst/>
-            </a:prstTxWarp>
-          </a:bodyPr>
-          <a:lstStyle/>
-          <a:p>
-            <a:endParaRPr lang="ru-RU"/>
+            <a:pPr algn="ctr"/>
+            <a:r>
+              <a:rPr lang="en-US" dirty="0" smtClean="0">
+                <a:latin typeface="Arial" pitchFamily="34" charset="0"/>
+                <a:cs typeface="Arial" pitchFamily="34" charset="0"/>
+              </a:rPr>
+              <a:t>6770 </a:t>
+            </a:r>
+            <a:r>
+              <a:rPr lang="ru-RU" dirty="0" smtClean="0">
+                <a:latin typeface="Arial" pitchFamily="34" charset="0"/>
+                <a:cs typeface="Arial" pitchFamily="34" charset="0"/>
+              </a:rPr>
+              <a:t>многоквартирных </a:t>
+            </a:r>
+          </a:p>
+          <a:p>
+            <a:pPr algn="ctr"/>
+            <a:r>
+              <a:rPr lang="ru-RU" dirty="0" smtClean="0">
+                <a:latin typeface="Arial" pitchFamily="34" charset="0"/>
+                <a:cs typeface="Arial" pitchFamily="34" charset="0"/>
+              </a:rPr>
+              <a:t>домов</a:t>
+            </a:r>
+            <a:endParaRPr lang="ru-RU" dirty="0"/>
           </a:p>
         </p:txBody>
       </p:sp>
       <p:pic>
         <p:nvPicPr>
-          <p:cNvPr id="28690" name="Picture 18" descr="http://www.codeproject.com/Learn/MVC/images/MVClogo.png"/>
+          <p:cNvPr id="3080" name="Picture 8" descr="http://okna-nice.ru/images/okna_v_panelnii_dom.png"/>
           <p:cNvPicPr>
             <a:picLocks noChangeAspect="1" noChangeArrowheads="1"/>
           </p:cNvPicPr>
@@ -6239,8 +6479,8 @@
         </p:blipFill>
         <p:spPr bwMode="auto">
           <a:xfrm>
-            <a:off x="683568" y="3573016"/>
-            <a:ext cx="1800200" cy="1242392"/>
+            <a:off x="2916493" y="801216"/>
+            <a:ext cx="2735627" cy="2051720"/>
           </a:xfrm>
           <a:prstGeom prst="rect">
             <a:avLst/>
@@ -6248,9 +6488,42 @@
           <a:noFill/>
         </p:spPr>
       </p:pic>
+      <p:sp>
+        <p:nvSpPr>
+          <p:cNvPr id="16" name="Прямоугольник 15"/>
+          <p:cNvSpPr/>
+          <p:nvPr/>
+        </p:nvSpPr>
+        <p:spPr>
+          <a:xfrm>
+            <a:off x="899592" y="5879013"/>
+            <a:ext cx="4104456" cy="646331"/>
+          </a:xfrm>
+          <a:prstGeom prst="rect">
+            <a:avLst/>
+          </a:prstGeom>
+        </p:spPr>
+        <p:txBody>
+          <a:bodyPr wrap="square">
+            <a:spAutoFit/>
+          </a:bodyPr>
+          <a:lstStyle/>
+          <a:p>
+            <a:pPr algn="ctr"/>
+            <a:r>
+              <a:rPr lang="ru-RU" dirty="0" smtClean="0">
+                <a:latin typeface="Arial" pitchFamily="34" charset="0"/>
+                <a:cs typeface="Arial" pitchFamily="34" charset="0"/>
+              </a:rPr>
+              <a:t>Пользователи УК взаимодействуют только с «АИС: Объектовый учет»</a:t>
+            </a:r>
+            <a:endParaRPr lang="ru-RU" dirty="0"/>
+          </a:p>
+        </p:txBody>
+      </p:sp>
       <p:pic>
         <p:nvPicPr>
-          <p:cNvPr id="28698" name="Picture 26" descr="http://www.softreactor.ru/sites/default/files/image/node_pics/11/razrabotki_c%23.png"/>
+          <p:cNvPr id="3082" name="Picture 10" descr="http://www.clker.com/cliparts/1/0/b/c/12161811981124042195jean_victor_balin_icon_arrow_right_blue.svg.hi.png"/>
           <p:cNvPicPr>
             <a:picLocks noChangeAspect="1" noChangeArrowheads="1"/>
           </p:cNvPicPr>
@@ -6265,8 +6538,8 @@
         </p:blipFill>
         <p:spPr bwMode="auto">
           <a:xfrm>
-            <a:off x="683568" y="980728"/>
-            <a:ext cx="1800200" cy="1427556"/>
+            <a:off x="2627784" y="4493278"/>
+            <a:ext cx="648072" cy="591906"/>
           </a:xfrm>
           <a:prstGeom prst="rect">
             <a:avLst/>
@@ -6274,211 +6547,9 @@
           <a:noFill/>
         </p:spPr>
       </p:pic>
-      <p:sp>
-        <p:nvSpPr>
-          <p:cNvPr id="19" name="Прямоугольник 18"/>
-          <p:cNvSpPr/>
-          <p:nvPr/>
-        </p:nvSpPr>
-        <p:spPr>
-          <a:xfrm>
-            <a:off x="323528" y="764704"/>
-            <a:ext cx="2664296" cy="5760640"/>
-          </a:xfrm>
-          <a:prstGeom prst="rect">
-            <a:avLst/>
-          </a:prstGeom>
-          <a:noFill/>
-          <a:ln>
-            <a:solidFill>
-              <a:schemeClr val="tx2"/>
-            </a:solidFill>
-          </a:ln>
-        </p:spPr>
-        <p:style>
-          <a:lnRef idx="2">
-            <a:schemeClr val="accent1">
-              <a:shade val="50000"/>
-            </a:schemeClr>
-          </a:lnRef>
-          <a:fillRef idx="1">
-            <a:schemeClr val="accent1"/>
-          </a:fillRef>
-          <a:effectRef idx="0">
-            <a:schemeClr val="accent1"/>
-          </a:effectRef>
-          <a:fontRef idx="minor">
-            <a:schemeClr val="lt1"/>
-          </a:fontRef>
-        </p:style>
-        <p:txBody>
-          <a:bodyPr rtlCol="0" anchor="ctr"/>
-          <a:lstStyle/>
-          <a:p>
-            <a:pPr algn="ctr"/>
-            <a:endParaRPr lang="ru-RU" dirty="0"/>
-          </a:p>
-        </p:txBody>
-      </p:sp>
-      <p:sp>
-        <p:nvSpPr>
-          <p:cNvPr id="20" name="Овал 19"/>
-          <p:cNvSpPr/>
-          <p:nvPr/>
-        </p:nvSpPr>
-        <p:spPr>
-          <a:xfrm>
-            <a:off x="179512" y="620688"/>
-            <a:ext cx="360040" cy="360040"/>
-          </a:xfrm>
-          <a:prstGeom prst="ellipse">
-            <a:avLst/>
-          </a:prstGeom>
-          <a:solidFill>
-            <a:schemeClr val="bg1"/>
-          </a:solidFill>
-        </p:spPr>
-        <p:style>
-          <a:lnRef idx="2">
-            <a:schemeClr val="accent1">
-              <a:shade val="50000"/>
-            </a:schemeClr>
-          </a:lnRef>
-          <a:fillRef idx="1">
-            <a:schemeClr val="accent1"/>
-          </a:fillRef>
-          <a:effectRef idx="0">
-            <a:schemeClr val="accent1"/>
-          </a:effectRef>
-          <a:fontRef idx="minor">
-            <a:schemeClr val="lt1"/>
-          </a:fontRef>
-        </p:style>
-        <p:txBody>
-          <a:bodyPr rtlCol="0" anchor="ctr"/>
-          <a:lstStyle/>
-          <a:p>
-            <a:pPr algn="ctr"/>
-            <a:r>
-              <a:rPr lang="en-US" b="1" dirty="0" smtClean="0">
-                <a:solidFill>
-                  <a:schemeClr val="tx1"/>
-                </a:solidFill>
-              </a:rPr>
-              <a:t>1</a:t>
-            </a:r>
-            <a:endParaRPr lang="ru-RU" b="1" dirty="0">
-              <a:solidFill>
-                <a:schemeClr val="tx1"/>
-              </a:solidFill>
-            </a:endParaRPr>
-          </a:p>
-        </p:txBody>
-      </p:sp>
-      <p:sp>
-        <p:nvSpPr>
-          <p:cNvPr id="23" name="Прямоугольник 22"/>
-          <p:cNvSpPr/>
-          <p:nvPr/>
-        </p:nvSpPr>
-        <p:spPr>
-          <a:xfrm>
-            <a:off x="3347864" y="764704"/>
-            <a:ext cx="5472608" cy="5760640"/>
-          </a:xfrm>
-          <a:prstGeom prst="rect">
-            <a:avLst/>
-          </a:prstGeom>
-          <a:noFill/>
-          <a:ln>
-            <a:solidFill>
-              <a:schemeClr val="tx2"/>
-            </a:solidFill>
-          </a:ln>
-        </p:spPr>
-        <p:style>
-          <a:lnRef idx="2">
-            <a:schemeClr val="accent1">
-              <a:shade val="50000"/>
-            </a:schemeClr>
-          </a:lnRef>
-          <a:fillRef idx="1">
-            <a:schemeClr val="accent1"/>
-          </a:fillRef>
-          <a:effectRef idx="0">
-            <a:schemeClr val="accent1"/>
-          </a:effectRef>
-          <a:fontRef idx="minor">
-            <a:schemeClr val="lt1"/>
-          </a:fontRef>
-        </p:style>
-        <p:txBody>
-          <a:bodyPr rtlCol="0" anchor="ctr"/>
-          <a:lstStyle/>
-          <a:p>
-            <a:pPr algn="ctr"/>
-            <a:endParaRPr lang="ru-RU" dirty="0"/>
-          </a:p>
-        </p:txBody>
-      </p:sp>
-      <p:sp>
-        <p:nvSpPr>
-          <p:cNvPr id="24" name="Овал 23"/>
-          <p:cNvSpPr/>
-          <p:nvPr/>
-        </p:nvSpPr>
-        <p:spPr>
-          <a:xfrm>
-            <a:off x="3131840" y="620688"/>
-            <a:ext cx="360040" cy="360040"/>
-          </a:xfrm>
-          <a:prstGeom prst="ellipse">
-            <a:avLst/>
-          </a:prstGeom>
-          <a:solidFill>
-            <a:schemeClr val="bg1"/>
-          </a:solidFill>
-        </p:spPr>
-        <p:style>
-          <a:lnRef idx="2">
-            <a:schemeClr val="accent1">
-              <a:shade val="50000"/>
-            </a:schemeClr>
-          </a:lnRef>
-          <a:fillRef idx="1">
-            <a:schemeClr val="accent1"/>
-          </a:fillRef>
-          <a:effectRef idx="0">
-            <a:schemeClr val="accent1"/>
-          </a:effectRef>
-          <a:fontRef idx="minor">
-            <a:schemeClr val="lt1"/>
-          </a:fontRef>
-        </p:style>
-        <p:txBody>
-          <a:bodyPr rtlCol="0" anchor="ctr"/>
-          <a:lstStyle/>
-          <a:p>
-            <a:pPr algn="ctr"/>
-            <a:r>
-              <a:rPr lang="ru-RU" b="1" dirty="0" smtClean="0">
-                <a:solidFill>
-                  <a:schemeClr val="tx1"/>
-                </a:solidFill>
-              </a:rPr>
-              <a:t>2</a:t>
-            </a:r>
-            <a:endParaRPr lang="ru-RU" b="1" dirty="0">
-              <a:solidFill>
-                <a:schemeClr val="tx1"/>
-              </a:solidFill>
-            </a:endParaRPr>
-          </a:p>
-        </p:txBody>
-      </p:sp>
       <p:pic>
         <p:nvPicPr>
-          <p:cNvPr id="1027" name="Picture 3"/>
+          <p:cNvPr id="18" name="Picture 4" descr="http://files.softicons.com/download/business-icons/desktop-business-icons-by-aha-soft/png/256x256/case.png"/>
           <p:cNvPicPr>
             <a:picLocks noChangeAspect="1" noChangeArrowheads="1"/>
           </p:cNvPicPr>
@@ -6493,21 +6564,97 @@
         </p:blipFill>
         <p:spPr bwMode="auto">
           <a:xfrm>
-            <a:off x="3419872" y="980728"/>
-            <a:ext cx="5314190" cy="5472608"/>
+            <a:off x="539552" y="836712"/>
+            <a:ext cx="1800200" cy="1800200"/>
           </a:xfrm>
           <a:prstGeom prst="rect">
             <a:avLst/>
           </a:prstGeom>
           <a:noFill/>
-          <a:ln w="9525">
-            <a:noFill/>
-            <a:miter lim="800000"/>
-            <a:headEnd/>
-            <a:tailEnd/>
-          </a:ln>
         </p:spPr>
       </p:pic>
+      <p:pic>
+        <p:nvPicPr>
+          <p:cNvPr id="3088" name="Picture 16" descr="http://pngimg.com/upload/clock_PNG6611.png"/>
+          <p:cNvPicPr>
+            <a:picLocks noChangeAspect="1" noChangeArrowheads="1"/>
+          </p:cNvPicPr>
+          <p:nvPr/>
+        </p:nvPicPr>
+        <p:blipFill>
+          <a:blip r:embed="rId7" cstate="print"/>
+          <a:srcRect/>
+          <a:stretch>
+            <a:fillRect/>
+          </a:stretch>
+        </p:blipFill>
+        <p:spPr bwMode="auto">
+          <a:xfrm>
+            <a:off x="6516216" y="3861048"/>
+            <a:ext cx="1800200" cy="1800200"/>
+          </a:xfrm>
+          <a:prstGeom prst="rect">
+            <a:avLst/>
+          </a:prstGeom>
+          <a:noFill/>
+        </p:spPr>
+      </p:pic>
+      <p:pic>
+        <p:nvPicPr>
+          <p:cNvPr id="2050" name="Picture 2" descr="http://www.clker.com/cliparts/y/f/Q/i/Z/l/check-mark-md.png"/>
+          <p:cNvPicPr>
+            <a:picLocks noChangeAspect="1" noChangeArrowheads="1"/>
+          </p:cNvPicPr>
+          <p:nvPr/>
+        </p:nvPicPr>
+        <p:blipFill>
+          <a:blip r:embed="rId8" cstate="print"/>
+          <a:srcRect/>
+          <a:stretch>
+            <a:fillRect/>
+          </a:stretch>
+        </p:blipFill>
+        <p:spPr bwMode="auto">
+          <a:xfrm>
+            <a:off x="6689098" y="950590"/>
+            <a:ext cx="1699326" cy="1758330"/>
+          </a:xfrm>
+          <a:prstGeom prst="rect">
+            <a:avLst/>
+          </a:prstGeom>
+          <a:noFill/>
+        </p:spPr>
+      </p:pic>
+      <p:sp>
+        <p:nvSpPr>
+          <p:cNvPr id="15" name="Прямоугольник 14"/>
+          <p:cNvSpPr/>
+          <p:nvPr/>
+        </p:nvSpPr>
+        <p:spPr>
+          <a:xfrm>
+            <a:off x="6156176" y="2843644"/>
+            <a:ext cx="2592288" cy="369332"/>
+          </a:xfrm>
+          <a:prstGeom prst="rect">
+            <a:avLst/>
+          </a:prstGeom>
+        </p:spPr>
+        <p:txBody>
+          <a:bodyPr wrap="square">
+            <a:spAutoFit/>
+          </a:bodyPr>
+          <a:lstStyle/>
+          <a:p>
+            <a:pPr algn="ctr"/>
+            <a:r>
+              <a:rPr lang="ru-RU" dirty="0" smtClean="0"/>
+              <a:t>Интеграция в один клик</a:t>
+            </a:r>
+            <a:endParaRPr lang="ru-RU" dirty="0"/>
+          </a:p>
+        </p:txBody>
+      </p:sp>
     </p:spTree>
   </p:cSld>
   <p:clrMapOvr>
@@ -6583,7 +6730,7 @@
       </p:sp>
       <p:sp>
         <p:nvSpPr>
-          <p:cNvPr id="7" name="Заголовок 1"/>
+          <p:cNvPr id="5" name="Заголовок 1"/>
           <p:cNvSpPr txBox="1">
             <a:spLocks/>
           </p:cNvSpPr>
@@ -6591,7 +6738,7 @@
         </p:nvSpPr>
         <p:spPr>
           <a:xfrm>
-            <a:off x="457200" y="116632"/>
+            <a:off x="611560" y="2852936"/>
             <a:ext cx="8229600" cy="648072"/>
           </a:xfrm>
           <a:prstGeom prst="rect">
@@ -6600,7 +6747,7 @@
         </p:spPr>
         <p:txBody>
           <a:bodyPr vert="horz" lIns="91440" tIns="45720" rIns="91440" bIns="45720" rtlCol="0" anchor="ctr">
-            <a:normAutofit/>
+            <a:noAutofit/>
           </a:bodyPr>
           <a:lstStyle/>
           <a:p>
@@ -6610,10 +6757,13 @@
               </a:spcBef>
             </a:pPr>
             <a:r>
-              <a:rPr lang="ru-RU" sz="3200" dirty="0" smtClean="0"/>
-              <a:t>Результаты и выводы</a:t>
-            </a:r>
-            <a:endParaRPr kumimoji="0" lang="ru-RU" sz="3200" b="0" i="0" u="none" strike="noStrike" kern="1200" cap="none" spc="0" normalizeH="0" baseline="0" noProof="0" dirty="0" smtClean="0">
+              <a:rPr lang="ru-RU" sz="4800" noProof="0" dirty="0" smtClean="0">
+                <a:latin typeface="Arial" pitchFamily="34" charset="0"/>
+                <a:cs typeface="Arial" pitchFamily="34" charset="0"/>
+              </a:rPr>
+              <a:t>Спасибо за внимание!</a:t>
+            </a:r>
+            <a:endParaRPr kumimoji="0" lang="ru-RU" sz="4800" b="0" i="0" u="none" strike="noStrike" kern="1200" cap="none" spc="0" normalizeH="0" baseline="0" noProof="0" dirty="0" smtClean="0">
               <a:ln>
                 <a:noFill/>
               </a:ln>
@@ -6623,391 +6773,10 @@
               <a:effectLst/>
               <a:uLnTx/>
               <a:uFillTx/>
-              <a:latin typeface="+mj-lt"/>
+              <a:latin typeface="Arial" pitchFamily="34" charset="0"/>
               <a:ea typeface="+mj-ea"/>
-              <a:cs typeface="+mj-cs"/>
+              <a:cs typeface="Arial" pitchFamily="34" charset="0"/>
             </a:endParaRPr>
-          </a:p>
-        </p:txBody>
-      </p:sp>
-      <p:sp>
-        <p:nvSpPr>
-          <p:cNvPr id="8" name="Прямоугольник 7"/>
-          <p:cNvSpPr/>
-          <p:nvPr/>
-        </p:nvSpPr>
-        <p:spPr>
-          <a:xfrm>
-            <a:off x="6012160" y="5734997"/>
-            <a:ext cx="2808312" cy="646331"/>
-          </a:xfrm>
-          <a:prstGeom prst="rect">
-            <a:avLst/>
-          </a:prstGeom>
-        </p:spPr>
-        <p:txBody>
-          <a:bodyPr wrap="square">
-            <a:spAutoFit/>
-          </a:bodyPr>
-          <a:lstStyle/>
-          <a:p>
-            <a:pPr algn="ctr"/>
-            <a:r>
-              <a:rPr lang="ru-RU" dirty="0" smtClean="0">
-                <a:latin typeface="Arial" pitchFamily="34" charset="0"/>
-                <a:cs typeface="Arial" pitchFamily="34" charset="0"/>
-              </a:rPr>
-              <a:t>Актуальность</a:t>
-            </a:r>
-          </a:p>
-          <a:p>
-            <a:pPr algn="ctr"/>
-            <a:r>
-              <a:rPr lang="ru-RU" dirty="0" smtClean="0">
-                <a:latin typeface="Arial" pitchFamily="34" charset="0"/>
-                <a:cs typeface="Arial" pitchFamily="34" charset="0"/>
-              </a:rPr>
-              <a:t>данных</a:t>
-            </a:r>
-            <a:endParaRPr lang="ru-RU" dirty="0"/>
-          </a:p>
-        </p:txBody>
-      </p:sp>
-      <p:sp>
-        <p:nvSpPr>
-          <p:cNvPr id="10" name="Прямоугольник 9"/>
-          <p:cNvSpPr/>
-          <p:nvPr/>
-        </p:nvSpPr>
-        <p:spPr>
-          <a:xfrm>
-            <a:off x="369599" y="2708920"/>
-            <a:ext cx="2114169" cy="646331"/>
-          </a:xfrm>
-          <a:prstGeom prst="rect">
-            <a:avLst/>
-          </a:prstGeom>
-        </p:spPr>
-        <p:txBody>
-          <a:bodyPr wrap="none">
-            <a:spAutoFit/>
-          </a:bodyPr>
-          <a:lstStyle/>
-          <a:p>
-            <a:pPr algn="ctr"/>
-            <a:r>
-              <a:rPr lang="ru-RU" dirty="0" smtClean="0">
-                <a:latin typeface="Arial" pitchFamily="34" charset="0"/>
-                <a:cs typeface="Arial" pitchFamily="34" charset="0"/>
-              </a:rPr>
-              <a:t>299 управляющих</a:t>
-            </a:r>
-          </a:p>
-          <a:p>
-            <a:pPr algn="ctr"/>
-            <a:r>
-              <a:rPr lang="ru-RU" dirty="0" smtClean="0">
-                <a:latin typeface="Arial" pitchFamily="34" charset="0"/>
-                <a:cs typeface="Arial" pitchFamily="34" charset="0"/>
-              </a:rPr>
-              <a:t>организаций</a:t>
-            </a:r>
-            <a:endParaRPr lang="ru-RU" dirty="0"/>
-          </a:p>
-        </p:txBody>
-      </p:sp>
-      <p:pic>
-        <p:nvPicPr>
-          <p:cNvPr id="3074" name="Picture 2" descr="http://www.cliparthut.com/clip-arts/337/tired-person-337914.gif"/>
-          <p:cNvPicPr>
-            <a:picLocks noChangeAspect="1" noChangeArrowheads="1"/>
-          </p:cNvPicPr>
-          <p:nvPr/>
-        </p:nvPicPr>
-        <p:blipFill>
-          <a:blip r:embed="rId2" cstate="print"/>
-          <a:srcRect/>
-          <a:stretch>
-            <a:fillRect/>
-          </a:stretch>
-        </p:blipFill>
-        <p:spPr bwMode="auto">
-          <a:xfrm>
-            <a:off x="395536" y="3546660"/>
-            <a:ext cx="2185110" cy="2186596"/>
-          </a:xfrm>
-          <a:prstGeom prst="rect">
-            <a:avLst/>
-          </a:prstGeom>
-          <a:noFill/>
-        </p:spPr>
-      </p:pic>
-      <p:pic>
-        <p:nvPicPr>
-          <p:cNvPr id="3076" name="Picture 4" descr="http://www.datingacademy.ru/wp-content/uploads/2010/07/happy_man_at_computer2.jpg"/>
-          <p:cNvPicPr>
-            <a:picLocks noChangeAspect="1" noChangeArrowheads="1"/>
-          </p:cNvPicPr>
-          <p:nvPr/>
-        </p:nvPicPr>
-        <p:blipFill>
-          <a:blip r:embed="rId3" cstate="print"/>
-          <a:srcRect/>
-          <a:stretch>
-            <a:fillRect/>
-          </a:stretch>
-        </p:blipFill>
-        <p:spPr bwMode="auto">
-          <a:xfrm>
-            <a:off x="3352101" y="3500585"/>
-            <a:ext cx="2300019" cy="2376687"/>
-          </a:xfrm>
-          <a:prstGeom prst="rect">
-            <a:avLst/>
-          </a:prstGeom>
-          <a:noFill/>
-        </p:spPr>
-      </p:pic>
-      <p:sp>
-        <p:nvSpPr>
-          <p:cNvPr id="13" name="Прямоугольник 12"/>
-          <p:cNvSpPr/>
-          <p:nvPr/>
-        </p:nvSpPr>
-        <p:spPr>
-          <a:xfrm>
-            <a:off x="2987824" y="2782669"/>
-            <a:ext cx="2695097" cy="646331"/>
-          </a:xfrm>
-          <a:prstGeom prst="rect">
-            <a:avLst/>
-          </a:prstGeom>
-        </p:spPr>
-        <p:txBody>
-          <a:bodyPr wrap="none">
-            <a:spAutoFit/>
-          </a:bodyPr>
-          <a:lstStyle/>
-          <a:p>
-            <a:pPr algn="ctr"/>
-            <a:r>
-              <a:rPr lang="en-US" dirty="0" smtClean="0">
-                <a:latin typeface="Arial" pitchFamily="34" charset="0"/>
-                <a:cs typeface="Arial" pitchFamily="34" charset="0"/>
-              </a:rPr>
-              <a:t>6770 </a:t>
-            </a:r>
-            <a:r>
-              <a:rPr lang="ru-RU" dirty="0" smtClean="0">
-                <a:latin typeface="Arial" pitchFamily="34" charset="0"/>
-                <a:cs typeface="Arial" pitchFamily="34" charset="0"/>
-              </a:rPr>
-              <a:t>многоквартирных </a:t>
-            </a:r>
-          </a:p>
-          <a:p>
-            <a:pPr algn="ctr"/>
-            <a:r>
-              <a:rPr lang="ru-RU" dirty="0" smtClean="0">
-                <a:latin typeface="Arial" pitchFamily="34" charset="0"/>
-                <a:cs typeface="Arial" pitchFamily="34" charset="0"/>
-              </a:rPr>
-              <a:t>домов</a:t>
-            </a:r>
-            <a:endParaRPr lang="ru-RU" dirty="0"/>
-          </a:p>
-        </p:txBody>
-      </p:sp>
-      <p:pic>
-        <p:nvPicPr>
-          <p:cNvPr id="3080" name="Picture 8" descr="http://okna-nice.ru/images/okna_v_panelnii_dom.png"/>
-          <p:cNvPicPr>
-            <a:picLocks noChangeAspect="1" noChangeArrowheads="1"/>
-          </p:cNvPicPr>
-          <p:nvPr/>
-        </p:nvPicPr>
-        <p:blipFill>
-          <a:blip r:embed="rId4" cstate="print"/>
-          <a:srcRect/>
-          <a:stretch>
-            <a:fillRect/>
-          </a:stretch>
-        </p:blipFill>
-        <p:spPr bwMode="auto">
-          <a:xfrm>
-            <a:off x="2916493" y="801216"/>
-            <a:ext cx="2735627" cy="2051720"/>
-          </a:xfrm>
-          <a:prstGeom prst="rect">
-            <a:avLst/>
-          </a:prstGeom>
-          <a:noFill/>
-        </p:spPr>
-      </p:pic>
-      <p:sp>
-        <p:nvSpPr>
-          <p:cNvPr id="16" name="Прямоугольник 15"/>
-          <p:cNvSpPr/>
-          <p:nvPr/>
-        </p:nvSpPr>
-        <p:spPr>
-          <a:xfrm>
-            <a:off x="899592" y="5879013"/>
-            <a:ext cx="4104456" cy="646331"/>
-          </a:xfrm>
-          <a:prstGeom prst="rect">
-            <a:avLst/>
-          </a:prstGeom>
-        </p:spPr>
-        <p:txBody>
-          <a:bodyPr wrap="square">
-            <a:spAutoFit/>
-          </a:bodyPr>
-          <a:lstStyle/>
-          <a:p>
-            <a:pPr algn="ctr"/>
-            <a:r>
-              <a:rPr lang="ru-RU" dirty="0" smtClean="0">
-                <a:latin typeface="Arial" pitchFamily="34" charset="0"/>
-                <a:cs typeface="Arial" pitchFamily="34" charset="0"/>
-              </a:rPr>
-              <a:t>Пользователи УК взаимодействуют только с «АИС: Объектовый учет»</a:t>
-            </a:r>
-            <a:endParaRPr lang="ru-RU" dirty="0"/>
-          </a:p>
-        </p:txBody>
-      </p:sp>
-      <p:pic>
-        <p:nvPicPr>
-          <p:cNvPr id="3082" name="Picture 10" descr="http://www.clker.com/cliparts/1/0/b/c/12161811981124042195jean_victor_balin_icon_arrow_right_blue.svg.hi.png"/>
-          <p:cNvPicPr>
-            <a:picLocks noChangeAspect="1" noChangeArrowheads="1"/>
-          </p:cNvPicPr>
-          <p:nvPr/>
-        </p:nvPicPr>
-        <p:blipFill>
-          <a:blip r:embed="rId5" cstate="print"/>
-          <a:srcRect/>
-          <a:stretch>
-            <a:fillRect/>
-          </a:stretch>
-        </p:blipFill>
-        <p:spPr bwMode="auto">
-          <a:xfrm>
-            <a:off x="2627784" y="4493278"/>
-            <a:ext cx="648072" cy="591906"/>
-          </a:xfrm>
-          <a:prstGeom prst="rect">
-            <a:avLst/>
-          </a:prstGeom>
-          <a:noFill/>
-        </p:spPr>
-      </p:pic>
-      <p:pic>
-        <p:nvPicPr>
-          <p:cNvPr id="18" name="Picture 4" descr="http://files.softicons.com/download/business-icons/desktop-business-icons-by-aha-soft/png/256x256/case.png"/>
-          <p:cNvPicPr>
-            <a:picLocks noChangeAspect="1" noChangeArrowheads="1"/>
-          </p:cNvPicPr>
-          <p:nvPr/>
-        </p:nvPicPr>
-        <p:blipFill>
-          <a:blip r:embed="rId6" cstate="print"/>
-          <a:srcRect/>
-          <a:stretch>
-            <a:fillRect/>
-          </a:stretch>
-        </p:blipFill>
-        <p:spPr bwMode="auto">
-          <a:xfrm>
-            <a:off x="539552" y="836712"/>
-            <a:ext cx="1800200" cy="1800200"/>
-          </a:xfrm>
-          <a:prstGeom prst="rect">
-            <a:avLst/>
-          </a:prstGeom>
-          <a:noFill/>
-        </p:spPr>
-      </p:pic>
-      <p:pic>
-        <p:nvPicPr>
-          <p:cNvPr id="3088" name="Picture 16" descr="http://pngimg.com/upload/clock_PNG6611.png"/>
-          <p:cNvPicPr>
-            <a:picLocks noChangeAspect="1" noChangeArrowheads="1"/>
-          </p:cNvPicPr>
-          <p:nvPr/>
-        </p:nvPicPr>
-        <p:blipFill>
-          <a:blip r:embed="rId7" cstate="print"/>
-          <a:srcRect/>
-          <a:stretch>
-            <a:fillRect/>
-          </a:stretch>
-        </p:blipFill>
-        <p:spPr bwMode="auto">
-          <a:xfrm>
-            <a:off x="6516216" y="3861048"/>
-            <a:ext cx="1800200" cy="1800200"/>
-          </a:xfrm>
-          <a:prstGeom prst="rect">
-            <a:avLst/>
-          </a:prstGeom>
-          <a:noFill/>
-        </p:spPr>
-      </p:pic>
-      <p:pic>
-        <p:nvPicPr>
-          <p:cNvPr id="2050" name="Picture 2" descr="http://www.clker.com/cliparts/y/f/Q/i/Z/l/check-mark-md.png"/>
-          <p:cNvPicPr>
-            <a:picLocks noChangeAspect="1" noChangeArrowheads="1"/>
-          </p:cNvPicPr>
-          <p:nvPr/>
-        </p:nvPicPr>
-        <p:blipFill>
-          <a:blip r:embed="rId8" cstate="print"/>
-          <a:srcRect/>
-          <a:stretch>
-            <a:fillRect/>
-          </a:stretch>
-        </p:blipFill>
-        <p:spPr bwMode="auto">
-          <a:xfrm>
-            <a:off x="6689098" y="950590"/>
-            <a:ext cx="1699326" cy="1758330"/>
-          </a:xfrm>
-          <a:prstGeom prst="rect">
-            <a:avLst/>
-          </a:prstGeom>
-          <a:noFill/>
-        </p:spPr>
-      </p:pic>
-      <p:sp>
-        <p:nvSpPr>
-          <p:cNvPr id="15" name="Прямоугольник 14"/>
-          <p:cNvSpPr/>
-          <p:nvPr/>
-        </p:nvSpPr>
-        <p:spPr>
-          <a:xfrm>
-            <a:off x="6156176" y="2843644"/>
-            <a:ext cx="2592288" cy="369332"/>
-          </a:xfrm>
-          <a:prstGeom prst="rect">
-            <a:avLst/>
-          </a:prstGeom>
-        </p:spPr>
-        <p:txBody>
-          <a:bodyPr wrap="square">
-            <a:spAutoFit/>
-          </a:bodyPr>
-          <a:lstStyle/>
-          <a:p>
-            <a:pPr algn="ctr"/>
-            <a:r>
-              <a:rPr lang="ru-RU" dirty="0" smtClean="0"/>
-              <a:t>Интеграция в один клик</a:t>
-            </a:r>
-            <a:endParaRPr lang="ru-RU" dirty="0"/>
           </a:p>
         </p:txBody>
       </p:sp>
@@ -7405,131 +7174,6 @@
           </a:sp3d>
         </p:spPr>
       </p:pic>
-    </p:spTree>
-  </p:cSld>
-  <p:clrMapOvr>
-    <a:masterClrMapping/>
-  </p:clrMapOvr>
-  <p:timing>
-    <p:tnLst>
-      <p:par>
-        <p:cTn id="1" dur="indefinite" restart="never" nodeType="tmRoot"/>
-      </p:par>
-    </p:tnLst>
-  </p:timing>
-</p:sld>
-</file>
-
-<file path=ppt/slides/slide20.xml><?xml version="1.0" encoding="utf-8"?>
-<p:sld xmlns:a="http://schemas.openxmlformats.org/drawingml/2006/main" xmlns:r="http://schemas.openxmlformats.org/officeDocument/2006/relationships" xmlns:p="http://schemas.openxmlformats.org/presentationml/2006/main">
-  <p:cSld>
-    <p:spTree>
-      <p:nvGrpSpPr>
-        <p:cNvPr id="1" name=""/>
-        <p:cNvGrpSpPr/>
-        <p:nvPr/>
-      </p:nvGrpSpPr>
-      <p:grpSpPr>
-        <a:xfrm>
-          <a:off x="0" y="0"/>
-          <a:ext cx="0" cy="0"/>
-          <a:chOff x="0" y="0"/>
-          <a:chExt cx="0" cy="0"/>
-        </a:xfrm>
-      </p:grpSpPr>
-      <p:sp>
-        <p:nvSpPr>
-          <p:cNvPr id="4" name="Прямоугольник 3"/>
-          <p:cNvSpPr/>
-          <p:nvPr/>
-        </p:nvSpPr>
-        <p:spPr>
-          <a:xfrm>
-            <a:off x="107504" y="116632"/>
-            <a:ext cx="8928992" cy="6552728"/>
-          </a:xfrm>
-          <a:prstGeom prst="rect">
-            <a:avLst/>
-          </a:prstGeom>
-          <a:noFill/>
-        </p:spPr>
-        <p:style>
-          <a:lnRef idx="2">
-            <a:schemeClr val="accent1">
-              <a:shade val="50000"/>
-            </a:schemeClr>
-          </a:lnRef>
-          <a:fillRef idx="1">
-            <a:schemeClr val="accent1"/>
-          </a:fillRef>
-          <a:effectRef idx="0">
-            <a:schemeClr val="accent1"/>
-          </a:effectRef>
-          <a:fontRef idx="minor">
-            <a:schemeClr val="lt1"/>
-          </a:fontRef>
-        </p:style>
-        <p:txBody>
-          <a:bodyPr rtlCol="0" anchor="ctr"/>
-          <a:lstStyle/>
-          <a:p>
-            <a:pPr algn="ctr"/>
-            <a:endParaRPr lang="ru-RU" dirty="0"/>
-          </a:p>
-        </p:txBody>
-      </p:sp>
-      <p:sp>
-        <p:nvSpPr>
-          <p:cNvPr id="5" name="Заголовок 1"/>
-          <p:cNvSpPr txBox="1">
-            <a:spLocks/>
-          </p:cNvSpPr>
-          <p:nvPr/>
-        </p:nvSpPr>
-        <p:spPr>
-          <a:xfrm>
-            <a:off x="611560" y="2852936"/>
-            <a:ext cx="8229600" cy="648072"/>
-          </a:xfrm>
-          <a:prstGeom prst="rect">
-            <a:avLst/>
-          </a:prstGeom>
-        </p:spPr>
-        <p:txBody>
-          <a:bodyPr vert="horz" lIns="91440" tIns="45720" rIns="91440" bIns="45720" rtlCol="0" anchor="ctr">
-            <a:noAutofit/>
-          </a:bodyPr>
-          <a:lstStyle/>
-          <a:p>
-            <a:pPr lvl="0" algn="ctr">
-              <a:spcBef>
-                <a:spcPct val="0"/>
-              </a:spcBef>
-            </a:pPr>
-            <a:r>
-              <a:rPr lang="ru-RU" sz="4800" noProof="0" dirty="0" smtClean="0">
-                <a:latin typeface="Arial" pitchFamily="34" charset="0"/>
-                <a:cs typeface="Arial" pitchFamily="34" charset="0"/>
-              </a:rPr>
-              <a:t>Спасибо за внимание!</a:t>
-            </a:r>
-            <a:endParaRPr kumimoji="0" lang="ru-RU" sz="4800" b="0" i="0" u="none" strike="noStrike" kern="1200" cap="none" spc="0" normalizeH="0" baseline="0" noProof="0" dirty="0" smtClean="0">
-              <a:ln>
-                <a:noFill/>
-              </a:ln>
-              <a:solidFill>
-                <a:schemeClr val="tx1"/>
-              </a:solidFill>
-              <a:effectLst/>
-              <a:uLnTx/>
-              <a:uFillTx/>
-              <a:latin typeface="Arial" pitchFamily="34" charset="0"/>
-              <a:ea typeface="+mj-ea"/>
-              <a:cs typeface="Arial" pitchFamily="34" charset="0"/>
-            </a:endParaRPr>
-          </a:p>
-        </p:txBody>
-      </p:sp>
     </p:spTree>
   </p:cSld>
   <p:clrMapOvr>
@@ -8221,7 +7865,7 @@
         </p:nvSpPr>
         <p:spPr>
           <a:xfrm>
-            <a:off x="3851920" y="2852936"/>
+            <a:off x="3851920" y="3861048"/>
             <a:ext cx="4752528" cy="338554"/>
           </a:xfrm>
           <a:prstGeom prst="rect">
@@ -8246,37 +7890,6 @@
               <a:latin typeface="Arial" pitchFamily="34" charset="0"/>
               <a:cs typeface="Arial" pitchFamily="34" charset="0"/>
             </a:endParaRPr>
-          </a:p>
-        </p:txBody>
-      </p:sp>
-      <p:sp>
-        <p:nvSpPr>
-          <p:cNvPr id="19" name="Прямоугольник 18"/>
-          <p:cNvSpPr/>
-          <p:nvPr/>
-        </p:nvSpPr>
-        <p:spPr>
-          <a:xfrm>
-            <a:off x="3888432" y="4437112"/>
-            <a:ext cx="4788024" cy="338554"/>
-          </a:xfrm>
-          <a:prstGeom prst="rect">
-            <a:avLst/>
-          </a:prstGeom>
-        </p:spPr>
-        <p:txBody>
-          <a:bodyPr wrap="square">
-            <a:spAutoFit/>
-          </a:bodyPr>
-          <a:lstStyle/>
-          <a:p>
-            <a:r>
-              <a:rPr lang="ru-RU" sz="1600" b="1" dirty="0" smtClean="0">
-                <a:latin typeface="Arial" pitchFamily="34" charset="0"/>
-                <a:cs typeface="Arial" pitchFamily="34" charset="0"/>
-              </a:rPr>
-              <a:t>Независимость подсистемы интеграции</a:t>
-            </a:r>
           </a:p>
         </p:txBody>
       </p:sp>
@@ -8448,8 +8061,8 @@
         </p:blipFill>
         <p:spPr bwMode="auto">
           <a:xfrm>
-            <a:off x="4860032" y="3317849"/>
-            <a:ext cx="2736304" cy="975247"/>
+            <a:off x="4283968" y="4653136"/>
+            <a:ext cx="3948525" cy="1407295"/>
           </a:xfrm>
           <a:prstGeom prst="rect">
             <a:avLst/>
@@ -8464,7 +8077,7 @@
       </p:pic>
       <p:pic>
         <p:nvPicPr>
-          <p:cNvPr id="7183" name="Picture 15" descr="http://www.it-35.ru/uploads/posts/2012-10/1350884097_console.png"/>
+          <p:cNvPr id="36" name="Picture 8" descr="http://okna-nice.ru/images/okna_v_panelnii_dom.png"/>
           <p:cNvPicPr>
             <a:picLocks noChangeAspect="1" noChangeArrowheads="1"/>
           </p:cNvPicPr>
@@ -8479,8 +8092,8 @@
         </p:blipFill>
         <p:spPr bwMode="auto">
           <a:xfrm>
-            <a:off x="5364088" y="4869160"/>
-            <a:ext cx="1690623" cy="1440160"/>
+            <a:off x="611560" y="1376772"/>
+            <a:ext cx="2448272" cy="1836204"/>
           </a:xfrm>
           <a:prstGeom prst="rect">
             <a:avLst/>
@@ -8490,7 +8103,7 @@
       </p:pic>
       <p:pic>
         <p:nvPicPr>
-          <p:cNvPr id="36" name="Picture 8" descr="http://okna-nice.ru/images/okna_v_panelnii_dom.png"/>
+          <p:cNvPr id="37" name="Picture 4" descr="http://files.softicons.com/download/business-icons/desktop-business-icons-by-aha-soft/png/256x256/case.png"/>
           <p:cNvPicPr>
             <a:picLocks noChangeAspect="1" noChangeArrowheads="1"/>
           </p:cNvPicPr>
@@ -8505,8 +8118,8 @@
         </p:blipFill>
         <p:spPr bwMode="auto">
           <a:xfrm>
-            <a:off x="611560" y="1376772"/>
-            <a:ext cx="2448272" cy="1836204"/>
+            <a:off x="971600" y="3861048"/>
+            <a:ext cx="1800200" cy="1800200"/>
           </a:xfrm>
           <a:prstGeom prst="rect">
             <a:avLst/>
@@ -8514,9 +8127,59 @@
           <a:noFill/>
         </p:spPr>
       </p:pic>
+      <p:sp>
+        <p:nvSpPr>
+          <p:cNvPr id="20" name="Прямоугольник 19"/>
+          <p:cNvSpPr/>
+          <p:nvPr/>
+        </p:nvSpPr>
+        <p:spPr>
+          <a:xfrm>
+            <a:off x="3851920" y="1146230"/>
+            <a:ext cx="4752528" cy="338554"/>
+          </a:xfrm>
+          <a:prstGeom prst="rect">
+            <a:avLst/>
+          </a:prstGeom>
+        </p:spPr>
+        <p:txBody>
+          <a:bodyPr wrap="square">
+            <a:spAutoFit/>
+          </a:bodyPr>
+          <a:lstStyle/>
+          <a:p>
+            <a:pPr algn="just"/>
+            <a:r>
+              <a:rPr lang="ru-RU" sz="1600" b="1" dirty="0" smtClean="0">
+                <a:latin typeface="Arial" pitchFamily="34" charset="0"/>
+                <a:cs typeface="Arial" pitchFamily="34" charset="0"/>
+              </a:rPr>
+              <a:t>Взаимодействие через </a:t>
+            </a:r>
+            <a:r>
+              <a:rPr lang="en-US" sz="1600" b="1" dirty="0" smtClean="0">
+                <a:latin typeface="Arial" pitchFamily="34" charset="0"/>
+                <a:cs typeface="Arial" pitchFamily="34" charset="0"/>
+              </a:rPr>
+              <a:t>API-</a:t>
+            </a:r>
+            <a:r>
+              <a:rPr lang="ru-RU" sz="1600" b="1" dirty="0" smtClean="0">
+                <a:latin typeface="Arial" pitchFamily="34" charset="0"/>
+                <a:cs typeface="Arial" pitchFamily="34" charset="0"/>
+              </a:rPr>
+              <a:t>интерфейс</a:t>
+            </a:r>
+            <a:endParaRPr lang="ru-RU" sz="1600" b="1" dirty="0">
+              <a:latin typeface="Arial" pitchFamily="34" charset="0"/>
+              <a:cs typeface="Arial" pitchFamily="34" charset="0"/>
+            </a:endParaRPr>
+          </a:p>
+        </p:txBody>
+      </p:sp>
       <p:pic>
         <p:nvPicPr>
-          <p:cNvPr id="37" name="Picture 4" descr="http://files.softicons.com/download/business-icons/desktop-business-icons-by-aha-soft/png/256x256/case.png"/>
+          <p:cNvPr id="17410" name="Picture 2" descr="http://www.probasegroup.com/wp-content/uploads/2014/09/learnmore-api.png"/>
           <p:cNvPicPr>
             <a:picLocks noChangeAspect="1" noChangeArrowheads="1"/>
           </p:cNvPicPr>
@@ -8531,8 +8194,8 @@
         </p:blipFill>
         <p:spPr bwMode="auto">
           <a:xfrm>
-            <a:off x="971600" y="3861048"/>
-            <a:ext cx="1800200" cy="1800200"/>
+            <a:off x="3635896" y="1628800"/>
+            <a:ext cx="2850000" cy="1728192"/>
           </a:xfrm>
           <a:prstGeom prst="rect">
             <a:avLst/>
@@ -8540,59 +8203,9 @@
           <a:noFill/>
         </p:spPr>
       </p:pic>
-      <p:sp>
-        <p:nvSpPr>
-          <p:cNvPr id="20" name="Прямоугольник 19"/>
-          <p:cNvSpPr/>
-          <p:nvPr/>
-        </p:nvSpPr>
-        <p:spPr>
-          <a:xfrm>
-            <a:off x="3851920" y="1074222"/>
-            <a:ext cx="4752528" cy="338554"/>
-          </a:xfrm>
-          <a:prstGeom prst="rect">
-            <a:avLst/>
-          </a:prstGeom>
-        </p:spPr>
-        <p:txBody>
-          <a:bodyPr wrap="square">
-            <a:spAutoFit/>
-          </a:bodyPr>
-          <a:lstStyle/>
-          <a:p>
-            <a:pPr algn="just"/>
-            <a:r>
-              <a:rPr lang="ru-RU" sz="1600" b="1" dirty="0" smtClean="0">
-                <a:latin typeface="Arial" pitchFamily="34" charset="0"/>
-                <a:cs typeface="Arial" pitchFamily="34" charset="0"/>
-              </a:rPr>
-              <a:t>Взаимодействие через </a:t>
-            </a:r>
-            <a:r>
-              <a:rPr lang="en-US" sz="1600" b="1" dirty="0" smtClean="0">
-                <a:latin typeface="Arial" pitchFamily="34" charset="0"/>
-                <a:cs typeface="Arial" pitchFamily="34" charset="0"/>
-              </a:rPr>
-              <a:t>API-</a:t>
-            </a:r>
-            <a:r>
-              <a:rPr lang="ru-RU" sz="1600" b="1" dirty="0" smtClean="0">
-                <a:latin typeface="Arial" pitchFamily="34" charset="0"/>
-                <a:cs typeface="Arial" pitchFamily="34" charset="0"/>
-              </a:rPr>
-              <a:t>интерфейс</a:t>
-            </a:r>
-            <a:endParaRPr lang="ru-RU" sz="1600" b="1" dirty="0">
-              <a:latin typeface="Arial" pitchFamily="34" charset="0"/>
-              <a:cs typeface="Arial" pitchFamily="34" charset="0"/>
-            </a:endParaRPr>
-          </a:p>
-        </p:txBody>
-      </p:sp>
       <p:pic>
         <p:nvPicPr>
-          <p:cNvPr id="17410" name="Picture 2" descr="http://www.probasegroup.com/wp-content/uploads/2014/09/learnmore-api.png"/>
+          <p:cNvPr id="21" name="Picture 20" descr="http://www.bizagi.com/assets/images/standards-page/logo_soap.jpg"/>
           <p:cNvPicPr>
             <a:picLocks noChangeAspect="1" noChangeArrowheads="1"/>
           </p:cNvPicPr>
@@ -8607,34 +8220,8 @@
         </p:blipFill>
         <p:spPr bwMode="auto">
           <a:xfrm>
-            <a:off x="3851920" y="1412776"/>
-            <a:ext cx="2256250" cy="1368152"/>
-          </a:xfrm>
-          <a:prstGeom prst="rect">
-            <a:avLst/>
-          </a:prstGeom>
-          <a:noFill/>
-        </p:spPr>
-      </p:pic>
-      <p:pic>
-        <p:nvPicPr>
-          <p:cNvPr id="21" name="Picture 20" descr="http://www.bizagi.com/assets/images/standards-page/logo_soap.jpg"/>
-          <p:cNvPicPr>
-            <a:picLocks noChangeAspect="1" noChangeArrowheads="1"/>
-          </p:cNvPicPr>
-          <p:nvPr/>
-        </p:nvPicPr>
-        <p:blipFill>
-          <a:blip r:embed="rId7" cstate="print"/>
-          <a:srcRect/>
-          <a:stretch>
-            <a:fillRect/>
-          </a:stretch>
-        </p:blipFill>
-        <p:spPr bwMode="auto">
-          <a:xfrm>
-            <a:off x="6372200" y="1556792"/>
-            <a:ext cx="1644180" cy="1080120"/>
+            <a:off x="6372200" y="1844824"/>
+            <a:ext cx="2016224" cy="1324529"/>
           </a:xfrm>
           <a:prstGeom prst="rect">
             <a:avLst/>

</xml_diff>

<commit_message>
Did everything. Last one is to pass
</commit_message>
<xml_diff>
--- a/Презентация/Боевая/Подсистема_интеграции_4.pptx
+++ b/Презентация/Боевая/Подсистема_интеграции_4.pptx
@@ -4,6 +4,9 @@
   <p:sldMasterIdLst>
     <p:sldMasterId id="2147483648" r:id="rId1"/>
   </p:sldMasterIdLst>
+  <p:notesMasterIdLst>
+    <p:notesMasterId r:id="rId21"/>
+  </p:notesMasterIdLst>
   <p:sldIdLst>
     <p:sldId id="256" r:id="rId2"/>
     <p:sldId id="257" r:id="rId3"/>
@@ -17,11 +20,11 @@
     <p:sldId id="268" r:id="rId11"/>
     <p:sldId id="270" r:id="rId12"/>
     <p:sldId id="271" r:id="rId13"/>
-    <p:sldId id="261" r:id="rId14"/>
-    <p:sldId id="272" r:id="rId15"/>
-    <p:sldId id="273" r:id="rId16"/>
-    <p:sldId id="274" r:id="rId17"/>
-    <p:sldId id="264" r:id="rId18"/>
+    <p:sldId id="264" r:id="rId14"/>
+    <p:sldId id="261" r:id="rId15"/>
+    <p:sldId id="272" r:id="rId16"/>
+    <p:sldId id="273" r:id="rId17"/>
+    <p:sldId id="274" r:id="rId18"/>
     <p:sldId id="262" r:id="rId19"/>
     <p:sldId id="275" r:id="rId20"/>
   </p:sldIdLst>
@@ -123,6 +126,434 @@
     </a:lvl9pPr>
   </p:defaultTextStyle>
 </p:presentation>
+</file>
+
+<file path=ppt/notesMasters/notesMaster1.xml><?xml version="1.0" encoding="utf-8"?>
+<p:notesMaster xmlns:a="http://schemas.openxmlformats.org/drawingml/2006/main" xmlns:r="http://schemas.openxmlformats.org/officeDocument/2006/relationships" xmlns:p="http://schemas.openxmlformats.org/presentationml/2006/main">
+  <p:cSld>
+    <p:bg>
+      <p:bgRef idx="1001">
+        <a:schemeClr val="bg1"/>
+      </p:bgRef>
+    </p:bg>
+    <p:spTree>
+      <p:nvGrpSpPr>
+        <p:cNvPr id="1" name=""/>
+        <p:cNvGrpSpPr/>
+        <p:nvPr/>
+      </p:nvGrpSpPr>
+      <p:grpSpPr>
+        <a:xfrm>
+          <a:off x="0" y="0"/>
+          <a:ext cx="0" cy="0"/>
+          <a:chOff x="0" y="0"/>
+          <a:chExt cx="0" cy="0"/>
+        </a:xfrm>
+      </p:grpSpPr>
+      <p:sp>
+        <p:nvSpPr>
+          <p:cNvPr id="2" name="Верхний колонтитул 1"/>
+          <p:cNvSpPr>
+            <a:spLocks noGrp="1"/>
+          </p:cNvSpPr>
+          <p:nvPr>
+            <p:ph type="hdr" sz="quarter"/>
+          </p:nvPr>
+        </p:nvSpPr>
+        <p:spPr>
+          <a:xfrm>
+            <a:off x="0" y="0"/>
+            <a:ext cx="2971800" cy="457200"/>
+          </a:xfrm>
+          <a:prstGeom prst="rect">
+            <a:avLst/>
+          </a:prstGeom>
+        </p:spPr>
+        <p:txBody>
+          <a:bodyPr vert="horz" lIns="91440" tIns="45720" rIns="91440" bIns="45720" rtlCol="0"/>
+          <a:lstStyle>
+            <a:lvl1pPr algn="l">
+              <a:defRPr sz="1200"/>
+            </a:lvl1pPr>
+          </a:lstStyle>
+          <a:p>
+            <a:endParaRPr lang="ru-RU"/>
+          </a:p>
+        </p:txBody>
+      </p:sp>
+      <p:sp>
+        <p:nvSpPr>
+          <p:cNvPr id="3" name="Дата 2"/>
+          <p:cNvSpPr>
+            <a:spLocks noGrp="1"/>
+          </p:cNvSpPr>
+          <p:nvPr>
+            <p:ph type="dt" idx="1"/>
+          </p:nvPr>
+        </p:nvSpPr>
+        <p:spPr>
+          <a:xfrm>
+            <a:off x="3884613" y="0"/>
+            <a:ext cx="2971800" cy="457200"/>
+          </a:xfrm>
+          <a:prstGeom prst="rect">
+            <a:avLst/>
+          </a:prstGeom>
+        </p:spPr>
+        <p:txBody>
+          <a:bodyPr vert="horz" lIns="91440" tIns="45720" rIns="91440" bIns="45720" rtlCol="0"/>
+          <a:lstStyle>
+            <a:lvl1pPr algn="r">
+              <a:defRPr sz="1200"/>
+            </a:lvl1pPr>
+          </a:lstStyle>
+          <a:p>
+            <a:fld id="{5ECBAAF8-0921-467B-A50D-F0EF6D5F1156}" type="datetimeFigureOut">
+              <a:rPr lang="ru-RU" smtClean="0"/>
+              <a:t>15.06.2015</a:t>
+            </a:fld>
+            <a:endParaRPr lang="ru-RU"/>
+          </a:p>
+        </p:txBody>
+      </p:sp>
+      <p:sp>
+        <p:nvSpPr>
+          <p:cNvPr id="4" name="Образ слайда 3"/>
+          <p:cNvSpPr>
+            <a:spLocks noGrp="1" noRot="1" noChangeAspect="1"/>
+          </p:cNvSpPr>
+          <p:nvPr>
+            <p:ph type="sldImg" idx="2"/>
+          </p:nvPr>
+        </p:nvSpPr>
+        <p:spPr>
+          <a:xfrm>
+            <a:off x="1143000" y="685800"/>
+            <a:ext cx="4572000" cy="3429000"/>
+          </a:xfrm>
+          <a:prstGeom prst="rect">
+            <a:avLst/>
+          </a:prstGeom>
+          <a:noFill/>
+          <a:ln w="12700">
+            <a:solidFill>
+              <a:prstClr val="black"/>
+            </a:solidFill>
+          </a:ln>
+        </p:spPr>
+        <p:txBody>
+          <a:bodyPr vert="horz" lIns="91440" tIns="45720" rIns="91440" bIns="45720" rtlCol="0" anchor="ctr"/>
+          <a:lstStyle/>
+          <a:p>
+            <a:endParaRPr lang="ru-RU"/>
+          </a:p>
+        </p:txBody>
+      </p:sp>
+      <p:sp>
+        <p:nvSpPr>
+          <p:cNvPr id="5" name="Заметки 4"/>
+          <p:cNvSpPr>
+            <a:spLocks noGrp="1"/>
+          </p:cNvSpPr>
+          <p:nvPr>
+            <p:ph type="body" sz="quarter" idx="3"/>
+          </p:nvPr>
+        </p:nvSpPr>
+        <p:spPr>
+          <a:xfrm>
+            <a:off x="685800" y="4343400"/>
+            <a:ext cx="5486400" cy="4114800"/>
+          </a:xfrm>
+          <a:prstGeom prst="rect">
+            <a:avLst/>
+          </a:prstGeom>
+        </p:spPr>
+        <p:txBody>
+          <a:bodyPr vert="horz" lIns="91440" tIns="45720" rIns="91440" bIns="45720" rtlCol="0">
+            <a:normAutofit/>
+          </a:bodyPr>
+          <a:lstStyle/>
+          <a:p>
+            <a:pPr lvl="0"/>
+            <a:r>
+              <a:rPr lang="ru-RU" smtClean="0"/>
+              <a:t>Образец текста</a:t>
+            </a:r>
+          </a:p>
+          <a:p>
+            <a:pPr lvl="1"/>
+            <a:r>
+              <a:rPr lang="ru-RU" smtClean="0"/>
+              <a:t>Второй уровень</a:t>
+            </a:r>
+          </a:p>
+          <a:p>
+            <a:pPr lvl="2"/>
+            <a:r>
+              <a:rPr lang="ru-RU" smtClean="0"/>
+              <a:t>Третий уровень</a:t>
+            </a:r>
+          </a:p>
+          <a:p>
+            <a:pPr lvl="3"/>
+            <a:r>
+              <a:rPr lang="ru-RU" smtClean="0"/>
+              <a:t>Четвертый уровень</a:t>
+            </a:r>
+          </a:p>
+          <a:p>
+            <a:pPr lvl="4"/>
+            <a:r>
+              <a:rPr lang="ru-RU" smtClean="0"/>
+              <a:t>Пятый уровень</a:t>
+            </a:r>
+            <a:endParaRPr lang="ru-RU"/>
+          </a:p>
+        </p:txBody>
+      </p:sp>
+      <p:sp>
+        <p:nvSpPr>
+          <p:cNvPr id="6" name="Нижний колонтитул 5"/>
+          <p:cNvSpPr>
+            <a:spLocks noGrp="1"/>
+          </p:cNvSpPr>
+          <p:nvPr>
+            <p:ph type="ftr" sz="quarter" idx="4"/>
+          </p:nvPr>
+        </p:nvSpPr>
+        <p:spPr>
+          <a:xfrm>
+            <a:off x="0" y="8685213"/>
+            <a:ext cx="2971800" cy="457200"/>
+          </a:xfrm>
+          <a:prstGeom prst="rect">
+            <a:avLst/>
+          </a:prstGeom>
+        </p:spPr>
+        <p:txBody>
+          <a:bodyPr vert="horz" lIns="91440" tIns="45720" rIns="91440" bIns="45720" rtlCol="0" anchor="b"/>
+          <a:lstStyle>
+            <a:lvl1pPr algn="l">
+              <a:defRPr sz="1200"/>
+            </a:lvl1pPr>
+          </a:lstStyle>
+          <a:p>
+            <a:endParaRPr lang="ru-RU"/>
+          </a:p>
+        </p:txBody>
+      </p:sp>
+      <p:sp>
+        <p:nvSpPr>
+          <p:cNvPr id="7" name="Номер слайда 6"/>
+          <p:cNvSpPr>
+            <a:spLocks noGrp="1"/>
+          </p:cNvSpPr>
+          <p:nvPr>
+            <p:ph type="sldNum" sz="quarter" idx="5"/>
+          </p:nvPr>
+        </p:nvSpPr>
+        <p:spPr>
+          <a:xfrm>
+            <a:off x="3884613" y="8685213"/>
+            <a:ext cx="2971800" cy="457200"/>
+          </a:xfrm>
+          <a:prstGeom prst="rect">
+            <a:avLst/>
+          </a:prstGeom>
+        </p:spPr>
+        <p:txBody>
+          <a:bodyPr vert="horz" lIns="91440" tIns="45720" rIns="91440" bIns="45720" rtlCol="0" anchor="b"/>
+          <a:lstStyle>
+            <a:lvl1pPr algn="r">
+              <a:defRPr sz="1200"/>
+            </a:lvl1pPr>
+          </a:lstStyle>
+          <a:p>
+            <a:fld id="{57844D0F-F9FA-4C50-AAC3-8B1D8BF16A86}" type="slidenum">
+              <a:rPr lang="ru-RU" smtClean="0"/>
+              <a:t>‹#›</a:t>
+            </a:fld>
+            <a:endParaRPr lang="ru-RU"/>
+          </a:p>
+        </p:txBody>
+      </p:sp>
+    </p:spTree>
+  </p:cSld>
+  <p:clrMap bg1="lt1" tx1="dk1" bg2="lt2" tx2="dk2" accent1="accent1" accent2="accent2" accent3="accent3" accent4="accent4" accent5="accent5" accent6="accent6" hlink="hlink" folHlink="folHlink"/>
+  <p:notesStyle>
+    <a:lvl1pPr marL="0" algn="l" defTabSz="914400" rtl="0" eaLnBrk="1" latinLnBrk="0" hangingPunct="1">
+      <a:defRPr sz="1200" kern="1200">
+        <a:solidFill>
+          <a:schemeClr val="tx1"/>
+        </a:solidFill>
+        <a:latin typeface="+mn-lt"/>
+        <a:ea typeface="+mn-ea"/>
+        <a:cs typeface="+mn-cs"/>
+      </a:defRPr>
+    </a:lvl1pPr>
+    <a:lvl2pPr marL="457200" algn="l" defTabSz="914400" rtl="0" eaLnBrk="1" latinLnBrk="0" hangingPunct="1">
+      <a:defRPr sz="1200" kern="1200">
+        <a:solidFill>
+          <a:schemeClr val="tx1"/>
+        </a:solidFill>
+        <a:latin typeface="+mn-lt"/>
+        <a:ea typeface="+mn-ea"/>
+        <a:cs typeface="+mn-cs"/>
+      </a:defRPr>
+    </a:lvl2pPr>
+    <a:lvl3pPr marL="914400" algn="l" defTabSz="914400" rtl="0" eaLnBrk="1" latinLnBrk="0" hangingPunct="1">
+      <a:defRPr sz="1200" kern="1200">
+        <a:solidFill>
+          <a:schemeClr val="tx1"/>
+        </a:solidFill>
+        <a:latin typeface="+mn-lt"/>
+        <a:ea typeface="+mn-ea"/>
+        <a:cs typeface="+mn-cs"/>
+      </a:defRPr>
+    </a:lvl3pPr>
+    <a:lvl4pPr marL="1371600" algn="l" defTabSz="914400" rtl="0" eaLnBrk="1" latinLnBrk="0" hangingPunct="1">
+      <a:defRPr sz="1200" kern="1200">
+        <a:solidFill>
+          <a:schemeClr val="tx1"/>
+        </a:solidFill>
+        <a:latin typeface="+mn-lt"/>
+        <a:ea typeface="+mn-ea"/>
+        <a:cs typeface="+mn-cs"/>
+      </a:defRPr>
+    </a:lvl4pPr>
+    <a:lvl5pPr marL="1828800" algn="l" defTabSz="914400" rtl="0" eaLnBrk="1" latinLnBrk="0" hangingPunct="1">
+      <a:defRPr sz="1200" kern="1200">
+        <a:solidFill>
+          <a:schemeClr val="tx1"/>
+        </a:solidFill>
+        <a:latin typeface="+mn-lt"/>
+        <a:ea typeface="+mn-ea"/>
+        <a:cs typeface="+mn-cs"/>
+      </a:defRPr>
+    </a:lvl5pPr>
+    <a:lvl6pPr marL="2286000" algn="l" defTabSz="914400" rtl="0" eaLnBrk="1" latinLnBrk="0" hangingPunct="1">
+      <a:defRPr sz="1200" kern="1200">
+        <a:solidFill>
+          <a:schemeClr val="tx1"/>
+        </a:solidFill>
+        <a:latin typeface="+mn-lt"/>
+        <a:ea typeface="+mn-ea"/>
+        <a:cs typeface="+mn-cs"/>
+      </a:defRPr>
+    </a:lvl6pPr>
+    <a:lvl7pPr marL="2743200" algn="l" defTabSz="914400" rtl="0" eaLnBrk="1" latinLnBrk="0" hangingPunct="1">
+      <a:defRPr sz="1200" kern="1200">
+        <a:solidFill>
+          <a:schemeClr val="tx1"/>
+        </a:solidFill>
+        <a:latin typeface="+mn-lt"/>
+        <a:ea typeface="+mn-ea"/>
+        <a:cs typeface="+mn-cs"/>
+      </a:defRPr>
+    </a:lvl7pPr>
+    <a:lvl8pPr marL="3200400" algn="l" defTabSz="914400" rtl="0" eaLnBrk="1" latinLnBrk="0" hangingPunct="1">
+      <a:defRPr sz="1200" kern="1200">
+        <a:solidFill>
+          <a:schemeClr val="tx1"/>
+        </a:solidFill>
+        <a:latin typeface="+mn-lt"/>
+        <a:ea typeface="+mn-ea"/>
+        <a:cs typeface="+mn-cs"/>
+      </a:defRPr>
+    </a:lvl8pPr>
+    <a:lvl9pPr marL="3657600" algn="l" defTabSz="914400" rtl="0" eaLnBrk="1" latinLnBrk="0" hangingPunct="1">
+      <a:defRPr sz="1200" kern="1200">
+        <a:solidFill>
+          <a:schemeClr val="tx1"/>
+        </a:solidFill>
+        <a:latin typeface="+mn-lt"/>
+        <a:ea typeface="+mn-ea"/>
+        <a:cs typeface="+mn-cs"/>
+      </a:defRPr>
+    </a:lvl9pPr>
+  </p:notesStyle>
+</p:notesMaster>
+</file>
+
+<file path=ppt/notesSlides/notesSlide1.xml><?xml version="1.0" encoding="utf-8"?>
+<p:notes xmlns:a="http://schemas.openxmlformats.org/drawingml/2006/main" xmlns:r="http://schemas.openxmlformats.org/officeDocument/2006/relationships" xmlns:p="http://schemas.openxmlformats.org/presentationml/2006/main">
+  <p:cSld>
+    <p:spTree>
+      <p:nvGrpSpPr>
+        <p:cNvPr id="1" name=""/>
+        <p:cNvGrpSpPr/>
+        <p:nvPr/>
+      </p:nvGrpSpPr>
+      <p:grpSpPr>
+        <a:xfrm>
+          <a:off x="0" y="0"/>
+          <a:ext cx="0" cy="0"/>
+          <a:chOff x="0" y="0"/>
+          <a:chExt cx="0" cy="0"/>
+        </a:xfrm>
+      </p:grpSpPr>
+      <p:sp>
+        <p:nvSpPr>
+          <p:cNvPr id="2" name="Образ слайда 1"/>
+          <p:cNvSpPr>
+            <a:spLocks noGrp="1" noRot="1" noChangeAspect="1"/>
+          </p:cNvSpPr>
+          <p:nvPr>
+            <p:ph type="sldImg"/>
+          </p:nvPr>
+        </p:nvSpPr>
+        <p:spPr/>
+      </p:sp>
+      <p:sp>
+        <p:nvSpPr>
+          <p:cNvPr id="3" name="Заметки 2"/>
+          <p:cNvSpPr>
+            <a:spLocks noGrp="1"/>
+          </p:cNvSpPr>
+          <p:nvPr>
+            <p:ph type="body" idx="1"/>
+          </p:nvPr>
+        </p:nvSpPr>
+        <p:spPr/>
+        <p:txBody>
+          <a:bodyPr>
+            <a:normAutofit/>
+          </a:bodyPr>
+          <a:lstStyle/>
+          <a:p>
+            <a:endParaRPr lang="ru-RU" dirty="0"/>
+          </a:p>
+        </p:txBody>
+      </p:sp>
+      <p:sp>
+        <p:nvSpPr>
+          <p:cNvPr id="4" name="Номер слайда 3"/>
+          <p:cNvSpPr>
+            <a:spLocks noGrp="1"/>
+          </p:cNvSpPr>
+          <p:nvPr>
+            <p:ph type="sldNum" sz="quarter" idx="10"/>
+          </p:nvPr>
+        </p:nvSpPr>
+        <p:spPr/>
+        <p:txBody>
+          <a:bodyPr/>
+          <a:lstStyle/>
+          <a:p>
+            <a:fld id="{57844D0F-F9FA-4C50-AAC3-8B1D8BF16A86}" type="slidenum">
+              <a:rPr lang="ru-RU" smtClean="0"/>
+              <a:t>1</a:t>
+            </a:fld>
+            <a:endParaRPr lang="ru-RU"/>
+          </a:p>
+        </p:txBody>
+      </p:sp>
+    </p:spTree>
+  </p:cSld>
+  <p:clrMapOvr>
+    <a:masterClrMapping/>
+  </p:clrMapOvr>
+</p:notes>
 </file>
 
 <file path=ppt/slideLayouts/slideLayout1.xml><?xml version="1.0" encoding="utf-8"?>
@@ -3450,7 +3881,7 @@
         <p:spPr>
           <a:xfrm>
             <a:off x="251520" y="764704"/>
-            <a:ext cx="4248472" cy="5760640"/>
+            <a:ext cx="4320480" cy="5760640"/>
           </a:xfrm>
           <a:prstGeom prst="rect">
             <a:avLst/>
@@ -4291,7 +4722,7 @@
         </p:nvSpPr>
         <p:spPr>
           <a:xfrm>
-            <a:off x="5529725" y="6237312"/>
+            <a:off x="5385709" y="6237312"/>
             <a:ext cx="842475" cy="276999"/>
           </a:xfrm>
           <a:prstGeom prst="rect">
@@ -4324,7 +4755,7 @@
         </p:nvSpPr>
         <p:spPr>
           <a:xfrm>
-            <a:off x="7452320" y="6248345"/>
+            <a:off x="7176037" y="6248345"/>
             <a:ext cx="842475" cy="276999"/>
           </a:xfrm>
           <a:prstGeom prst="rect">
@@ -4362,7 +4793,7 @@
         </p:blipFill>
         <p:spPr bwMode="auto">
           <a:xfrm>
-            <a:off x="5292080" y="5373216"/>
+            <a:off x="5220072" y="5373216"/>
             <a:ext cx="1224136" cy="918102"/>
           </a:xfrm>
           <a:prstGeom prst="rect">
@@ -4388,7 +4819,7 @@
         </p:blipFill>
         <p:spPr bwMode="auto">
           <a:xfrm>
-            <a:off x="7380312" y="5311080"/>
+            <a:off x="7092280" y="5311080"/>
             <a:ext cx="998240" cy="998240"/>
           </a:xfrm>
           <a:prstGeom prst="rect">
@@ -4429,81 +4860,39 @@
           <a:chExt cx="0" cy="0"/>
         </a:xfrm>
       </p:grpSpPr>
-      <p:pic>
-        <p:nvPicPr>
-          <p:cNvPr id="12" name="Рисунок 11"/>
-          <p:cNvPicPr/>
-          <p:nvPr/>
-        </p:nvPicPr>
-        <p:blipFill>
-          <a:blip r:embed="rId2" cstate="print">
-            <a:grayscl/>
-          </a:blip>
-          <a:srcRect/>
-          <a:stretch>
-            <a:fillRect/>
-          </a:stretch>
-        </p:blipFill>
-        <p:spPr bwMode="auto">
-          <a:xfrm>
-            <a:off x="2657533" y="2924944"/>
-            <a:ext cx="6162939" cy="3275938"/>
-          </a:xfrm>
-          <a:prstGeom prst="rect">
-            <a:avLst/>
-          </a:prstGeom>
-          <a:ln>
-            <a:noFill/>
-          </a:ln>
-          <a:effectLst>
-            <a:outerShdw blurRad="292100" dist="139700" dir="2700000" algn="tl" rotWithShape="0">
-              <a:srgbClr val="333333">
-                <a:alpha val="65000"/>
-              </a:srgbClr>
-            </a:outerShdw>
-          </a:effectLst>
-        </p:spPr>
-      </p:pic>
-      <p:pic>
-        <p:nvPicPr>
-          <p:cNvPr id="4100" name="Picture 4"/>
-          <p:cNvPicPr>
-            <a:picLocks noChangeAspect="1" noChangeArrowheads="1"/>
-          </p:cNvPicPr>
-          <p:nvPr/>
-        </p:nvPicPr>
-        <p:blipFill>
-          <a:blip r:embed="rId3" cstate="print">
-            <a:grayscl/>
-          </a:blip>
-          <a:srcRect/>
-          <a:stretch>
-            <a:fillRect/>
-          </a:stretch>
-        </p:blipFill>
-        <p:spPr bwMode="auto">
-          <a:xfrm>
-            <a:off x="323528" y="4077072"/>
-            <a:ext cx="5220072" cy="2236453"/>
-          </a:xfrm>
-          <a:prstGeom prst="rect">
-            <a:avLst/>
-          </a:prstGeom>
-          <a:ln>
-            <a:noFill/>
-          </a:ln>
-          <a:effectLst>
-            <a:outerShdw blurRad="292100" dist="139700" dir="2700000" algn="tl" rotWithShape="0">
-              <a:srgbClr val="333333">
-                <a:alpha val="65000"/>
-              </a:srgbClr>
-            </a:outerShdw>
-          </a:effectLst>
-        </p:spPr>
-      </p:pic>
-      <p:sp>
-        <p:nvSpPr>
-          <p:cNvPr id="4" name="Прямоугольник 3"/>
+      <p:sp>
+        <p:nvSpPr>
+          <p:cNvPr id="4" name="Заголовок 1"/>
+          <p:cNvSpPr>
+            <a:spLocks noGrp="1"/>
+          </p:cNvSpPr>
+          <p:nvPr>
+            <p:ph type="title"/>
+          </p:nvPr>
+        </p:nvSpPr>
+        <p:spPr>
+          <a:xfrm>
+            <a:off x="457200" y="116632"/>
+            <a:ext cx="8229600" cy="648072"/>
+          </a:xfrm>
+        </p:spPr>
+        <p:txBody>
+          <a:bodyPr>
+            <a:normAutofit/>
+          </a:bodyPr>
+          <a:lstStyle/>
+          <a:p>
+            <a:r>
+              <a:rPr lang="ru-RU" sz="3200" dirty="0" smtClean="0"/>
+              <a:t>Использованные технологии и аналоги</a:t>
+            </a:r>
+            <a:endParaRPr lang="ru-RU" sz="3200" dirty="0"/>
+          </a:p>
+        </p:txBody>
+      </p:sp>
+      <p:sp>
+        <p:nvSpPr>
+          <p:cNvPr id="5" name="Прямоугольник 4"/>
           <p:cNvSpPr/>
           <p:nvPr/>
         </p:nvSpPr>
@@ -4542,67 +4931,16 @@
           </a:p>
         </p:txBody>
       </p:sp>
-      <p:sp>
-        <p:nvSpPr>
-          <p:cNvPr id="5" name="Заголовок 1"/>
-          <p:cNvSpPr txBox="1">
-            <a:spLocks/>
-          </p:cNvSpPr>
-          <p:nvPr/>
-        </p:nvSpPr>
-        <p:spPr>
-          <a:xfrm>
-            <a:off x="457200" y="116632"/>
-            <a:ext cx="8229600" cy="648072"/>
-          </a:xfrm>
-          <a:prstGeom prst="rect">
-            <a:avLst/>
-          </a:prstGeom>
-        </p:spPr>
-        <p:txBody>
-          <a:bodyPr vert="horz" lIns="91440" tIns="45720" rIns="91440" bIns="45720" rtlCol="0" anchor="ctr">
-            <a:normAutofit/>
-          </a:bodyPr>
-          <a:lstStyle/>
-          <a:p>
-            <a:pPr lvl="0" algn="ctr">
-              <a:spcBef>
-                <a:spcPct val="0"/>
-              </a:spcBef>
-            </a:pPr>
-            <a:r>
-              <a:rPr lang="ru-RU" sz="3200" dirty="0" smtClean="0"/>
-              <a:t>Пользовательский интерфейс</a:t>
-            </a:r>
-            <a:endParaRPr kumimoji="0" lang="ru-RU" sz="3200" b="0" i="0" u="none" strike="noStrike" kern="1200" cap="none" spc="0" normalizeH="0" baseline="0" noProof="0" dirty="0" smtClean="0">
-              <a:ln>
-                <a:noFill/>
-              </a:ln>
-              <a:solidFill>
-                <a:schemeClr val="tx1"/>
-              </a:solidFill>
-              <a:effectLst/>
-              <a:uLnTx/>
-              <a:uFillTx/>
-              <a:latin typeface="+mj-lt"/>
-              <a:ea typeface="+mj-ea"/>
-              <a:cs typeface="+mj-cs"/>
-            </a:endParaRPr>
-          </a:p>
-        </p:txBody>
-      </p:sp>
       <p:pic>
         <p:nvPicPr>
-          <p:cNvPr id="9" name="Picture 3"/>
+          <p:cNvPr id="28676" name="Picture 4" descr="http://www.nareshit.in/wp-content/uploads/2013/07/Wcf.png"/>
           <p:cNvPicPr>
             <a:picLocks noChangeAspect="1" noChangeArrowheads="1"/>
           </p:cNvPicPr>
           <p:nvPr/>
         </p:nvPicPr>
         <p:blipFill>
-          <a:blip r:embed="rId4" cstate="print">
-            <a:grayscl/>
-          </a:blip>
+          <a:blip r:embed="rId2" cstate="print"/>
           <a:srcRect/>
           <a:stretch>
             <a:fillRect/>
@@ -4610,45 +4948,172 @@
         </p:blipFill>
         <p:spPr bwMode="auto">
           <a:xfrm>
-            <a:off x="3923928" y="1219225"/>
-            <a:ext cx="4990130" cy="3577927"/>
-          </a:xfrm>
-          <a:prstGeom prst="rect">
-            <a:avLst/>
-          </a:prstGeom>
+            <a:off x="611560" y="2420887"/>
+            <a:ext cx="1944216" cy="1105535"/>
+          </a:xfrm>
+          <a:prstGeom prst="rect">
+            <a:avLst/>
+          </a:prstGeom>
+          <a:noFill/>
+        </p:spPr>
+      </p:pic>
+      <p:pic>
+        <p:nvPicPr>
+          <p:cNvPr id="28678" name="Picture 6" descr="http://pressdev.ru/wp-content/uploads/2013/10/ms-sql-server-300x246.png"/>
+          <p:cNvPicPr>
+            <a:picLocks noChangeAspect="1" noChangeArrowheads="1"/>
+          </p:cNvPicPr>
+          <p:nvPr/>
+        </p:nvPicPr>
+        <p:blipFill>
+          <a:blip r:embed="rId3" cstate="print"/>
+          <a:srcRect/>
+          <a:stretch>
+            <a:fillRect/>
+          </a:stretch>
+        </p:blipFill>
+        <p:spPr bwMode="auto">
+          <a:xfrm>
+            <a:off x="611560" y="4797151"/>
+            <a:ext cx="2016224" cy="1653305"/>
+          </a:xfrm>
+          <a:prstGeom prst="rect">
+            <a:avLst/>
+          </a:prstGeom>
+          <a:noFill/>
+        </p:spPr>
+      </p:pic>
+      <p:sp>
+        <p:nvSpPr>
+          <p:cNvPr id="28684" name="AutoShape 12" descr="http://ohdoylerules.com/content/images/css3.svg"/>
+          <p:cNvSpPr>
+            <a:spLocks noChangeAspect="1" noChangeArrowheads="1"/>
+          </p:cNvSpPr>
+          <p:nvPr/>
+        </p:nvSpPr>
+        <p:spPr bwMode="auto">
+          <a:xfrm>
+            <a:off x="155575" y="-144463"/>
+            <a:ext cx="304800" cy="304801"/>
+          </a:xfrm>
+          <a:prstGeom prst="rect">
+            <a:avLst/>
+          </a:prstGeom>
+          <a:noFill/>
+        </p:spPr>
+        <p:txBody>
+          <a:bodyPr vert="horz" wrap="square" lIns="91440" tIns="45720" rIns="91440" bIns="45720" numCol="1" anchor="t" anchorCtr="0" compatLnSpc="1">
+            <a:prstTxWarp prst="textNoShape">
+              <a:avLst/>
+            </a:prstTxWarp>
+          </a:bodyPr>
+          <a:lstStyle/>
+          <a:p>
+            <a:endParaRPr lang="ru-RU"/>
+          </a:p>
+        </p:txBody>
+      </p:sp>
+      <p:sp>
+        <p:nvSpPr>
+          <p:cNvPr id="28686" name="AutoShape 14" descr="http://ohdoylerules.com/content/images/css3.svg"/>
+          <p:cNvSpPr>
+            <a:spLocks noChangeAspect="1" noChangeArrowheads="1"/>
+          </p:cNvSpPr>
+          <p:nvPr/>
+        </p:nvSpPr>
+        <p:spPr bwMode="auto">
+          <a:xfrm>
+            <a:off x="155575" y="-144463"/>
+            <a:ext cx="304800" cy="304801"/>
+          </a:xfrm>
+          <a:prstGeom prst="rect">
+            <a:avLst/>
+          </a:prstGeom>
+          <a:noFill/>
+        </p:spPr>
+        <p:txBody>
+          <a:bodyPr vert="horz" wrap="square" lIns="91440" tIns="45720" rIns="91440" bIns="45720" numCol="1" anchor="t" anchorCtr="0" compatLnSpc="1">
+            <a:prstTxWarp prst="textNoShape">
+              <a:avLst/>
+            </a:prstTxWarp>
+          </a:bodyPr>
+          <a:lstStyle/>
+          <a:p>
+            <a:endParaRPr lang="ru-RU"/>
+          </a:p>
+        </p:txBody>
+      </p:sp>
+      <p:pic>
+        <p:nvPicPr>
+          <p:cNvPr id="28690" name="Picture 18" descr="http://www.codeproject.com/Learn/MVC/images/MVClogo.png"/>
+          <p:cNvPicPr>
+            <a:picLocks noChangeAspect="1" noChangeArrowheads="1"/>
+          </p:cNvPicPr>
+          <p:nvPr/>
+        </p:nvPicPr>
+        <p:blipFill>
+          <a:blip r:embed="rId4" cstate="print"/>
+          <a:srcRect/>
+          <a:stretch>
+            <a:fillRect/>
+          </a:stretch>
+        </p:blipFill>
+        <p:spPr bwMode="auto">
+          <a:xfrm>
+            <a:off x="683568" y="3573016"/>
+            <a:ext cx="1800200" cy="1242392"/>
+          </a:xfrm>
+          <a:prstGeom prst="rect">
+            <a:avLst/>
+          </a:prstGeom>
+          <a:noFill/>
+        </p:spPr>
+      </p:pic>
+      <p:pic>
+        <p:nvPicPr>
+          <p:cNvPr id="28698" name="Picture 26" descr="http://www.softreactor.ru/sites/default/files/image/node_pics/11/razrabotki_c%23.png"/>
+          <p:cNvPicPr>
+            <a:picLocks noChangeAspect="1" noChangeArrowheads="1"/>
+          </p:cNvPicPr>
+          <p:nvPr/>
+        </p:nvPicPr>
+        <p:blipFill>
+          <a:blip r:embed="rId5" cstate="print"/>
+          <a:srcRect/>
+          <a:stretch>
+            <a:fillRect/>
+          </a:stretch>
+        </p:blipFill>
+        <p:spPr bwMode="auto">
+          <a:xfrm>
+            <a:off x="683568" y="980728"/>
+            <a:ext cx="1800200" cy="1427556"/>
+          </a:xfrm>
+          <a:prstGeom prst="rect">
+            <a:avLst/>
+          </a:prstGeom>
+          <a:noFill/>
+        </p:spPr>
+      </p:pic>
+      <p:sp>
+        <p:nvSpPr>
+          <p:cNvPr id="19" name="Прямоугольник 18"/>
+          <p:cNvSpPr/>
+          <p:nvPr/>
+        </p:nvSpPr>
+        <p:spPr>
+          <a:xfrm>
+            <a:off x="323528" y="764704"/>
+            <a:ext cx="2664296" cy="5760640"/>
+          </a:xfrm>
+          <a:prstGeom prst="rect">
+            <a:avLst/>
+          </a:prstGeom>
+          <a:noFill/>
           <a:ln>
-            <a:noFill/>
-          </a:ln>
-          <a:effectLst>
-            <a:outerShdw blurRad="292100" dist="139700" dir="2700000" algn="tl" rotWithShape="0">
-              <a:srgbClr val="333333">
-                <a:alpha val="65000"/>
-              </a:srgbClr>
-            </a:outerShdw>
-          </a:effectLst>
-        </p:spPr>
-      </p:pic>
-      <p:sp>
-        <p:nvSpPr>
-          <p:cNvPr id="8" name="Прямоугольник 7"/>
-          <p:cNvSpPr/>
-          <p:nvPr/>
-        </p:nvSpPr>
-        <p:spPr>
-          <a:xfrm>
-            <a:off x="179512" y="764704"/>
-            <a:ext cx="8784976" cy="5688632"/>
-          </a:xfrm>
-          <a:prstGeom prst="rect">
-            <a:avLst/>
-          </a:prstGeom>
-          <a:solidFill>
-            <a:srgbClr val="FFFFFF">
-              <a:alpha val="60000"/>
-            </a:srgbClr>
-          </a:solidFill>
-          <a:ln>
-            <a:noFill/>
+            <a:solidFill>
+              <a:schemeClr val="tx2"/>
+            </a:solidFill>
           </a:ln>
         </p:spPr>
         <p:style>
@@ -4676,16 +5141,172 @@
           </a:p>
         </p:txBody>
       </p:sp>
+      <p:sp>
+        <p:nvSpPr>
+          <p:cNvPr id="20" name="Овал 19"/>
+          <p:cNvSpPr/>
+          <p:nvPr/>
+        </p:nvSpPr>
+        <p:spPr>
+          <a:xfrm>
+            <a:off x="179512" y="620688"/>
+            <a:ext cx="360040" cy="360040"/>
+          </a:xfrm>
+          <a:prstGeom prst="ellipse">
+            <a:avLst/>
+          </a:prstGeom>
+          <a:solidFill>
+            <a:schemeClr val="bg1"/>
+          </a:solidFill>
+        </p:spPr>
+        <p:style>
+          <a:lnRef idx="2">
+            <a:schemeClr val="accent1">
+              <a:shade val="50000"/>
+            </a:schemeClr>
+          </a:lnRef>
+          <a:fillRef idx="1">
+            <a:schemeClr val="accent1"/>
+          </a:fillRef>
+          <a:effectRef idx="0">
+            <a:schemeClr val="accent1"/>
+          </a:effectRef>
+          <a:fontRef idx="minor">
+            <a:schemeClr val="lt1"/>
+          </a:fontRef>
+        </p:style>
+        <p:txBody>
+          <a:bodyPr rtlCol="0" anchor="ctr"/>
+          <a:lstStyle/>
+          <a:p>
+            <a:pPr algn="ctr"/>
+            <a:r>
+              <a:rPr lang="en-US" b="1" dirty="0" smtClean="0">
+                <a:solidFill>
+                  <a:schemeClr val="tx1"/>
+                </a:solidFill>
+              </a:rPr>
+              <a:t>1</a:t>
+            </a:r>
+            <a:endParaRPr lang="ru-RU" b="1" dirty="0">
+              <a:solidFill>
+                <a:schemeClr val="tx1"/>
+              </a:solidFill>
+            </a:endParaRPr>
+          </a:p>
+        </p:txBody>
+      </p:sp>
+      <p:sp>
+        <p:nvSpPr>
+          <p:cNvPr id="23" name="Прямоугольник 22"/>
+          <p:cNvSpPr/>
+          <p:nvPr/>
+        </p:nvSpPr>
+        <p:spPr>
+          <a:xfrm>
+            <a:off x="3347864" y="764704"/>
+            <a:ext cx="5472608" cy="5760640"/>
+          </a:xfrm>
+          <a:prstGeom prst="rect">
+            <a:avLst/>
+          </a:prstGeom>
+          <a:noFill/>
+          <a:ln>
+            <a:solidFill>
+              <a:schemeClr val="tx2"/>
+            </a:solidFill>
+          </a:ln>
+        </p:spPr>
+        <p:style>
+          <a:lnRef idx="2">
+            <a:schemeClr val="accent1">
+              <a:shade val="50000"/>
+            </a:schemeClr>
+          </a:lnRef>
+          <a:fillRef idx="1">
+            <a:schemeClr val="accent1"/>
+          </a:fillRef>
+          <a:effectRef idx="0">
+            <a:schemeClr val="accent1"/>
+          </a:effectRef>
+          <a:fontRef idx="minor">
+            <a:schemeClr val="lt1"/>
+          </a:fontRef>
+        </p:style>
+        <p:txBody>
+          <a:bodyPr rtlCol="0" anchor="ctr"/>
+          <a:lstStyle/>
+          <a:p>
+            <a:pPr algn="ctr"/>
+            <a:endParaRPr lang="ru-RU" dirty="0"/>
+          </a:p>
+        </p:txBody>
+      </p:sp>
+      <p:sp>
+        <p:nvSpPr>
+          <p:cNvPr id="24" name="Овал 23"/>
+          <p:cNvSpPr/>
+          <p:nvPr/>
+        </p:nvSpPr>
+        <p:spPr>
+          <a:xfrm>
+            <a:off x="3131840" y="620688"/>
+            <a:ext cx="360040" cy="360040"/>
+          </a:xfrm>
+          <a:prstGeom prst="ellipse">
+            <a:avLst/>
+          </a:prstGeom>
+          <a:solidFill>
+            <a:schemeClr val="bg1"/>
+          </a:solidFill>
+        </p:spPr>
+        <p:style>
+          <a:lnRef idx="2">
+            <a:schemeClr val="accent1">
+              <a:shade val="50000"/>
+            </a:schemeClr>
+          </a:lnRef>
+          <a:fillRef idx="1">
+            <a:schemeClr val="accent1"/>
+          </a:fillRef>
+          <a:effectRef idx="0">
+            <a:schemeClr val="accent1"/>
+          </a:effectRef>
+          <a:fontRef idx="minor">
+            <a:schemeClr val="lt1"/>
+          </a:fontRef>
+        </p:style>
+        <p:txBody>
+          <a:bodyPr rtlCol="0" anchor="ctr"/>
+          <a:lstStyle/>
+          <a:p>
+            <a:pPr algn="ctr"/>
+            <a:r>
+              <a:rPr lang="ru-RU" b="1" dirty="0" smtClean="0">
+                <a:solidFill>
+                  <a:schemeClr val="tx1"/>
+                </a:solidFill>
+              </a:rPr>
+              <a:t>2</a:t>
+            </a:r>
+            <a:endParaRPr lang="ru-RU" b="1" dirty="0">
+              <a:solidFill>
+                <a:schemeClr val="tx1"/>
+              </a:solidFill>
+            </a:endParaRPr>
+          </a:p>
+        </p:txBody>
+      </p:sp>
       <p:pic>
         <p:nvPicPr>
-          <p:cNvPr id="4098" name="Picture 2"/>
+          <p:cNvPr id="1027" name="Picture 3"/>
           <p:cNvPicPr>
             <a:picLocks noChangeAspect="1" noChangeArrowheads="1"/>
           </p:cNvPicPr>
           <p:nvPr/>
         </p:nvPicPr>
         <p:blipFill>
-          <a:blip r:embed="rId5" cstate="print"/>
+          <a:blip r:embed="rId6" cstate="print"/>
           <a:srcRect/>
           <a:stretch>
             <a:fillRect/>
@@ -4693,22 +5314,19 @@
         </p:blipFill>
         <p:spPr bwMode="auto">
           <a:xfrm>
-            <a:off x="395536" y="836712"/>
-            <a:ext cx="7409872" cy="4968552"/>
-          </a:xfrm>
-          <a:prstGeom prst="rect">
-            <a:avLst/>
-          </a:prstGeom>
-          <a:ln>
+            <a:off x="3419872" y="980728"/>
+            <a:ext cx="5314190" cy="5472608"/>
+          </a:xfrm>
+          <a:prstGeom prst="rect">
+            <a:avLst/>
+          </a:prstGeom>
+          <a:noFill/>
+          <a:ln w="9525">
             <a:noFill/>
+            <a:miter lim="800000"/>
+            <a:headEnd/>
+            <a:tailEnd/>
           </a:ln>
-          <a:effectLst>
-            <a:outerShdw blurRad="292100" dist="139700" dir="2700000" algn="tl" rotWithShape="0">
-              <a:srgbClr val="333333">
-                <a:alpha val="65000"/>
-              </a:srgbClr>
-            </a:outerShdw>
-          </a:effectLst>
         </p:spPr>
       </p:pic>
     </p:spTree>
@@ -4907,7 +5525,7 @@
       </p:sp>
       <p:pic>
         <p:nvPicPr>
-          <p:cNvPr id="4098" name="Picture 2"/>
+          <p:cNvPr id="9" name="Picture 3"/>
           <p:cNvPicPr>
             <a:picLocks noChangeAspect="1" noChangeArrowheads="1"/>
           </p:cNvPicPr>
@@ -4924,8 +5542,8 @@
         </p:blipFill>
         <p:spPr bwMode="auto">
           <a:xfrm>
-            <a:off x="395536" y="836712"/>
-            <a:ext cx="5476862" cy="3672408"/>
+            <a:off x="3923928" y="1219225"/>
+            <a:ext cx="4990130" cy="3577927"/>
           </a:xfrm>
           <a:prstGeom prst="rect">
             <a:avLst/>
@@ -4958,7 +5576,7 @@
           </a:prstGeom>
           <a:solidFill>
             <a:srgbClr val="FFFFFF">
-              <a:alpha val="60000"/>
+              <a:alpha val="69804"/>
             </a:srgbClr>
           </a:solidFill>
           <a:ln>
@@ -4992,7 +5610,7 @@
       </p:sp>
       <p:pic>
         <p:nvPicPr>
-          <p:cNvPr id="9" name="Picture 3"/>
+          <p:cNvPr id="4098" name="Picture 2"/>
           <p:cNvPicPr>
             <a:picLocks noChangeAspect="1" noChangeArrowheads="1"/>
           </p:cNvPicPr>
@@ -5007,8 +5625,8 @@
         </p:blipFill>
         <p:spPr bwMode="auto">
           <a:xfrm>
-            <a:off x="1475656" y="856446"/>
-            <a:ext cx="7438402" cy="5333339"/>
+            <a:off x="395536" y="836712"/>
+            <a:ext cx="7409872" cy="4968552"/>
           </a:xfrm>
           <a:prstGeom prst="rect">
             <a:avLst/>
@@ -5092,6 +5710,43 @@
           </a:effectLst>
         </p:spPr>
       </p:pic>
+      <p:pic>
+        <p:nvPicPr>
+          <p:cNvPr id="4100" name="Picture 4"/>
+          <p:cNvPicPr>
+            <a:picLocks noChangeAspect="1" noChangeArrowheads="1"/>
+          </p:cNvPicPr>
+          <p:nvPr/>
+        </p:nvPicPr>
+        <p:blipFill>
+          <a:blip r:embed="rId3" cstate="print">
+            <a:grayscl/>
+          </a:blip>
+          <a:srcRect/>
+          <a:stretch>
+            <a:fillRect/>
+          </a:stretch>
+        </p:blipFill>
+        <p:spPr bwMode="auto">
+          <a:xfrm>
+            <a:off x="323528" y="4077072"/>
+            <a:ext cx="5220072" cy="2236453"/>
+          </a:xfrm>
+          <a:prstGeom prst="rect">
+            <a:avLst/>
+          </a:prstGeom>
+          <a:ln>
+            <a:noFill/>
+          </a:ln>
+          <a:effectLst>
+            <a:outerShdw blurRad="292100" dist="139700" dir="2700000" algn="tl" rotWithShape="0">
+              <a:srgbClr val="333333">
+                <a:alpha val="65000"/>
+              </a:srgbClr>
+            </a:outerShdw>
+          </a:effectLst>
+        </p:spPr>
+      </p:pic>
       <p:sp>
         <p:nvSpPr>
           <p:cNvPr id="4" name="Прямоугольник 3"/>
@@ -5191,7 +5846,7 @@
           <p:nvPr/>
         </p:nvPicPr>
         <p:blipFill>
-          <a:blip r:embed="rId3" cstate="print">
+          <a:blip r:embed="rId4" cstate="print">
             <a:grayscl/>
           </a:blip>
           <a:srcRect/>
@@ -5201,7 +5856,7 @@
         </p:blipFill>
         <p:spPr bwMode="auto">
           <a:xfrm>
-            <a:off x="179512" y="908720"/>
+            <a:off x="395536" y="836712"/>
             <a:ext cx="5476862" cy="3672408"/>
           </a:xfrm>
           <a:prstGeom prst="rect">
@@ -5219,43 +5874,6 @@
           </a:effectLst>
         </p:spPr>
       </p:pic>
-      <p:pic>
-        <p:nvPicPr>
-          <p:cNvPr id="9" name="Picture 3"/>
-          <p:cNvPicPr>
-            <a:picLocks noChangeAspect="1" noChangeArrowheads="1"/>
-          </p:cNvPicPr>
-          <p:nvPr/>
-        </p:nvPicPr>
-        <p:blipFill>
-          <a:blip r:embed="rId4" cstate="print">
-            <a:grayscl/>
-          </a:blip>
-          <a:srcRect/>
-          <a:stretch>
-            <a:fillRect/>
-          </a:stretch>
-        </p:blipFill>
-        <p:spPr bwMode="auto">
-          <a:xfrm>
-            <a:off x="3491880" y="856447"/>
-            <a:ext cx="5422178" cy="3887705"/>
-          </a:xfrm>
-          <a:prstGeom prst="rect">
-            <a:avLst/>
-          </a:prstGeom>
-          <a:ln>
-            <a:noFill/>
-          </a:ln>
-          <a:effectLst>
-            <a:outerShdw blurRad="292100" dist="139700" dir="2700000" algn="tl" rotWithShape="0">
-              <a:srgbClr val="333333">
-                <a:alpha val="65000"/>
-              </a:srgbClr>
-            </a:outerShdw>
-          </a:effectLst>
-        </p:spPr>
-      </p:pic>
       <p:sp>
         <p:nvSpPr>
           <p:cNvPr id="8" name="Прямоугольник 7"/>
@@ -5272,7 +5890,7 @@
           </a:prstGeom>
           <a:solidFill>
             <a:srgbClr val="FFFFFF">
-              <a:alpha val="60000"/>
+              <a:alpha val="69804"/>
             </a:srgbClr>
           </a:solidFill>
           <a:ln>
@@ -5306,7 +5924,7 @@
       </p:sp>
       <p:pic>
         <p:nvPicPr>
-          <p:cNvPr id="4100" name="Picture 4"/>
+          <p:cNvPr id="9" name="Picture 3"/>
           <p:cNvPicPr>
             <a:picLocks noChangeAspect="1" noChangeArrowheads="1"/>
           </p:cNvPicPr>
@@ -5321,8 +5939,8 @@
         </p:blipFill>
         <p:spPr bwMode="auto">
           <a:xfrm>
-            <a:off x="251520" y="2140233"/>
-            <a:ext cx="8496944" cy="3813252"/>
+            <a:off x="1475656" y="856446"/>
+            <a:ext cx="7438402" cy="5333339"/>
           </a:xfrm>
           <a:prstGeom prst="rect">
             <a:avLst/>
@@ -5373,10 +5991,8 @@
       </p:grpSpPr>
       <p:pic>
         <p:nvPicPr>
-          <p:cNvPr id="4100" name="Picture 4"/>
-          <p:cNvPicPr>
-            <a:picLocks noChangeAspect="1" noChangeArrowheads="1"/>
-          </p:cNvPicPr>
+          <p:cNvPr id="12" name="Рисунок 11"/>
+          <p:cNvPicPr/>
           <p:nvPr/>
         </p:nvPicPr>
         <p:blipFill>
@@ -5390,8 +6006,8 @@
         </p:blipFill>
         <p:spPr bwMode="auto">
           <a:xfrm>
-            <a:off x="323528" y="4077072"/>
-            <a:ext cx="5220072" cy="2236453"/>
+            <a:off x="2657533" y="2924944"/>
+            <a:ext cx="6162939" cy="3275938"/>
           </a:xfrm>
           <a:prstGeom prst="rect">
             <a:avLst/>
@@ -5517,7 +6133,7 @@
         </p:blipFill>
         <p:spPr bwMode="auto">
           <a:xfrm>
-            <a:off x="395536" y="836712"/>
+            <a:off x="179512" y="908720"/>
             <a:ext cx="5476862" cy="3672408"/>
           </a:xfrm>
           <a:prstGeom prst="rect">
@@ -5544,7 +6160,9 @@
           <p:nvPr/>
         </p:nvPicPr>
         <p:blipFill>
-          <a:blip r:embed="rId4" cstate="print"/>
+          <a:blip r:embed="rId4" cstate="print">
+            <a:grayscl/>
+          </a:blip>
           <a:srcRect/>
           <a:stretch>
             <a:fillRect/>
@@ -5552,8 +6170,8 @@
         </p:blipFill>
         <p:spPr bwMode="auto">
           <a:xfrm>
-            <a:off x="3779912" y="856448"/>
-            <a:ext cx="5134146" cy="3681186"/>
+            <a:off x="3491880" y="856447"/>
+            <a:ext cx="5422178" cy="3887705"/>
           </a:xfrm>
           <a:prstGeom prst="rect">
             <a:avLst/>
@@ -5586,7 +6204,7 @@
           </a:prstGeom>
           <a:solidFill>
             <a:srgbClr val="FFFFFF">
-              <a:alpha val="60000"/>
+              <a:alpha val="69804"/>
             </a:srgbClr>
           </a:solidFill>
           <a:ln>
@@ -5620,8 +6238,10 @@
       </p:sp>
       <p:pic>
         <p:nvPicPr>
-          <p:cNvPr id="12" name="Рисунок 11"/>
-          <p:cNvPicPr/>
+          <p:cNvPr id="4100" name="Picture 4"/>
+          <p:cNvPicPr>
+            <a:picLocks noChangeAspect="1" noChangeArrowheads="1"/>
+          </p:cNvPicPr>
           <p:nvPr/>
         </p:nvPicPr>
         <p:blipFill>
@@ -5633,8 +6253,8 @@
         </p:blipFill>
         <p:spPr bwMode="auto">
           <a:xfrm>
-            <a:off x="539553" y="1484784"/>
-            <a:ext cx="8352928" cy="4716098"/>
+            <a:off x="251520" y="2140233"/>
+            <a:ext cx="8496944" cy="3813252"/>
           </a:xfrm>
           <a:prstGeom prst="rect">
             <a:avLst/>
@@ -5683,39 +6303,46 @@
           <a:chExt cx="0" cy="0"/>
         </a:xfrm>
       </p:grpSpPr>
-      <p:sp>
-        <p:nvSpPr>
-          <p:cNvPr id="4" name="Заголовок 1"/>
-          <p:cNvSpPr>
-            <a:spLocks noGrp="1"/>
-          </p:cNvSpPr>
-          <p:nvPr>
-            <p:ph type="title"/>
-          </p:nvPr>
-        </p:nvSpPr>
-        <p:spPr>
-          <a:xfrm>
-            <a:off x="457200" y="116632"/>
-            <a:ext cx="8229600" cy="648072"/>
-          </a:xfrm>
-        </p:spPr>
-        <p:txBody>
-          <a:bodyPr>
-            <a:normAutofit/>
-          </a:bodyPr>
-          <a:lstStyle/>
-          <a:p>
-            <a:r>
-              <a:rPr lang="ru-RU" sz="3200" dirty="0" smtClean="0"/>
-              <a:t>Использованные технологии и аналоги</a:t>
-            </a:r>
-            <a:endParaRPr lang="ru-RU" sz="3200" dirty="0"/>
-          </a:p>
-        </p:txBody>
-      </p:sp>
-      <p:sp>
-        <p:nvSpPr>
-          <p:cNvPr id="5" name="Прямоугольник 4"/>
+      <p:pic>
+        <p:nvPicPr>
+          <p:cNvPr id="4100" name="Picture 4"/>
+          <p:cNvPicPr>
+            <a:picLocks noChangeAspect="1" noChangeArrowheads="1"/>
+          </p:cNvPicPr>
+          <p:nvPr/>
+        </p:nvPicPr>
+        <p:blipFill>
+          <a:blip r:embed="rId2" cstate="print">
+            <a:grayscl/>
+          </a:blip>
+          <a:srcRect/>
+          <a:stretch>
+            <a:fillRect/>
+          </a:stretch>
+        </p:blipFill>
+        <p:spPr bwMode="auto">
+          <a:xfrm>
+            <a:off x="323528" y="4077072"/>
+            <a:ext cx="5220072" cy="2236453"/>
+          </a:xfrm>
+          <a:prstGeom prst="rect">
+            <a:avLst/>
+          </a:prstGeom>
+          <a:ln>
+            <a:noFill/>
+          </a:ln>
+          <a:effectLst>
+            <a:outerShdw blurRad="292100" dist="139700" dir="2700000" algn="tl" rotWithShape="0">
+              <a:srgbClr val="333333">
+                <a:alpha val="65000"/>
+              </a:srgbClr>
+            </a:outerShdw>
+          </a:effectLst>
+        </p:spPr>
+      </p:pic>
+      <p:sp>
+        <p:nvSpPr>
+          <p:cNvPr id="4" name="Прямоугольник 3"/>
           <p:cNvSpPr/>
           <p:nvPr/>
         </p:nvSpPr>
@@ -5754,16 +6381,67 @@
           </a:p>
         </p:txBody>
       </p:sp>
+      <p:sp>
+        <p:nvSpPr>
+          <p:cNvPr id="5" name="Заголовок 1"/>
+          <p:cNvSpPr txBox="1">
+            <a:spLocks/>
+          </p:cNvSpPr>
+          <p:nvPr/>
+        </p:nvSpPr>
+        <p:spPr>
+          <a:xfrm>
+            <a:off x="457200" y="116632"/>
+            <a:ext cx="8229600" cy="648072"/>
+          </a:xfrm>
+          <a:prstGeom prst="rect">
+            <a:avLst/>
+          </a:prstGeom>
+        </p:spPr>
+        <p:txBody>
+          <a:bodyPr vert="horz" lIns="91440" tIns="45720" rIns="91440" bIns="45720" rtlCol="0" anchor="ctr">
+            <a:normAutofit/>
+          </a:bodyPr>
+          <a:lstStyle/>
+          <a:p>
+            <a:pPr lvl="0" algn="ctr">
+              <a:spcBef>
+                <a:spcPct val="0"/>
+              </a:spcBef>
+            </a:pPr>
+            <a:r>
+              <a:rPr lang="ru-RU" sz="3200" dirty="0" smtClean="0"/>
+              <a:t>Пользовательский интерфейс</a:t>
+            </a:r>
+            <a:endParaRPr kumimoji="0" lang="ru-RU" sz="3200" b="0" i="0" u="none" strike="noStrike" kern="1200" cap="none" spc="0" normalizeH="0" baseline="0" noProof="0" dirty="0" smtClean="0">
+              <a:ln>
+                <a:noFill/>
+              </a:ln>
+              <a:solidFill>
+                <a:schemeClr val="tx1"/>
+              </a:solidFill>
+              <a:effectLst/>
+              <a:uLnTx/>
+              <a:uFillTx/>
+              <a:latin typeface="+mj-lt"/>
+              <a:ea typeface="+mj-ea"/>
+              <a:cs typeface="+mj-cs"/>
+            </a:endParaRPr>
+          </a:p>
+        </p:txBody>
+      </p:sp>
       <p:pic>
         <p:nvPicPr>
-          <p:cNvPr id="28676" name="Picture 4" descr="http://www.nareshit.in/wp-content/uploads/2013/07/Wcf.png"/>
+          <p:cNvPr id="4098" name="Picture 2"/>
           <p:cNvPicPr>
             <a:picLocks noChangeAspect="1" noChangeArrowheads="1"/>
           </p:cNvPicPr>
           <p:nvPr/>
         </p:nvPicPr>
         <p:blipFill>
-          <a:blip r:embed="rId2" cstate="print"/>
+          <a:blip r:embed="rId3" cstate="print">
+            <a:grayscl/>
+          </a:blip>
           <a:srcRect/>
           <a:stretch>
             <a:fillRect/>
@@ -5771,104 +6449,27 @@
         </p:blipFill>
         <p:spPr bwMode="auto">
           <a:xfrm>
-            <a:off x="611560" y="2420887"/>
-            <a:ext cx="1944216" cy="1105535"/>
-          </a:xfrm>
-          <a:prstGeom prst="rect">
-            <a:avLst/>
-          </a:prstGeom>
-          <a:noFill/>
+            <a:off x="395536" y="836712"/>
+            <a:ext cx="5476862" cy="3672408"/>
+          </a:xfrm>
+          <a:prstGeom prst="rect">
+            <a:avLst/>
+          </a:prstGeom>
+          <a:ln>
+            <a:noFill/>
+          </a:ln>
+          <a:effectLst>
+            <a:outerShdw blurRad="292100" dist="139700" dir="2700000" algn="tl" rotWithShape="0">
+              <a:srgbClr val="333333">
+                <a:alpha val="65000"/>
+              </a:srgbClr>
+            </a:outerShdw>
+          </a:effectLst>
         </p:spPr>
       </p:pic>
       <p:pic>
         <p:nvPicPr>
-          <p:cNvPr id="28678" name="Picture 6" descr="http://pressdev.ru/wp-content/uploads/2013/10/ms-sql-server-300x246.png"/>
-          <p:cNvPicPr>
-            <a:picLocks noChangeAspect="1" noChangeArrowheads="1"/>
-          </p:cNvPicPr>
-          <p:nvPr/>
-        </p:nvPicPr>
-        <p:blipFill>
-          <a:blip r:embed="rId3" cstate="print"/>
-          <a:srcRect/>
-          <a:stretch>
-            <a:fillRect/>
-          </a:stretch>
-        </p:blipFill>
-        <p:spPr bwMode="auto">
-          <a:xfrm>
-            <a:off x="611560" y="4797151"/>
-            <a:ext cx="2016224" cy="1653305"/>
-          </a:xfrm>
-          <a:prstGeom prst="rect">
-            <a:avLst/>
-          </a:prstGeom>
-          <a:noFill/>
-        </p:spPr>
-      </p:pic>
-      <p:sp>
-        <p:nvSpPr>
-          <p:cNvPr id="28684" name="AutoShape 12" descr="http://ohdoylerules.com/content/images/css3.svg"/>
-          <p:cNvSpPr>
-            <a:spLocks noChangeAspect="1" noChangeArrowheads="1"/>
-          </p:cNvSpPr>
-          <p:nvPr/>
-        </p:nvSpPr>
-        <p:spPr bwMode="auto">
-          <a:xfrm>
-            <a:off x="155575" y="-144463"/>
-            <a:ext cx="304800" cy="304801"/>
-          </a:xfrm>
-          <a:prstGeom prst="rect">
-            <a:avLst/>
-          </a:prstGeom>
-          <a:noFill/>
-        </p:spPr>
-        <p:txBody>
-          <a:bodyPr vert="horz" wrap="square" lIns="91440" tIns="45720" rIns="91440" bIns="45720" numCol="1" anchor="t" anchorCtr="0" compatLnSpc="1">
-            <a:prstTxWarp prst="textNoShape">
-              <a:avLst/>
-            </a:prstTxWarp>
-          </a:bodyPr>
-          <a:lstStyle/>
-          <a:p>
-            <a:endParaRPr lang="ru-RU"/>
-          </a:p>
-        </p:txBody>
-      </p:sp>
-      <p:sp>
-        <p:nvSpPr>
-          <p:cNvPr id="28686" name="AutoShape 14" descr="http://ohdoylerules.com/content/images/css3.svg"/>
-          <p:cNvSpPr>
-            <a:spLocks noChangeAspect="1" noChangeArrowheads="1"/>
-          </p:cNvSpPr>
-          <p:nvPr/>
-        </p:nvSpPr>
-        <p:spPr bwMode="auto">
-          <a:xfrm>
-            <a:off x="155575" y="-144463"/>
-            <a:ext cx="304800" cy="304801"/>
-          </a:xfrm>
-          <a:prstGeom prst="rect">
-            <a:avLst/>
-          </a:prstGeom>
-          <a:noFill/>
-        </p:spPr>
-        <p:txBody>
-          <a:bodyPr vert="horz" wrap="square" lIns="91440" tIns="45720" rIns="91440" bIns="45720" numCol="1" anchor="t" anchorCtr="0" compatLnSpc="1">
-            <a:prstTxWarp prst="textNoShape">
-              <a:avLst/>
-            </a:prstTxWarp>
-          </a:bodyPr>
-          <a:lstStyle/>
-          <a:p>
-            <a:endParaRPr lang="ru-RU"/>
-          </a:p>
-        </p:txBody>
-      </p:sp>
-      <p:pic>
-        <p:nvPicPr>
-          <p:cNvPr id="28690" name="Picture 18" descr="http://www.codeproject.com/Learn/MVC/images/MVClogo.png"/>
+          <p:cNvPr id="9" name="Picture 3"/>
           <p:cNvPicPr>
             <a:picLocks noChangeAspect="1" noChangeArrowheads="1"/>
           </p:cNvPicPr>
@@ -5883,60 +6484,45 @@
         </p:blipFill>
         <p:spPr bwMode="auto">
           <a:xfrm>
-            <a:off x="683568" y="3573016"/>
-            <a:ext cx="1800200" cy="1242392"/>
-          </a:xfrm>
-          <a:prstGeom prst="rect">
-            <a:avLst/>
-          </a:prstGeom>
-          <a:noFill/>
+            <a:off x="3779912" y="856448"/>
+            <a:ext cx="5134146" cy="3681186"/>
+          </a:xfrm>
+          <a:prstGeom prst="rect">
+            <a:avLst/>
+          </a:prstGeom>
+          <a:ln>
+            <a:noFill/>
+          </a:ln>
+          <a:effectLst>
+            <a:outerShdw blurRad="292100" dist="139700" dir="2700000" algn="tl" rotWithShape="0">
+              <a:srgbClr val="333333">
+                <a:alpha val="65000"/>
+              </a:srgbClr>
+            </a:outerShdw>
+          </a:effectLst>
         </p:spPr>
       </p:pic>
-      <p:pic>
-        <p:nvPicPr>
-          <p:cNvPr id="28698" name="Picture 26" descr="http://www.softreactor.ru/sites/default/files/image/node_pics/11/razrabotki_c%23.png"/>
-          <p:cNvPicPr>
-            <a:picLocks noChangeAspect="1" noChangeArrowheads="1"/>
-          </p:cNvPicPr>
-          <p:nvPr/>
-        </p:nvPicPr>
-        <p:blipFill>
-          <a:blip r:embed="rId5" cstate="print"/>
-          <a:srcRect/>
-          <a:stretch>
-            <a:fillRect/>
-          </a:stretch>
-        </p:blipFill>
-        <p:spPr bwMode="auto">
-          <a:xfrm>
-            <a:off x="683568" y="980728"/>
-            <a:ext cx="1800200" cy="1427556"/>
-          </a:xfrm>
-          <a:prstGeom prst="rect">
-            <a:avLst/>
-          </a:prstGeom>
-          <a:noFill/>
-        </p:spPr>
-      </p:pic>
-      <p:sp>
-        <p:nvSpPr>
-          <p:cNvPr id="19" name="Прямоугольник 18"/>
+      <p:sp>
+        <p:nvSpPr>
+          <p:cNvPr id="8" name="Прямоугольник 7"/>
           <p:cNvSpPr/>
           <p:nvPr/>
         </p:nvSpPr>
         <p:spPr>
           <a:xfrm>
-            <a:off x="323528" y="764704"/>
-            <a:ext cx="2664296" cy="5760640"/>
-          </a:xfrm>
-          <a:prstGeom prst="rect">
-            <a:avLst/>
-          </a:prstGeom>
-          <a:noFill/>
+            <a:off x="179512" y="764704"/>
+            <a:ext cx="8784976" cy="5688632"/>
+          </a:xfrm>
+          <a:prstGeom prst="rect">
+            <a:avLst/>
+          </a:prstGeom>
+          <a:solidFill>
+            <a:srgbClr val="FFFFFF">
+              <a:alpha val="69804"/>
+            </a:srgbClr>
+          </a:solidFill>
           <a:ln>
-            <a:solidFill>
-              <a:schemeClr val="tx2"/>
-            </a:solidFill>
+            <a:noFill/>
           </a:ln>
         </p:spPr>
         <p:style>
@@ -5964,172 +6550,14 @@
           </a:p>
         </p:txBody>
       </p:sp>
-      <p:sp>
-        <p:nvSpPr>
-          <p:cNvPr id="20" name="Овал 19"/>
-          <p:cNvSpPr/>
-          <p:nvPr/>
-        </p:nvSpPr>
-        <p:spPr>
-          <a:xfrm>
-            <a:off x="179512" y="620688"/>
-            <a:ext cx="360040" cy="360040"/>
-          </a:xfrm>
-          <a:prstGeom prst="ellipse">
-            <a:avLst/>
-          </a:prstGeom>
-          <a:solidFill>
-            <a:schemeClr val="bg1"/>
-          </a:solidFill>
-        </p:spPr>
-        <p:style>
-          <a:lnRef idx="2">
-            <a:schemeClr val="accent1">
-              <a:shade val="50000"/>
-            </a:schemeClr>
-          </a:lnRef>
-          <a:fillRef idx="1">
-            <a:schemeClr val="accent1"/>
-          </a:fillRef>
-          <a:effectRef idx="0">
-            <a:schemeClr val="accent1"/>
-          </a:effectRef>
-          <a:fontRef idx="minor">
-            <a:schemeClr val="lt1"/>
-          </a:fontRef>
-        </p:style>
-        <p:txBody>
-          <a:bodyPr rtlCol="0" anchor="ctr"/>
-          <a:lstStyle/>
-          <a:p>
-            <a:pPr algn="ctr"/>
-            <a:r>
-              <a:rPr lang="en-US" b="1" dirty="0" smtClean="0">
-                <a:solidFill>
-                  <a:schemeClr val="tx1"/>
-                </a:solidFill>
-              </a:rPr>
-              <a:t>1</a:t>
-            </a:r>
-            <a:endParaRPr lang="ru-RU" b="1" dirty="0">
-              <a:solidFill>
-                <a:schemeClr val="tx1"/>
-              </a:solidFill>
-            </a:endParaRPr>
-          </a:p>
-        </p:txBody>
-      </p:sp>
-      <p:sp>
-        <p:nvSpPr>
-          <p:cNvPr id="23" name="Прямоугольник 22"/>
-          <p:cNvSpPr/>
-          <p:nvPr/>
-        </p:nvSpPr>
-        <p:spPr>
-          <a:xfrm>
-            <a:off x="3347864" y="764704"/>
-            <a:ext cx="5472608" cy="5760640"/>
-          </a:xfrm>
-          <a:prstGeom prst="rect">
-            <a:avLst/>
-          </a:prstGeom>
-          <a:noFill/>
-          <a:ln>
-            <a:solidFill>
-              <a:schemeClr val="tx2"/>
-            </a:solidFill>
-          </a:ln>
-        </p:spPr>
-        <p:style>
-          <a:lnRef idx="2">
-            <a:schemeClr val="accent1">
-              <a:shade val="50000"/>
-            </a:schemeClr>
-          </a:lnRef>
-          <a:fillRef idx="1">
-            <a:schemeClr val="accent1"/>
-          </a:fillRef>
-          <a:effectRef idx="0">
-            <a:schemeClr val="accent1"/>
-          </a:effectRef>
-          <a:fontRef idx="minor">
-            <a:schemeClr val="lt1"/>
-          </a:fontRef>
-        </p:style>
-        <p:txBody>
-          <a:bodyPr rtlCol="0" anchor="ctr"/>
-          <a:lstStyle/>
-          <a:p>
-            <a:pPr algn="ctr"/>
-            <a:endParaRPr lang="ru-RU" dirty="0"/>
-          </a:p>
-        </p:txBody>
-      </p:sp>
-      <p:sp>
-        <p:nvSpPr>
-          <p:cNvPr id="24" name="Овал 23"/>
-          <p:cNvSpPr/>
-          <p:nvPr/>
-        </p:nvSpPr>
-        <p:spPr>
-          <a:xfrm>
-            <a:off x="3131840" y="620688"/>
-            <a:ext cx="360040" cy="360040"/>
-          </a:xfrm>
-          <a:prstGeom prst="ellipse">
-            <a:avLst/>
-          </a:prstGeom>
-          <a:solidFill>
-            <a:schemeClr val="bg1"/>
-          </a:solidFill>
-        </p:spPr>
-        <p:style>
-          <a:lnRef idx="2">
-            <a:schemeClr val="accent1">
-              <a:shade val="50000"/>
-            </a:schemeClr>
-          </a:lnRef>
-          <a:fillRef idx="1">
-            <a:schemeClr val="accent1"/>
-          </a:fillRef>
-          <a:effectRef idx="0">
-            <a:schemeClr val="accent1"/>
-          </a:effectRef>
-          <a:fontRef idx="minor">
-            <a:schemeClr val="lt1"/>
-          </a:fontRef>
-        </p:style>
-        <p:txBody>
-          <a:bodyPr rtlCol="0" anchor="ctr"/>
-          <a:lstStyle/>
-          <a:p>
-            <a:pPr algn="ctr"/>
-            <a:r>
-              <a:rPr lang="ru-RU" b="1" dirty="0" smtClean="0">
-                <a:solidFill>
-                  <a:schemeClr val="tx1"/>
-                </a:solidFill>
-              </a:rPr>
-              <a:t>2</a:t>
-            </a:r>
-            <a:endParaRPr lang="ru-RU" b="1" dirty="0">
-              <a:solidFill>
-                <a:schemeClr val="tx1"/>
-              </a:solidFill>
-            </a:endParaRPr>
-          </a:p>
-        </p:txBody>
-      </p:sp>
       <p:pic>
         <p:nvPicPr>
-          <p:cNvPr id="1027" name="Picture 3"/>
-          <p:cNvPicPr>
-            <a:picLocks noChangeAspect="1" noChangeArrowheads="1"/>
-          </p:cNvPicPr>
+          <p:cNvPr id="12" name="Рисунок 11"/>
+          <p:cNvPicPr/>
           <p:nvPr/>
         </p:nvPicPr>
         <p:blipFill>
-          <a:blip r:embed="rId6" cstate="print"/>
+          <a:blip r:embed="rId5" cstate="print"/>
           <a:srcRect/>
           <a:stretch>
             <a:fillRect/>
@@ -6137,19 +6565,22 @@
         </p:blipFill>
         <p:spPr bwMode="auto">
           <a:xfrm>
-            <a:off x="3419872" y="980728"/>
-            <a:ext cx="5314190" cy="5472608"/>
-          </a:xfrm>
-          <a:prstGeom prst="rect">
-            <a:avLst/>
-          </a:prstGeom>
-          <a:noFill/>
-          <a:ln w="9525">
+            <a:off x="539553" y="1484784"/>
+            <a:ext cx="8352928" cy="4716098"/>
+          </a:xfrm>
+          <a:prstGeom prst="rect">
+            <a:avLst/>
+          </a:prstGeom>
+          <a:ln>
             <a:noFill/>
-            <a:miter lim="800000"/>
-            <a:headEnd/>
-            <a:tailEnd/>
           </a:ln>
+          <a:effectLst>
+            <a:outerShdw blurRad="292100" dist="139700" dir="2700000" algn="tl" rotWithShape="0">
+              <a:srgbClr val="333333">
+                <a:alpha val="65000"/>
+              </a:srgbClr>
+            </a:outerShdw>
+          </a:effectLst>
         </p:spPr>
       </p:pic>
     </p:spTree>
@@ -7536,12 +7967,12 @@
         </p:blipFill>
         <p:spPr bwMode="auto">
           <a:xfrm>
-            <a:off x="251519" y="2413369"/>
-            <a:ext cx="6575355" cy="3967959"/>
+            <a:off x="323528" y="2413369"/>
+            <a:ext cx="6503346" cy="3924505"/>
           </a:xfrm>
           <a:prstGeom prst="roundRect">
             <a:avLst>
-              <a:gd name="adj" fmla="val 16667"/>
+              <a:gd name="adj" fmla="val 5597"/>
             </a:avLst>
           </a:prstGeom>
           <a:ln>
@@ -7602,6 +8033,214 @@
       </p:grpSpPr>
       <p:sp>
         <p:nvSpPr>
+          <p:cNvPr id="23" name="Прямоугольник 22"/>
+          <p:cNvSpPr/>
+          <p:nvPr/>
+        </p:nvSpPr>
+        <p:spPr>
+          <a:xfrm>
+            <a:off x="3779912" y="3717032"/>
+            <a:ext cx="4752528" cy="2304256"/>
+          </a:xfrm>
+          <a:prstGeom prst="rect">
+            <a:avLst/>
+          </a:prstGeom>
+          <a:solidFill>
+            <a:srgbClr val="FFFFFF">
+              <a:alpha val="60000"/>
+            </a:srgbClr>
+          </a:solidFill>
+          <a:ln>
+            <a:noFill/>
+          </a:ln>
+        </p:spPr>
+        <p:style>
+          <a:lnRef idx="2">
+            <a:schemeClr val="accent1">
+              <a:shade val="50000"/>
+            </a:schemeClr>
+          </a:lnRef>
+          <a:fillRef idx="1">
+            <a:schemeClr val="accent1"/>
+          </a:fillRef>
+          <a:effectRef idx="0">
+            <a:schemeClr val="accent1"/>
+          </a:effectRef>
+          <a:fontRef idx="minor">
+            <a:schemeClr val="lt1"/>
+          </a:fontRef>
+        </p:style>
+        <p:txBody>
+          <a:bodyPr rtlCol="0" anchor="ctr"/>
+          <a:lstStyle/>
+          <a:p>
+            <a:pPr algn="ctr"/>
+            <a:endParaRPr lang="ru-RU" dirty="0"/>
+          </a:p>
+        </p:txBody>
+      </p:sp>
+      <p:pic>
+        <p:nvPicPr>
+          <p:cNvPr id="1026" name="Picture 2"/>
+          <p:cNvPicPr>
+            <a:picLocks noChangeAspect="1" noChangeArrowheads="1"/>
+          </p:cNvPicPr>
+          <p:nvPr/>
+        </p:nvPicPr>
+        <p:blipFill>
+          <a:blip r:embed="rId2" cstate="print"/>
+          <a:srcRect/>
+          <a:stretch>
+            <a:fillRect/>
+          </a:stretch>
+        </p:blipFill>
+        <p:spPr bwMode="auto">
+          <a:xfrm>
+            <a:off x="432048" y="1325196"/>
+            <a:ext cx="2771800" cy="2103804"/>
+          </a:xfrm>
+          <a:prstGeom prst="rect">
+            <a:avLst/>
+          </a:prstGeom>
+          <a:noFill/>
+          <a:ln w="9525">
+            <a:noFill/>
+            <a:miter lim="800000"/>
+            <a:headEnd/>
+            <a:tailEnd/>
+          </a:ln>
+        </p:spPr>
+      </p:pic>
+      <p:sp>
+        <p:nvSpPr>
+          <p:cNvPr id="19" name="Прямоугольник 18"/>
+          <p:cNvSpPr/>
+          <p:nvPr/>
+        </p:nvSpPr>
+        <p:spPr>
+          <a:xfrm>
+            <a:off x="395536" y="1196752"/>
+            <a:ext cx="2880320" cy="2304256"/>
+          </a:xfrm>
+          <a:prstGeom prst="rect">
+            <a:avLst/>
+          </a:prstGeom>
+          <a:solidFill>
+            <a:srgbClr val="FFFFFF">
+              <a:alpha val="69804"/>
+            </a:srgbClr>
+          </a:solidFill>
+          <a:ln>
+            <a:noFill/>
+          </a:ln>
+        </p:spPr>
+        <p:style>
+          <a:lnRef idx="2">
+            <a:schemeClr val="accent1">
+              <a:shade val="50000"/>
+            </a:schemeClr>
+          </a:lnRef>
+          <a:fillRef idx="1">
+            <a:schemeClr val="accent1"/>
+          </a:fillRef>
+          <a:effectRef idx="0">
+            <a:schemeClr val="accent1"/>
+          </a:effectRef>
+          <a:fontRef idx="minor">
+            <a:schemeClr val="lt1"/>
+          </a:fontRef>
+        </p:style>
+        <p:txBody>
+          <a:bodyPr rtlCol="0" anchor="ctr"/>
+          <a:lstStyle/>
+          <a:p>
+            <a:pPr algn="ctr"/>
+            <a:endParaRPr lang="ru-RU" dirty="0"/>
+          </a:p>
+        </p:txBody>
+      </p:sp>
+      <p:pic>
+        <p:nvPicPr>
+          <p:cNvPr id="1027" name="Picture 3"/>
+          <p:cNvPicPr>
+            <a:picLocks noChangeAspect="1" noChangeArrowheads="1"/>
+          </p:cNvPicPr>
+          <p:nvPr/>
+        </p:nvPicPr>
+        <p:blipFill>
+          <a:blip r:embed="rId3" cstate="print"/>
+          <a:srcRect/>
+          <a:stretch>
+            <a:fillRect/>
+          </a:stretch>
+        </p:blipFill>
+        <p:spPr bwMode="auto">
+          <a:xfrm>
+            <a:off x="291461" y="3573016"/>
+            <a:ext cx="2768371" cy="2664296"/>
+          </a:xfrm>
+          <a:prstGeom prst="rect">
+            <a:avLst/>
+          </a:prstGeom>
+          <a:noFill/>
+          <a:ln w="9525">
+            <a:noFill/>
+            <a:miter lim="800000"/>
+            <a:headEnd/>
+            <a:tailEnd/>
+          </a:ln>
+        </p:spPr>
+      </p:pic>
+      <p:sp>
+        <p:nvSpPr>
+          <p:cNvPr id="22" name="Прямоугольник 21"/>
+          <p:cNvSpPr/>
+          <p:nvPr/>
+        </p:nvSpPr>
+        <p:spPr>
+          <a:xfrm>
+            <a:off x="395536" y="3645024"/>
+            <a:ext cx="2808312" cy="2664296"/>
+          </a:xfrm>
+          <a:prstGeom prst="rect">
+            <a:avLst/>
+          </a:prstGeom>
+          <a:solidFill>
+            <a:srgbClr val="FFFFFF">
+              <a:alpha val="69804"/>
+            </a:srgbClr>
+          </a:solidFill>
+          <a:ln>
+            <a:noFill/>
+          </a:ln>
+        </p:spPr>
+        <p:style>
+          <a:lnRef idx="2">
+            <a:schemeClr val="accent1">
+              <a:shade val="50000"/>
+            </a:schemeClr>
+          </a:lnRef>
+          <a:fillRef idx="1">
+            <a:schemeClr val="accent1"/>
+          </a:fillRef>
+          <a:effectRef idx="0">
+            <a:schemeClr val="accent1"/>
+          </a:effectRef>
+          <a:fontRef idx="minor">
+            <a:schemeClr val="lt1"/>
+          </a:fontRef>
+        </p:style>
+        <p:txBody>
+          <a:bodyPr rtlCol="0" anchor="ctr"/>
+          <a:lstStyle/>
+          <a:p>
+            <a:pPr algn="ctr"/>
+            <a:endParaRPr lang="ru-RU" dirty="0"/>
+          </a:p>
+        </p:txBody>
+      </p:sp>
+      <p:sp>
+        <p:nvSpPr>
           <p:cNvPr id="5" name="Заголовок 1"/>
           <p:cNvSpPr txBox="1">
             <a:spLocks/>
@@ -7865,7 +8504,7 @@
         </p:nvSpPr>
         <p:spPr>
           <a:xfrm>
-            <a:off x="3851920" y="3861048"/>
+            <a:off x="3851920" y="3717032"/>
             <a:ext cx="4752528" cy="338554"/>
           </a:xfrm>
           <a:prstGeom prst="rect">
@@ -8053,63 +8692,6 @@
           <p:nvPr/>
         </p:nvPicPr>
         <p:blipFill>
-          <a:blip r:embed="rId2" cstate="print"/>
-          <a:srcRect/>
-          <a:stretch>
-            <a:fillRect/>
-          </a:stretch>
-        </p:blipFill>
-        <p:spPr bwMode="auto">
-          <a:xfrm>
-            <a:off x="4283968" y="4653136"/>
-            <a:ext cx="3948525" cy="1407295"/>
-          </a:xfrm>
-          <a:prstGeom prst="rect">
-            <a:avLst/>
-          </a:prstGeom>
-          <a:ln>
-            <a:noFill/>
-          </a:ln>
-          <a:effectLst>
-            <a:softEdge rad="112500"/>
-          </a:effectLst>
-        </p:spPr>
-      </p:pic>
-      <p:pic>
-        <p:nvPicPr>
-          <p:cNvPr id="36" name="Picture 8" descr="http://okna-nice.ru/images/okna_v_panelnii_dom.png"/>
-          <p:cNvPicPr>
-            <a:picLocks noChangeAspect="1" noChangeArrowheads="1"/>
-          </p:cNvPicPr>
-          <p:nvPr/>
-        </p:nvPicPr>
-        <p:blipFill>
-          <a:blip r:embed="rId3" cstate="print"/>
-          <a:srcRect/>
-          <a:stretch>
-            <a:fillRect/>
-          </a:stretch>
-        </p:blipFill>
-        <p:spPr bwMode="auto">
-          <a:xfrm>
-            <a:off x="611560" y="1376772"/>
-            <a:ext cx="2448272" cy="1836204"/>
-          </a:xfrm>
-          <a:prstGeom prst="rect">
-            <a:avLst/>
-          </a:prstGeom>
-          <a:noFill/>
-        </p:spPr>
-      </p:pic>
-      <p:pic>
-        <p:nvPicPr>
-          <p:cNvPr id="37" name="Picture 4" descr="http://files.softicons.com/download/business-icons/desktop-business-icons-by-aha-soft/png/256x256/case.png"/>
-          <p:cNvPicPr>
-            <a:picLocks noChangeAspect="1" noChangeArrowheads="1"/>
-          </p:cNvPicPr>
-          <p:nvPr/>
-        </p:nvPicPr>
-        <p:blipFill>
           <a:blip r:embed="rId4" cstate="print"/>
           <a:srcRect/>
           <a:stretch>
@@ -8118,68 +8700,23 @@
         </p:blipFill>
         <p:spPr bwMode="auto">
           <a:xfrm>
-            <a:off x="971600" y="3861048"/>
-            <a:ext cx="1800200" cy="1800200"/>
-          </a:xfrm>
-          <a:prstGeom prst="rect">
-            <a:avLst/>
-          </a:prstGeom>
-          <a:noFill/>
+            <a:off x="4015622" y="4365104"/>
+            <a:ext cx="4444810" cy="1584176"/>
+          </a:xfrm>
+          <a:prstGeom prst="rect">
+            <a:avLst/>
+          </a:prstGeom>
+          <a:ln>
+            <a:noFill/>
+          </a:ln>
+          <a:effectLst>
+            <a:softEdge rad="112500"/>
+          </a:effectLst>
         </p:spPr>
       </p:pic>
-      <p:sp>
-        <p:nvSpPr>
-          <p:cNvPr id="20" name="Прямоугольник 19"/>
-          <p:cNvSpPr/>
-          <p:nvPr/>
-        </p:nvSpPr>
-        <p:spPr>
-          <a:xfrm>
-            <a:off x="3851920" y="1146230"/>
-            <a:ext cx="4752528" cy="338554"/>
-          </a:xfrm>
-          <a:prstGeom prst="rect">
-            <a:avLst/>
-          </a:prstGeom>
-        </p:spPr>
-        <p:txBody>
-          <a:bodyPr wrap="square">
-            <a:spAutoFit/>
-          </a:bodyPr>
-          <a:lstStyle/>
-          <a:p>
-            <a:pPr algn="just"/>
-            <a:r>
-              <a:rPr lang="ru-RU" sz="1600" b="1" dirty="0" smtClean="0">
-                <a:latin typeface="Arial" pitchFamily="34" charset="0"/>
-                <a:cs typeface="Arial" pitchFamily="34" charset="0"/>
-              </a:rPr>
-              <a:t>Взаимодействие через </a:t>
-            </a:r>
-            <a:r>
-              <a:rPr lang="en-US" sz="1600" b="1" dirty="0" smtClean="0">
-                <a:latin typeface="Arial" pitchFamily="34" charset="0"/>
-                <a:cs typeface="Arial" pitchFamily="34" charset="0"/>
-              </a:rPr>
-              <a:t>API-</a:t>
-            </a:r>
-            <a:r>
-              <a:rPr lang="ru-RU" sz="1600" b="1" dirty="0" smtClean="0">
-                <a:latin typeface="Arial" pitchFamily="34" charset="0"/>
-                <a:cs typeface="Arial" pitchFamily="34" charset="0"/>
-              </a:rPr>
-              <a:t>интерфейс</a:t>
-            </a:r>
-            <a:endParaRPr lang="ru-RU" sz="1600" b="1" dirty="0">
-              <a:latin typeface="Arial" pitchFamily="34" charset="0"/>
-              <a:cs typeface="Arial" pitchFamily="34" charset="0"/>
-            </a:endParaRPr>
-          </a:p>
-        </p:txBody>
-      </p:sp>
       <p:pic>
         <p:nvPicPr>
-          <p:cNvPr id="17410" name="Picture 2" descr="http://www.probasegroup.com/wp-content/uploads/2014/09/learnmore-api.png"/>
+          <p:cNvPr id="36" name="Picture 8" descr="http://okna-nice.ru/images/okna_v_panelnii_dom.png"/>
           <p:cNvPicPr>
             <a:picLocks noChangeAspect="1" noChangeArrowheads="1"/>
           </p:cNvPicPr>
@@ -8194,8 +8731,8 @@
         </p:blipFill>
         <p:spPr bwMode="auto">
           <a:xfrm>
-            <a:off x="3635896" y="1628800"/>
-            <a:ext cx="2850000" cy="1728192"/>
+            <a:off x="683568" y="1484784"/>
+            <a:ext cx="2304256" cy="1728192"/>
           </a:xfrm>
           <a:prstGeom prst="rect">
             <a:avLst/>
@@ -8205,7 +8742,7 @@
       </p:pic>
       <p:pic>
         <p:nvPicPr>
-          <p:cNvPr id="21" name="Picture 20" descr="http://www.bizagi.com/assets/images/standards-page/logo_soap.jpg"/>
+          <p:cNvPr id="37" name="Picture 4" descr="http://files.softicons.com/download/business-icons/desktop-business-icons-by-aha-soft/png/256x256/case.png"/>
           <p:cNvPicPr>
             <a:picLocks noChangeAspect="1" noChangeArrowheads="1"/>
           </p:cNvPicPr>
@@ -8220,8 +8757,110 @@
         </p:blipFill>
         <p:spPr bwMode="auto">
           <a:xfrm>
-            <a:off x="6372200" y="1844824"/>
-            <a:ext cx="2016224" cy="1324529"/>
+            <a:off x="971600" y="3861048"/>
+            <a:ext cx="1800200" cy="1800200"/>
+          </a:xfrm>
+          <a:prstGeom prst="rect">
+            <a:avLst/>
+          </a:prstGeom>
+          <a:noFill/>
+        </p:spPr>
+      </p:pic>
+      <p:sp>
+        <p:nvSpPr>
+          <p:cNvPr id="20" name="Прямоугольник 19"/>
+          <p:cNvSpPr/>
+          <p:nvPr/>
+        </p:nvSpPr>
+        <p:spPr>
+          <a:xfrm>
+            <a:off x="3851920" y="1146230"/>
+            <a:ext cx="4752528" cy="338554"/>
+          </a:xfrm>
+          <a:prstGeom prst="rect">
+            <a:avLst/>
+          </a:prstGeom>
+        </p:spPr>
+        <p:txBody>
+          <a:bodyPr wrap="square">
+            <a:spAutoFit/>
+          </a:bodyPr>
+          <a:lstStyle/>
+          <a:p>
+            <a:pPr algn="just"/>
+            <a:r>
+              <a:rPr lang="ru-RU" sz="1600" b="1" dirty="0" smtClean="0">
+                <a:latin typeface="Arial" pitchFamily="34" charset="0"/>
+                <a:cs typeface="Arial" pitchFamily="34" charset="0"/>
+              </a:rPr>
+              <a:t>Взаимодействие через </a:t>
+            </a:r>
+            <a:r>
+              <a:rPr lang="en-US" sz="1600" b="1" dirty="0" smtClean="0">
+                <a:latin typeface="Arial" pitchFamily="34" charset="0"/>
+                <a:cs typeface="Arial" pitchFamily="34" charset="0"/>
+              </a:rPr>
+              <a:t>API-</a:t>
+            </a:r>
+            <a:r>
+              <a:rPr lang="ru-RU" sz="1600" b="1" dirty="0" smtClean="0">
+                <a:latin typeface="Arial" pitchFamily="34" charset="0"/>
+                <a:cs typeface="Arial" pitchFamily="34" charset="0"/>
+              </a:rPr>
+              <a:t>интерфейс</a:t>
+            </a:r>
+            <a:endParaRPr lang="ru-RU" sz="1600" b="1" dirty="0">
+              <a:latin typeface="Arial" pitchFamily="34" charset="0"/>
+              <a:cs typeface="Arial" pitchFamily="34" charset="0"/>
+            </a:endParaRPr>
+          </a:p>
+        </p:txBody>
+      </p:sp>
+      <p:pic>
+        <p:nvPicPr>
+          <p:cNvPr id="17410" name="Picture 2" descr="http://www.probasegroup.com/wp-content/uploads/2014/09/learnmore-api.png"/>
+          <p:cNvPicPr>
+            <a:picLocks noChangeAspect="1" noChangeArrowheads="1"/>
+          </p:cNvPicPr>
+          <p:nvPr/>
+        </p:nvPicPr>
+        <p:blipFill>
+          <a:blip r:embed="rId7" cstate="print"/>
+          <a:srcRect/>
+          <a:stretch>
+            <a:fillRect/>
+          </a:stretch>
+        </p:blipFill>
+        <p:spPr bwMode="auto">
+          <a:xfrm>
+            <a:off x="3491880" y="1464100"/>
+            <a:ext cx="3240360" cy="1964900"/>
+          </a:xfrm>
+          <a:prstGeom prst="rect">
+            <a:avLst/>
+          </a:prstGeom>
+          <a:noFill/>
+        </p:spPr>
+      </p:pic>
+      <p:pic>
+        <p:nvPicPr>
+          <p:cNvPr id="1032" name="Picture 8" descr="http://www.bizagi.com/assets/images/standards-page/logo_soap.jpg"/>
+          <p:cNvPicPr>
+            <a:picLocks noChangeAspect="1" noChangeArrowheads="1"/>
+          </p:cNvPicPr>
+          <p:nvPr/>
+        </p:nvPicPr>
+        <p:blipFill>
+          <a:blip r:embed="rId8" cstate="print"/>
+          <a:srcRect/>
+          <a:stretch>
+            <a:fillRect/>
+          </a:stretch>
+        </p:blipFill>
+        <p:spPr bwMode="auto">
+          <a:xfrm>
+            <a:off x="6660232" y="1844824"/>
+            <a:ext cx="1872208" cy="1229919"/>
           </a:xfrm>
           <a:prstGeom prst="rect">
             <a:avLst/>
@@ -9790,4 +10429,287 @@
   <a:objectDefaults/>
   <a:extraClrSchemeLst/>
 </a:theme>
+</file>
+
+<file path=ppt/theme/theme2.xml><?xml version="1.0" encoding="utf-8"?>
+<a:theme xmlns:a="http://schemas.openxmlformats.org/drawingml/2006/main" name="Тема Office">
+  <a:themeElements>
+    <a:clrScheme name="Стандартная">
+      <a:dk1>
+        <a:sysClr val="windowText" lastClr="000000"/>
+      </a:dk1>
+      <a:lt1>
+        <a:sysClr val="window" lastClr="FFFFFF"/>
+      </a:lt1>
+      <a:dk2>
+        <a:srgbClr val="1F497D"/>
+      </a:dk2>
+      <a:lt2>
+        <a:srgbClr val="EEECE1"/>
+      </a:lt2>
+      <a:accent1>
+        <a:srgbClr val="4F81BD"/>
+      </a:accent1>
+      <a:accent2>
+        <a:srgbClr val="C0504D"/>
+      </a:accent2>
+      <a:accent3>
+        <a:srgbClr val="9BBB59"/>
+      </a:accent3>
+      <a:accent4>
+        <a:srgbClr val="8064A2"/>
+      </a:accent4>
+      <a:accent5>
+        <a:srgbClr val="4BACC6"/>
+      </a:accent5>
+      <a:accent6>
+        <a:srgbClr val="F79646"/>
+      </a:accent6>
+      <a:hlink>
+        <a:srgbClr val="0000FF"/>
+      </a:hlink>
+      <a:folHlink>
+        <a:srgbClr val="800080"/>
+      </a:folHlink>
+    </a:clrScheme>
+    <a:fontScheme name="Стандартная">
+      <a:majorFont>
+        <a:latin typeface="Calibri"/>
+        <a:ea typeface=""/>
+        <a:cs typeface=""/>
+        <a:font script="Jpan" typeface="ＭＳ Ｐゴシック"/>
+        <a:font script="Hang" typeface="맑은 고딕"/>
+        <a:font script="Hans" typeface="宋体"/>
+        <a:font script="Hant" typeface="新細明體"/>
+        <a:font script="Arab" typeface="Times New Roman"/>
+        <a:font script="Hebr" typeface="Times New Roman"/>
+        <a:font script="Thai" typeface="Angsana New"/>
+        <a:font script="Ethi" typeface="Nyala"/>
+        <a:font script="Beng" typeface="Vrinda"/>
+        <a:font script="Gujr" typeface="Shruti"/>
+        <a:font script="Khmr" typeface="MoolBoran"/>
+        <a:font script="Knda" typeface="Tunga"/>
+        <a:font script="Guru" typeface="Raavi"/>
+        <a:font script="Cans" typeface="Euphemia"/>
+        <a:font script="Cher" typeface="Plantagenet Cherokee"/>
+        <a:font script="Yiii" typeface="Microsoft Yi Baiti"/>
+        <a:font script="Tibt" typeface="Microsoft Himalaya"/>
+        <a:font script="Thaa" typeface="MV Boli"/>
+        <a:font script="Deva" typeface="Mangal"/>
+        <a:font script="Telu" typeface="Gautami"/>
+        <a:font script="Taml" typeface="Latha"/>
+        <a:font script="Syrc" typeface="Estrangelo Edessa"/>
+        <a:font script="Orya" typeface="Kalinga"/>
+        <a:font script="Mlym" typeface="Kartika"/>
+        <a:font script="Laoo" typeface="DokChampa"/>
+        <a:font script="Sinh" typeface="Iskoola Pota"/>
+        <a:font script="Mong" typeface="Mongolian Baiti"/>
+        <a:font script="Viet" typeface="Times New Roman"/>
+        <a:font script="Uigh" typeface="Microsoft Uighur"/>
+      </a:majorFont>
+      <a:minorFont>
+        <a:latin typeface="Calibri"/>
+        <a:ea typeface=""/>
+        <a:cs typeface=""/>
+        <a:font script="Jpan" typeface="ＭＳ Ｐゴシック"/>
+        <a:font script="Hang" typeface="맑은 고딕"/>
+        <a:font script="Hans" typeface="宋体"/>
+        <a:font script="Hant" typeface="新細明體"/>
+        <a:font script="Arab" typeface="Arial"/>
+        <a:font script="Hebr" typeface="Arial"/>
+        <a:font script="Thai" typeface="Cordia New"/>
+        <a:font script="Ethi" typeface="Nyala"/>
+        <a:font script="Beng" typeface="Vrinda"/>
+        <a:font script="Gujr" typeface="Shruti"/>
+        <a:font script="Khmr" typeface="DaunPenh"/>
+        <a:font script="Knda" typeface="Tunga"/>
+        <a:font script="Guru" typeface="Raavi"/>
+        <a:font script="Cans" typeface="Euphemia"/>
+        <a:font script="Cher" typeface="Plantagenet Cherokee"/>
+        <a:font script="Yiii" typeface="Microsoft Yi Baiti"/>
+        <a:font script="Tibt" typeface="Microsoft Himalaya"/>
+        <a:font script="Thaa" typeface="MV Boli"/>
+        <a:font script="Deva" typeface="Mangal"/>
+        <a:font script="Telu" typeface="Gautami"/>
+        <a:font script="Taml" typeface="Latha"/>
+        <a:font script="Syrc" typeface="Estrangelo Edessa"/>
+        <a:font script="Orya" typeface="Kalinga"/>
+        <a:font script="Mlym" typeface="Kartika"/>
+        <a:font script="Laoo" typeface="DokChampa"/>
+        <a:font script="Sinh" typeface="Iskoola Pota"/>
+        <a:font script="Mong" typeface="Mongolian Baiti"/>
+        <a:font script="Viet" typeface="Arial"/>
+        <a:font script="Uigh" typeface="Microsoft Uighur"/>
+      </a:minorFont>
+    </a:fontScheme>
+    <a:fmtScheme name="Стандартная">
+      <a:fillStyleLst>
+        <a:solidFill>
+          <a:schemeClr val="phClr"/>
+        </a:solidFill>
+        <a:gradFill rotWithShape="1">
+          <a:gsLst>
+            <a:gs pos="0">
+              <a:schemeClr val="phClr">
+                <a:tint val="50000"/>
+                <a:satMod val="300000"/>
+              </a:schemeClr>
+            </a:gs>
+            <a:gs pos="35000">
+              <a:schemeClr val="phClr">
+                <a:tint val="37000"/>
+                <a:satMod val="300000"/>
+              </a:schemeClr>
+            </a:gs>
+            <a:gs pos="100000">
+              <a:schemeClr val="phClr">
+                <a:tint val="15000"/>
+                <a:satMod val="350000"/>
+              </a:schemeClr>
+            </a:gs>
+          </a:gsLst>
+          <a:lin ang="16200000" scaled="1"/>
+        </a:gradFill>
+        <a:gradFill rotWithShape="1">
+          <a:gsLst>
+            <a:gs pos="0">
+              <a:schemeClr val="phClr">
+                <a:shade val="51000"/>
+                <a:satMod val="130000"/>
+              </a:schemeClr>
+            </a:gs>
+            <a:gs pos="80000">
+              <a:schemeClr val="phClr">
+                <a:shade val="93000"/>
+                <a:satMod val="130000"/>
+              </a:schemeClr>
+            </a:gs>
+            <a:gs pos="100000">
+              <a:schemeClr val="phClr">
+                <a:shade val="94000"/>
+                <a:satMod val="135000"/>
+              </a:schemeClr>
+            </a:gs>
+          </a:gsLst>
+          <a:lin ang="16200000" scaled="0"/>
+        </a:gradFill>
+      </a:fillStyleLst>
+      <a:lnStyleLst>
+        <a:ln w="9525" cap="flat" cmpd="sng" algn="ctr">
+          <a:solidFill>
+            <a:schemeClr val="phClr">
+              <a:shade val="95000"/>
+              <a:satMod val="105000"/>
+            </a:schemeClr>
+          </a:solidFill>
+          <a:prstDash val="solid"/>
+        </a:ln>
+        <a:ln w="25400" cap="flat" cmpd="sng" algn="ctr">
+          <a:solidFill>
+            <a:schemeClr val="phClr"/>
+          </a:solidFill>
+          <a:prstDash val="solid"/>
+        </a:ln>
+        <a:ln w="38100" cap="flat" cmpd="sng" algn="ctr">
+          <a:solidFill>
+            <a:schemeClr val="phClr"/>
+          </a:solidFill>
+          <a:prstDash val="solid"/>
+        </a:ln>
+      </a:lnStyleLst>
+      <a:effectStyleLst>
+        <a:effectStyle>
+          <a:effectLst>
+            <a:outerShdw blurRad="40000" dist="20000" dir="5400000" rotWithShape="0">
+              <a:srgbClr val="000000">
+                <a:alpha val="38000"/>
+              </a:srgbClr>
+            </a:outerShdw>
+          </a:effectLst>
+        </a:effectStyle>
+        <a:effectStyle>
+          <a:effectLst>
+            <a:outerShdw blurRad="40000" dist="23000" dir="5400000" rotWithShape="0">
+              <a:srgbClr val="000000">
+                <a:alpha val="35000"/>
+              </a:srgbClr>
+            </a:outerShdw>
+          </a:effectLst>
+        </a:effectStyle>
+        <a:effectStyle>
+          <a:effectLst>
+            <a:outerShdw blurRad="40000" dist="23000" dir="5400000" rotWithShape="0">
+              <a:srgbClr val="000000">
+                <a:alpha val="35000"/>
+              </a:srgbClr>
+            </a:outerShdw>
+          </a:effectLst>
+          <a:scene3d>
+            <a:camera prst="orthographicFront">
+              <a:rot lat="0" lon="0" rev="0"/>
+            </a:camera>
+            <a:lightRig rig="threePt" dir="t">
+              <a:rot lat="0" lon="0" rev="1200000"/>
+            </a:lightRig>
+          </a:scene3d>
+          <a:sp3d>
+            <a:bevelT w="63500" h="25400"/>
+          </a:sp3d>
+        </a:effectStyle>
+      </a:effectStyleLst>
+      <a:bgFillStyleLst>
+        <a:solidFill>
+          <a:schemeClr val="phClr"/>
+        </a:solidFill>
+        <a:gradFill rotWithShape="1">
+          <a:gsLst>
+            <a:gs pos="0">
+              <a:schemeClr val="phClr">
+                <a:tint val="40000"/>
+                <a:satMod val="350000"/>
+              </a:schemeClr>
+            </a:gs>
+            <a:gs pos="40000">
+              <a:schemeClr val="phClr">
+                <a:tint val="45000"/>
+                <a:shade val="99000"/>
+                <a:satMod val="350000"/>
+              </a:schemeClr>
+            </a:gs>
+            <a:gs pos="100000">
+              <a:schemeClr val="phClr">
+                <a:shade val="20000"/>
+                <a:satMod val="255000"/>
+              </a:schemeClr>
+            </a:gs>
+          </a:gsLst>
+          <a:path path="circle">
+            <a:fillToRect l="50000" t="-80000" r="50000" b="180000"/>
+          </a:path>
+        </a:gradFill>
+        <a:gradFill rotWithShape="1">
+          <a:gsLst>
+            <a:gs pos="0">
+              <a:schemeClr val="phClr">
+                <a:tint val="80000"/>
+                <a:satMod val="300000"/>
+              </a:schemeClr>
+            </a:gs>
+            <a:gs pos="100000">
+              <a:schemeClr val="phClr">
+                <a:shade val="30000"/>
+                <a:satMod val="200000"/>
+              </a:schemeClr>
+            </a:gs>
+          </a:gsLst>
+          <a:path path="circle">
+            <a:fillToRect l="50000" t="50000" r="50000" b="50000"/>
+          </a:path>
+        </a:gradFill>
+      </a:bgFillStyleLst>
+    </a:fmtScheme>
+  </a:themeElements>
+  <a:objectDefaults/>
+  <a:extraClrSchemeLst/>
+</a:theme>
 </file>
</xml_diff>

<commit_message>
Suppose that this is last update for the repository
</commit_message>
<xml_diff>
--- a/Презентация/Боевая/Подсистема_интеграции_4.pptx
+++ b/Презентация/Боевая/Подсистема_интеграции_4.pptx
@@ -3538,42 +3538,7 @@
                 <a:latin typeface="Arial" pitchFamily="34" charset="0"/>
                 <a:cs typeface="Arial" pitchFamily="34" charset="0"/>
               </a:rPr>
-              <a:t>Подсистема интеграции </a:t>
-            </a:r>
-            <a:r>
-              <a:rPr lang="ru-RU" sz="3600" dirty="0" smtClean="0">
-                <a:latin typeface="Arial" pitchFamily="34" charset="0"/>
-                <a:cs typeface="Arial" pitchFamily="34" charset="0"/>
-              </a:rPr>
-              <a:t>с федеральн</a:t>
-            </a:r>
-            <a:r>
-              <a:rPr lang="ru-RU" sz="3600" dirty="0" smtClean="0">
-                <a:latin typeface="Arial" pitchFamily="34" charset="0"/>
-                <a:cs typeface="Arial" pitchFamily="34" charset="0"/>
-              </a:rPr>
-              <a:t>ой системой</a:t>
-            </a:r>
-            <a:r>
-              <a:rPr lang="ru-RU" sz="3600" dirty="0" smtClean="0">
-                <a:latin typeface="Arial" pitchFamily="34" charset="0"/>
-                <a:cs typeface="Arial" pitchFamily="34" charset="0"/>
-              </a:rPr>
-              <a:t> «</a:t>
-            </a:r>
-            <a:r>
-              <a:rPr lang="ru-RU" sz="3600" dirty="0" smtClean="0">
-                <a:latin typeface="Arial" pitchFamily="34" charset="0"/>
-                <a:cs typeface="Arial" pitchFamily="34" charset="0"/>
-              </a:rPr>
-              <a:t>Реформа ЖКХ</a:t>
-            </a:r>
-            <a:r>
-              <a:rPr lang="ru-RU" sz="3600" dirty="0" smtClean="0">
-                <a:latin typeface="Arial" pitchFamily="34" charset="0"/>
-                <a:cs typeface="Arial" pitchFamily="34" charset="0"/>
-              </a:rPr>
-              <a:t>» для «АИС: Объектовый учет»</a:t>
+              <a:t>Подсистема интеграции с федеральной системой «Реформа ЖКХ» для «АИС: Объектовый учет»</a:t>
             </a:r>
             <a:endParaRPr lang="ru-RU" sz="3600" dirty="0">
               <a:latin typeface="Arial" pitchFamily="34" charset="0"/>

</xml_diff>